<commit_message>
lots of updates March to September 2022, preparing to submit to coauthors
</commit_message>
<xml_diff>
--- a/docs/draft_figs_Ch2_manuscript.pptx
+++ b/docs/draft_figs_Ch2_manuscript.pptx
@@ -8,11 +8,23 @@
     <p:sldId id="265" r:id="rId2"/>
     <p:sldId id="268" r:id="rId3"/>
     <p:sldId id="257" r:id="rId4"/>
-    <p:sldId id="258" r:id="rId5"/>
-    <p:sldId id="272" r:id="rId6"/>
-    <p:sldId id="261" r:id="rId7"/>
-    <p:sldId id="266" r:id="rId8"/>
-    <p:sldId id="271" r:id="rId9"/>
+    <p:sldId id="283" r:id="rId5"/>
+    <p:sldId id="284" r:id="rId6"/>
+    <p:sldId id="258" r:id="rId7"/>
+    <p:sldId id="272" r:id="rId8"/>
+    <p:sldId id="261" r:id="rId9"/>
+    <p:sldId id="266" r:id="rId10"/>
+    <p:sldId id="271" r:id="rId11"/>
+    <p:sldId id="273" r:id="rId12"/>
+    <p:sldId id="274" r:id="rId13"/>
+    <p:sldId id="275" r:id="rId14"/>
+    <p:sldId id="276" r:id="rId15"/>
+    <p:sldId id="280" r:id="rId16"/>
+    <p:sldId id="281" r:id="rId17"/>
+    <p:sldId id="277" r:id="rId18"/>
+    <p:sldId id="282" r:id="rId19"/>
+    <p:sldId id="278" r:id="rId20"/>
+    <p:sldId id="279" r:id="rId21"/>
   </p:sldIdLst>
   <p:sldSz cx="9144000" cy="6858000" type="screen4x3"/>
   <p:notesSz cx="6858000" cy="9144000"/>
@@ -250,7 +262,7 @@
           <a:p>
             <a:fld id="{FACB04D5-96DD-4806-A651-9F27C349FD0D}" type="datetimeFigureOut">
               <a:rPr lang="en-US" smtClean="0"/>
-              <a:t>2/11/2022</a:t>
+              <a:t>8/21/2022</a:t>
             </a:fld>
             <a:endParaRPr lang="en-US"/>
           </a:p>
@@ -420,7 +432,7 @@
           <a:p>
             <a:fld id="{FACB04D5-96DD-4806-A651-9F27C349FD0D}" type="datetimeFigureOut">
               <a:rPr lang="en-US" smtClean="0"/>
-              <a:t>2/11/2022</a:t>
+              <a:t>8/21/2022</a:t>
             </a:fld>
             <a:endParaRPr lang="en-US"/>
           </a:p>
@@ -600,7 +612,7 @@
           <a:p>
             <a:fld id="{FACB04D5-96DD-4806-A651-9F27C349FD0D}" type="datetimeFigureOut">
               <a:rPr lang="en-US" smtClean="0"/>
-              <a:t>2/11/2022</a:t>
+              <a:t>8/21/2022</a:t>
             </a:fld>
             <a:endParaRPr lang="en-US"/>
           </a:p>
@@ -770,7 +782,7 @@
           <a:p>
             <a:fld id="{FACB04D5-96DD-4806-A651-9F27C349FD0D}" type="datetimeFigureOut">
               <a:rPr lang="en-US" smtClean="0"/>
-              <a:t>2/11/2022</a:t>
+              <a:t>8/21/2022</a:t>
             </a:fld>
             <a:endParaRPr lang="en-US"/>
           </a:p>
@@ -1014,7 +1026,7 @@
           <a:p>
             <a:fld id="{FACB04D5-96DD-4806-A651-9F27C349FD0D}" type="datetimeFigureOut">
               <a:rPr lang="en-US" smtClean="0"/>
-              <a:t>2/11/2022</a:t>
+              <a:t>8/21/2022</a:t>
             </a:fld>
             <a:endParaRPr lang="en-US"/>
           </a:p>
@@ -1246,7 +1258,7 @@
           <a:p>
             <a:fld id="{FACB04D5-96DD-4806-A651-9F27C349FD0D}" type="datetimeFigureOut">
               <a:rPr lang="en-US" smtClean="0"/>
-              <a:t>2/11/2022</a:t>
+              <a:t>8/21/2022</a:t>
             </a:fld>
             <a:endParaRPr lang="en-US"/>
           </a:p>
@@ -1613,7 +1625,7 @@
           <a:p>
             <a:fld id="{FACB04D5-96DD-4806-A651-9F27C349FD0D}" type="datetimeFigureOut">
               <a:rPr lang="en-US" smtClean="0"/>
-              <a:t>2/11/2022</a:t>
+              <a:t>8/21/2022</a:t>
             </a:fld>
             <a:endParaRPr lang="en-US"/>
           </a:p>
@@ -1731,7 +1743,7 @@
           <a:p>
             <a:fld id="{FACB04D5-96DD-4806-A651-9F27C349FD0D}" type="datetimeFigureOut">
               <a:rPr lang="en-US" smtClean="0"/>
-              <a:t>2/11/2022</a:t>
+              <a:t>8/21/2022</a:t>
             </a:fld>
             <a:endParaRPr lang="en-US"/>
           </a:p>
@@ -1826,7 +1838,7 @@
           <a:p>
             <a:fld id="{FACB04D5-96DD-4806-A651-9F27C349FD0D}" type="datetimeFigureOut">
               <a:rPr lang="en-US" smtClean="0"/>
-              <a:t>2/11/2022</a:t>
+              <a:t>8/21/2022</a:t>
             </a:fld>
             <a:endParaRPr lang="en-US"/>
           </a:p>
@@ -2103,7 +2115,7 @@
           <a:p>
             <a:fld id="{FACB04D5-96DD-4806-A651-9F27C349FD0D}" type="datetimeFigureOut">
               <a:rPr lang="en-US" smtClean="0"/>
-              <a:t>2/11/2022</a:t>
+              <a:t>8/21/2022</a:t>
             </a:fld>
             <a:endParaRPr lang="en-US"/>
           </a:p>
@@ -2360,7 +2372,7 @@
           <a:p>
             <a:fld id="{FACB04D5-96DD-4806-A651-9F27C349FD0D}" type="datetimeFigureOut">
               <a:rPr lang="en-US" smtClean="0"/>
-              <a:t>2/11/2022</a:t>
+              <a:t>8/21/2022</a:t>
             </a:fld>
             <a:endParaRPr lang="en-US"/>
           </a:p>
@@ -2573,7 +2585,7 @@
           <a:p>
             <a:fld id="{FACB04D5-96DD-4806-A651-9F27C349FD0D}" type="datetimeFigureOut">
               <a:rPr lang="en-US" smtClean="0"/>
-              <a:t>2/11/2022</a:t>
+              <a:t>8/21/2022</a:t>
             </a:fld>
             <a:endParaRPr lang="en-US"/>
           </a:p>
@@ -4243,6 +4255,2897 @@
       <p:bldP spid="12" grpId="0" animBg="1"/>
     </p:bldLst>
   </p:timing>
+</p:sld>
+</file>
+
+<file path=ppt/slides/slide10.xml><?xml version="1.0" encoding="utf-8"?>
+<p:sld xmlns:a="http://schemas.openxmlformats.org/drawingml/2006/main" xmlns:r="http://schemas.openxmlformats.org/officeDocument/2006/relationships" xmlns:p="http://schemas.openxmlformats.org/presentationml/2006/main">
+  <p:cSld>
+    <p:spTree>
+      <p:nvGrpSpPr>
+        <p:cNvPr id="1" name=""/>
+        <p:cNvGrpSpPr/>
+        <p:nvPr/>
+      </p:nvGrpSpPr>
+      <p:grpSpPr>
+        <a:xfrm>
+          <a:off x="0" y="0"/>
+          <a:ext cx="0" cy="0"/>
+          <a:chOff x="0" y="0"/>
+          <a:chExt cx="0" cy="0"/>
+        </a:xfrm>
+      </p:grpSpPr>
+      <p:sp>
+        <p:nvSpPr>
+          <p:cNvPr id="3" name="Title 2">
+            <a:extLst>
+              <a:ext uri="{FF2B5EF4-FFF2-40B4-BE49-F238E27FC236}">
+                <a16:creationId xmlns:a16="http://schemas.microsoft.com/office/drawing/2014/main" id="{5FD93C3D-6D1F-4531-892F-ED7128FAEC8E}"/>
+              </a:ext>
+            </a:extLst>
+          </p:cNvPr>
+          <p:cNvSpPr>
+            <a:spLocks noGrp="1"/>
+          </p:cNvSpPr>
+          <p:nvPr>
+            <p:ph type="title"/>
+          </p:nvPr>
+        </p:nvSpPr>
+        <p:spPr/>
+        <p:txBody>
+          <a:bodyPr/>
+          <a:lstStyle/>
+          <a:p>
+            <a:r>
+              <a:rPr lang="en-US" dirty="0"/>
+              <a:t>Subcanopy NPP is </a:t>
+            </a:r>
+            <a:r>
+              <a:rPr lang="en-US" i="1" dirty="0"/>
+              <a:t>not</a:t>
+            </a:r>
+            <a:r>
+              <a:rPr lang="en-US" dirty="0"/>
+              <a:t> well predicted by subcanopy </a:t>
+            </a:r>
+            <a:r>
+              <a:rPr lang="en-US" dirty="0" err="1"/>
+              <a:t>A</a:t>
+            </a:r>
+            <a:r>
+              <a:rPr lang="en-US" baseline="-25000" dirty="0" err="1"/>
+              <a:t>sat</a:t>
+            </a:r>
+            <a:r>
+              <a:rPr lang="en-US" dirty="0"/>
+              <a:t> alone</a:t>
+            </a:r>
+          </a:p>
+        </p:txBody>
+      </p:sp>
+      <p:pic>
+        <p:nvPicPr>
+          <p:cNvPr id="9" name="Content Placeholder 8">
+            <a:extLst>
+              <a:ext uri="{FF2B5EF4-FFF2-40B4-BE49-F238E27FC236}">
+                <a16:creationId xmlns:a16="http://schemas.microsoft.com/office/drawing/2014/main" id="{98D1C94B-DB38-4599-9E56-3A80A1FC47C2}"/>
+              </a:ext>
+            </a:extLst>
+          </p:cNvPr>
+          <p:cNvPicPr>
+            <a:picLocks noGrp="1" noChangeAspect="1"/>
+          </p:cNvPicPr>
+          <p:nvPr>
+            <p:ph idx="1"/>
+          </p:nvPr>
+        </p:nvPicPr>
+        <p:blipFill>
+          <a:blip r:embed="rId2">
+            <a:extLst>
+              <a:ext uri="{28A0092B-C50C-407E-A947-70E740481C1C}">
+                <a14:useLocalDpi xmlns:a14="http://schemas.microsoft.com/office/drawing/2010/main" val="0"/>
+              </a:ext>
+            </a:extLst>
+          </a:blip>
+          <a:srcRect/>
+          <a:stretch/>
+        </p:blipFill>
+        <p:spPr>
+          <a:xfrm>
+            <a:off x="979616" y="1825625"/>
+            <a:ext cx="7184767" cy="4351337"/>
+          </a:xfrm>
+        </p:spPr>
+      </p:pic>
+    </p:spTree>
+    <p:extLst>
+      <p:ext uri="{BB962C8B-B14F-4D97-AF65-F5344CB8AC3E}">
+        <p14:creationId xmlns:p14="http://schemas.microsoft.com/office/powerpoint/2010/main" val="3275953508"/>
+      </p:ext>
+    </p:extLst>
+  </p:cSld>
+  <p:clrMapOvr>
+    <a:masterClrMapping/>
+  </p:clrMapOvr>
+</p:sld>
+</file>
+
+<file path=ppt/slides/slide11.xml><?xml version="1.0" encoding="utf-8"?>
+<p:sld xmlns:a="http://schemas.openxmlformats.org/drawingml/2006/main" xmlns:r="http://schemas.openxmlformats.org/officeDocument/2006/relationships" xmlns:p="http://schemas.openxmlformats.org/presentationml/2006/main">
+  <p:cSld>
+    <p:spTree>
+      <p:nvGrpSpPr>
+        <p:cNvPr id="1" name=""/>
+        <p:cNvGrpSpPr/>
+        <p:nvPr/>
+      </p:nvGrpSpPr>
+      <p:grpSpPr>
+        <a:xfrm>
+          <a:off x="0" y="0"/>
+          <a:ext cx="0" cy="0"/>
+          <a:chOff x="0" y="0"/>
+          <a:chExt cx="0" cy="0"/>
+        </a:xfrm>
+      </p:grpSpPr>
+      <p:sp>
+        <p:nvSpPr>
+          <p:cNvPr id="2" name="Title 1">
+            <a:extLst>
+              <a:ext uri="{FF2B5EF4-FFF2-40B4-BE49-F238E27FC236}">
+                <a16:creationId xmlns:a16="http://schemas.microsoft.com/office/drawing/2014/main" id="{A7F028DE-D4A5-42E8-BA0F-FD590F8CD7E5}"/>
+              </a:ext>
+            </a:extLst>
+          </p:cNvPr>
+          <p:cNvSpPr>
+            <a:spLocks noGrp="1"/>
+          </p:cNvSpPr>
+          <p:nvPr>
+            <p:ph type="title"/>
+          </p:nvPr>
+        </p:nvSpPr>
+        <p:spPr/>
+        <p:txBody>
+          <a:bodyPr/>
+          <a:lstStyle/>
+          <a:p>
+            <a:endParaRPr lang="en-US"/>
+          </a:p>
+        </p:txBody>
+      </p:sp>
+      <p:pic>
+        <p:nvPicPr>
+          <p:cNvPr id="13" name="Content Placeholder 12">
+            <a:extLst>
+              <a:ext uri="{FF2B5EF4-FFF2-40B4-BE49-F238E27FC236}">
+                <a16:creationId xmlns:a16="http://schemas.microsoft.com/office/drawing/2014/main" id="{57211A02-372C-4644-A4DD-0B5FBEBC3CEC}"/>
+              </a:ext>
+            </a:extLst>
+          </p:cNvPr>
+          <p:cNvPicPr>
+            <a:picLocks noGrp="1" noChangeAspect="1"/>
+          </p:cNvPicPr>
+          <p:nvPr>
+            <p:ph idx="1"/>
+          </p:nvPr>
+        </p:nvPicPr>
+        <p:blipFill>
+          <a:blip r:embed="rId2">
+            <a:extLst>
+              <a:ext uri="{28A0092B-C50C-407E-A947-70E740481C1C}">
+                <a14:useLocalDpi xmlns:a14="http://schemas.microsoft.com/office/drawing/2010/main" val="0"/>
+              </a:ext>
+            </a:extLst>
+          </a:blip>
+          <a:srcRect/>
+          <a:stretch/>
+        </p:blipFill>
+        <p:spPr>
+          <a:xfrm>
+            <a:off x="849499" y="2016125"/>
+            <a:ext cx="6091873" cy="4351337"/>
+          </a:xfrm>
+        </p:spPr>
+      </p:pic>
+      <p:sp>
+        <p:nvSpPr>
+          <p:cNvPr id="8" name="TextBox 7">
+            <a:extLst>
+              <a:ext uri="{FF2B5EF4-FFF2-40B4-BE49-F238E27FC236}">
+                <a16:creationId xmlns:a16="http://schemas.microsoft.com/office/drawing/2014/main" id="{165682B6-B3D4-4972-B28D-F7E09E4292C9}"/>
+              </a:ext>
+            </a:extLst>
+          </p:cNvPr>
+          <p:cNvSpPr txBox="1"/>
+          <p:nvPr/>
+        </p:nvSpPr>
+        <p:spPr>
+          <a:xfrm>
+            <a:off x="6290867" y="3217660"/>
+            <a:ext cx="210793" cy="461665"/>
+          </a:xfrm>
+          <a:prstGeom prst="rect">
+            <a:avLst/>
+          </a:prstGeom>
+          <a:noFill/>
+        </p:spPr>
+        <p:txBody>
+          <a:bodyPr wrap="square" rtlCol="0">
+            <a:spAutoFit/>
+          </a:bodyPr>
+          <a:lstStyle/>
+          <a:p>
+            <a:r>
+              <a:rPr lang="en-US" sz="2400" dirty="0"/>
+              <a:t>*</a:t>
+            </a:r>
+          </a:p>
+        </p:txBody>
+      </p:sp>
+      <p:sp>
+        <p:nvSpPr>
+          <p:cNvPr id="9" name="TextBox 8">
+            <a:extLst>
+              <a:ext uri="{FF2B5EF4-FFF2-40B4-BE49-F238E27FC236}">
+                <a16:creationId xmlns:a16="http://schemas.microsoft.com/office/drawing/2014/main" id="{96EDB5FA-C67D-43E3-858C-02410A2EDC62}"/>
+              </a:ext>
+            </a:extLst>
+          </p:cNvPr>
+          <p:cNvSpPr txBox="1"/>
+          <p:nvPr/>
+        </p:nvSpPr>
+        <p:spPr>
+          <a:xfrm>
+            <a:off x="6597650" y="3213100"/>
+            <a:ext cx="595496" cy="461665"/>
+          </a:xfrm>
+          <a:prstGeom prst="rect">
+            <a:avLst/>
+          </a:prstGeom>
+          <a:noFill/>
+        </p:spPr>
+        <p:txBody>
+          <a:bodyPr wrap="square" rtlCol="0">
+            <a:spAutoFit/>
+          </a:bodyPr>
+          <a:lstStyle/>
+          <a:p>
+            <a:r>
+              <a:rPr lang="en-US" sz="2400" dirty="0"/>
+              <a:t>**</a:t>
+            </a:r>
+          </a:p>
+        </p:txBody>
+      </p:sp>
+    </p:spTree>
+    <p:extLst>
+      <p:ext uri="{BB962C8B-B14F-4D97-AF65-F5344CB8AC3E}">
+        <p14:creationId xmlns:p14="http://schemas.microsoft.com/office/powerpoint/2010/main" val="766645426"/>
+      </p:ext>
+    </p:extLst>
+  </p:cSld>
+  <p:clrMapOvr>
+    <a:masterClrMapping/>
+  </p:clrMapOvr>
+</p:sld>
+</file>
+
+<file path=ppt/slides/slide12.xml><?xml version="1.0" encoding="utf-8"?>
+<p:sld xmlns:a="http://schemas.openxmlformats.org/drawingml/2006/main" xmlns:r="http://schemas.openxmlformats.org/officeDocument/2006/relationships" xmlns:p="http://schemas.openxmlformats.org/presentationml/2006/main">
+  <p:cSld>
+    <p:spTree>
+      <p:nvGrpSpPr>
+        <p:cNvPr id="1" name=""/>
+        <p:cNvGrpSpPr/>
+        <p:nvPr/>
+      </p:nvGrpSpPr>
+      <p:grpSpPr>
+        <a:xfrm>
+          <a:off x="0" y="0"/>
+          <a:ext cx="0" cy="0"/>
+          <a:chOff x="0" y="0"/>
+          <a:chExt cx="0" cy="0"/>
+        </a:xfrm>
+      </p:grpSpPr>
+      <p:grpSp>
+        <p:nvGrpSpPr>
+          <p:cNvPr id="2" name="Group 1">
+            <a:extLst>
+              <a:ext uri="{FF2B5EF4-FFF2-40B4-BE49-F238E27FC236}">
+                <a16:creationId xmlns:a16="http://schemas.microsoft.com/office/drawing/2014/main" id="{9274431A-7C27-4E6D-9433-C8D65C3C4882}"/>
+              </a:ext>
+            </a:extLst>
+          </p:cNvPr>
+          <p:cNvGrpSpPr/>
+          <p:nvPr/>
+        </p:nvGrpSpPr>
+        <p:grpSpPr>
+          <a:xfrm>
+            <a:off x="1371576" y="1142983"/>
+            <a:ext cx="6659770" cy="4572033"/>
+            <a:chOff x="1371576" y="1142983"/>
+            <a:chExt cx="6659770" cy="4572033"/>
+          </a:xfrm>
+        </p:grpSpPr>
+        <p:grpSp>
+          <p:nvGrpSpPr>
+            <p:cNvPr id="8" name="Group 7">
+              <a:extLst>
+                <a:ext uri="{FF2B5EF4-FFF2-40B4-BE49-F238E27FC236}">
+                  <a16:creationId xmlns:a16="http://schemas.microsoft.com/office/drawing/2014/main" id="{0B830333-7006-49FA-B522-A4E248BC8F16}"/>
+                </a:ext>
+              </a:extLst>
+            </p:cNvPr>
+            <p:cNvGrpSpPr/>
+            <p:nvPr/>
+          </p:nvGrpSpPr>
+          <p:grpSpPr>
+            <a:xfrm>
+              <a:off x="1371576" y="1142983"/>
+              <a:ext cx="6659770" cy="4572033"/>
+              <a:chOff x="1371576" y="1142983"/>
+              <a:chExt cx="6659770" cy="4572033"/>
+            </a:xfrm>
+          </p:grpSpPr>
+          <p:pic>
+            <p:nvPicPr>
+              <p:cNvPr id="5" name="Picture 4">
+                <a:extLst>
+                  <a:ext uri="{FF2B5EF4-FFF2-40B4-BE49-F238E27FC236}">
+                    <a16:creationId xmlns:a16="http://schemas.microsoft.com/office/drawing/2014/main" id="{B046A85E-4FF8-4145-8D38-522E28A66193}"/>
+                  </a:ext>
+                </a:extLst>
+              </p:cNvPr>
+              <p:cNvPicPr>
+                <a:picLocks noChangeAspect="1"/>
+              </p:cNvPicPr>
+              <p:nvPr/>
+            </p:nvPicPr>
+            <p:blipFill>
+              <a:blip r:embed="rId2">
+                <a:extLst>
+                  <a:ext uri="{28A0092B-C50C-407E-A947-70E740481C1C}">
+                    <a14:useLocalDpi xmlns:a14="http://schemas.microsoft.com/office/drawing/2010/main" val="0"/>
+                  </a:ext>
+                </a:extLst>
+              </a:blip>
+              <a:stretch>
+                <a:fillRect/>
+              </a:stretch>
+            </p:blipFill>
+            <p:spPr>
+              <a:xfrm>
+                <a:off x="1371576" y="1142983"/>
+                <a:ext cx="6400847" cy="4572033"/>
+              </a:xfrm>
+              <a:prstGeom prst="rect">
+                <a:avLst/>
+              </a:prstGeom>
+            </p:spPr>
+          </p:pic>
+          <p:sp>
+            <p:nvSpPr>
+              <p:cNvPr id="6" name="TextBox 5">
+                <a:extLst>
+                  <a:ext uri="{FF2B5EF4-FFF2-40B4-BE49-F238E27FC236}">
+                    <a16:creationId xmlns:a16="http://schemas.microsoft.com/office/drawing/2014/main" id="{F4174420-E48F-433D-967B-F39B7C3181CD}"/>
+                  </a:ext>
+                </a:extLst>
+              </p:cNvPr>
+              <p:cNvSpPr txBox="1"/>
+              <p:nvPr/>
+            </p:nvSpPr>
+            <p:spPr>
+              <a:xfrm>
+                <a:off x="7129067" y="2379460"/>
+                <a:ext cx="210793" cy="461665"/>
+              </a:xfrm>
+              <a:prstGeom prst="rect">
+                <a:avLst/>
+              </a:prstGeom>
+              <a:noFill/>
+            </p:spPr>
+            <p:txBody>
+              <a:bodyPr wrap="square" rtlCol="0">
+                <a:spAutoFit/>
+              </a:bodyPr>
+              <a:lstStyle/>
+              <a:p>
+                <a:r>
+                  <a:rPr lang="en-US" sz="2400" dirty="0"/>
+                  <a:t>*</a:t>
+                </a:r>
+              </a:p>
+            </p:txBody>
+          </p:sp>
+          <p:sp>
+            <p:nvSpPr>
+              <p:cNvPr id="7" name="TextBox 6">
+                <a:extLst>
+                  <a:ext uri="{FF2B5EF4-FFF2-40B4-BE49-F238E27FC236}">
+                    <a16:creationId xmlns:a16="http://schemas.microsoft.com/office/drawing/2014/main" id="{E57A9F4C-2F66-4B1B-8379-01AA98F989EB}"/>
+                  </a:ext>
+                </a:extLst>
+              </p:cNvPr>
+              <p:cNvSpPr txBox="1"/>
+              <p:nvPr/>
+            </p:nvSpPr>
+            <p:spPr>
+              <a:xfrm>
+                <a:off x="7435850" y="2374900"/>
+                <a:ext cx="595496" cy="461665"/>
+              </a:xfrm>
+              <a:prstGeom prst="rect">
+                <a:avLst/>
+              </a:prstGeom>
+              <a:noFill/>
+            </p:spPr>
+            <p:txBody>
+              <a:bodyPr wrap="square" rtlCol="0">
+                <a:spAutoFit/>
+              </a:bodyPr>
+              <a:lstStyle/>
+              <a:p>
+                <a:r>
+                  <a:rPr lang="en-US" sz="2400" dirty="0"/>
+                  <a:t>**</a:t>
+                </a:r>
+              </a:p>
+            </p:txBody>
+          </p:sp>
+        </p:grpSp>
+        <p:sp>
+          <p:nvSpPr>
+            <p:cNvPr id="9" name="TextBox 8">
+              <a:extLst>
+                <a:ext uri="{FF2B5EF4-FFF2-40B4-BE49-F238E27FC236}">
+                  <a16:creationId xmlns:a16="http://schemas.microsoft.com/office/drawing/2014/main" id="{42CFC26E-654A-4651-BC59-8B486D00CBD7}"/>
+                </a:ext>
+              </a:extLst>
+            </p:cNvPr>
+            <p:cNvSpPr txBox="1"/>
+            <p:nvPr/>
+          </p:nvSpPr>
+          <p:spPr>
+            <a:xfrm>
+              <a:off x="2070302" y="4307400"/>
+              <a:ext cx="4573590" cy="584775"/>
+            </a:xfrm>
+            <a:prstGeom prst="rect">
+              <a:avLst/>
+            </a:prstGeom>
+            <a:noFill/>
+          </p:spPr>
+          <p:txBody>
+            <a:bodyPr wrap="square">
+              <a:spAutoFit/>
+            </a:bodyPr>
+            <a:lstStyle/>
+            <a:p>
+              <a:r>
+                <a:rPr lang="en-US" sz="1600" dirty="0"/>
+                <a:t>  * p &lt; 0.05 </a:t>
+              </a:r>
+            </a:p>
+            <a:p>
+              <a:r>
+                <a:rPr lang="en-US" sz="1600" dirty="0"/>
+                <a:t>** p &lt; 0.01</a:t>
+              </a:r>
+            </a:p>
+          </p:txBody>
+        </p:sp>
+      </p:grpSp>
+    </p:spTree>
+    <p:extLst>
+      <p:ext uri="{BB962C8B-B14F-4D97-AF65-F5344CB8AC3E}">
+        <p14:creationId xmlns:p14="http://schemas.microsoft.com/office/powerpoint/2010/main" val="2164065618"/>
+      </p:ext>
+    </p:extLst>
+  </p:cSld>
+  <p:clrMapOvr>
+    <a:masterClrMapping/>
+  </p:clrMapOvr>
+</p:sld>
+</file>
+
+<file path=ppt/slides/slide13.xml><?xml version="1.0" encoding="utf-8"?>
+<p:sld xmlns:a="http://schemas.openxmlformats.org/drawingml/2006/main" xmlns:r="http://schemas.openxmlformats.org/officeDocument/2006/relationships" xmlns:p="http://schemas.openxmlformats.org/presentationml/2006/main">
+  <p:cSld>
+    <p:spTree>
+      <p:nvGrpSpPr>
+        <p:cNvPr id="1" name=""/>
+        <p:cNvGrpSpPr/>
+        <p:nvPr/>
+      </p:nvGrpSpPr>
+      <p:grpSpPr>
+        <a:xfrm>
+          <a:off x="0" y="0"/>
+          <a:ext cx="0" cy="0"/>
+          <a:chOff x="0" y="0"/>
+          <a:chExt cx="0" cy="0"/>
+        </a:xfrm>
+      </p:grpSpPr>
+      <p:pic>
+        <p:nvPicPr>
+          <p:cNvPr id="3" name="Picture 2">
+            <a:extLst>
+              <a:ext uri="{FF2B5EF4-FFF2-40B4-BE49-F238E27FC236}">
+                <a16:creationId xmlns:a16="http://schemas.microsoft.com/office/drawing/2014/main" id="{9F907D78-6977-44C0-A857-C10FDEA4DBF2}"/>
+              </a:ext>
+            </a:extLst>
+          </p:cNvPr>
+          <p:cNvPicPr>
+            <a:picLocks noChangeAspect="1"/>
+          </p:cNvPicPr>
+          <p:nvPr/>
+        </p:nvPicPr>
+        <p:blipFill>
+          <a:blip r:embed="rId2">
+            <a:extLst>
+              <a:ext uri="{28A0092B-C50C-407E-A947-70E740481C1C}">
+                <a14:useLocalDpi xmlns:a14="http://schemas.microsoft.com/office/drawing/2010/main" val="0"/>
+              </a:ext>
+            </a:extLst>
+          </a:blip>
+          <a:stretch>
+            <a:fillRect/>
+          </a:stretch>
+        </p:blipFill>
+        <p:spPr>
+          <a:xfrm>
+            <a:off x="546899" y="876284"/>
+            <a:ext cx="4229124" cy="3020802"/>
+          </a:xfrm>
+          <a:prstGeom prst="rect">
+            <a:avLst/>
+          </a:prstGeom>
+        </p:spPr>
+      </p:pic>
+      <p:pic>
+        <p:nvPicPr>
+          <p:cNvPr id="5" name="Picture 4">
+            <a:extLst>
+              <a:ext uri="{FF2B5EF4-FFF2-40B4-BE49-F238E27FC236}">
+                <a16:creationId xmlns:a16="http://schemas.microsoft.com/office/drawing/2014/main" id="{86748CE2-E41C-4689-8DE6-4F1422CD49C0}"/>
+              </a:ext>
+            </a:extLst>
+          </p:cNvPr>
+          <p:cNvPicPr>
+            <a:picLocks noChangeAspect="1"/>
+          </p:cNvPicPr>
+          <p:nvPr/>
+        </p:nvPicPr>
+        <p:blipFill>
+          <a:blip r:embed="rId3">
+            <a:extLst>
+              <a:ext uri="{28A0092B-C50C-407E-A947-70E740481C1C}">
+                <a14:useLocalDpi xmlns:a14="http://schemas.microsoft.com/office/drawing/2010/main" val="0"/>
+              </a:ext>
+            </a:extLst>
+          </a:blip>
+          <a:srcRect/>
+          <a:stretch/>
+        </p:blipFill>
+        <p:spPr>
+          <a:xfrm>
+            <a:off x="561204" y="3441765"/>
+            <a:ext cx="4239755" cy="2675234"/>
+          </a:xfrm>
+          <a:prstGeom prst="rect">
+            <a:avLst/>
+          </a:prstGeom>
+        </p:spPr>
+      </p:pic>
+      <p:pic>
+        <p:nvPicPr>
+          <p:cNvPr id="7" name="Picture 6">
+            <a:extLst>
+              <a:ext uri="{FF2B5EF4-FFF2-40B4-BE49-F238E27FC236}">
+                <a16:creationId xmlns:a16="http://schemas.microsoft.com/office/drawing/2014/main" id="{19CD9B63-19A6-44E6-A10A-8BF15C1C2829}"/>
+              </a:ext>
+            </a:extLst>
+          </p:cNvPr>
+          <p:cNvPicPr>
+            <a:picLocks noChangeAspect="1"/>
+          </p:cNvPicPr>
+          <p:nvPr/>
+        </p:nvPicPr>
+        <p:blipFill>
+          <a:blip r:embed="rId4">
+            <a:extLst>
+              <a:ext uri="{28A0092B-C50C-407E-A947-70E740481C1C}">
+                <a14:useLocalDpi xmlns:a14="http://schemas.microsoft.com/office/drawing/2010/main" val="0"/>
+              </a:ext>
+            </a:extLst>
+          </a:blip>
+          <a:stretch>
+            <a:fillRect/>
+          </a:stretch>
+        </p:blipFill>
+        <p:spPr>
+          <a:xfrm>
+            <a:off x="4778230" y="883658"/>
+            <a:ext cx="4151940" cy="2965671"/>
+          </a:xfrm>
+          <a:prstGeom prst="rect">
+            <a:avLst/>
+          </a:prstGeom>
+        </p:spPr>
+      </p:pic>
+      <p:pic>
+        <p:nvPicPr>
+          <p:cNvPr id="4" name="Picture 3">
+            <a:extLst>
+              <a:ext uri="{FF2B5EF4-FFF2-40B4-BE49-F238E27FC236}">
+                <a16:creationId xmlns:a16="http://schemas.microsoft.com/office/drawing/2014/main" id="{9DE470CA-A893-4CDB-9D9F-7122BF2BB1B9}"/>
+              </a:ext>
+            </a:extLst>
+          </p:cNvPr>
+          <p:cNvPicPr>
+            <a:picLocks noChangeAspect="1"/>
+          </p:cNvPicPr>
+          <p:nvPr/>
+        </p:nvPicPr>
+        <p:blipFill>
+          <a:blip r:embed="rId5">
+            <a:extLst>
+              <a:ext uri="{28A0092B-C50C-407E-A947-70E740481C1C}">
+                <a14:useLocalDpi xmlns:a14="http://schemas.microsoft.com/office/drawing/2010/main" val="0"/>
+              </a:ext>
+            </a:extLst>
+          </a:blip>
+          <a:stretch>
+            <a:fillRect/>
+          </a:stretch>
+        </p:blipFill>
+        <p:spPr>
+          <a:xfrm>
+            <a:off x="4784413" y="3439753"/>
+            <a:ext cx="4191182" cy="2633203"/>
+          </a:xfrm>
+          <a:prstGeom prst="rect">
+            <a:avLst/>
+          </a:prstGeom>
+        </p:spPr>
+      </p:pic>
+    </p:spTree>
+    <p:extLst>
+      <p:ext uri="{BB962C8B-B14F-4D97-AF65-F5344CB8AC3E}">
+        <p14:creationId xmlns:p14="http://schemas.microsoft.com/office/powerpoint/2010/main" val="762113212"/>
+      </p:ext>
+    </p:extLst>
+  </p:cSld>
+  <p:clrMapOvr>
+    <a:masterClrMapping/>
+  </p:clrMapOvr>
+</p:sld>
+</file>
+
+<file path=ppt/slides/slide14.xml><?xml version="1.0" encoding="utf-8"?>
+<p:sld xmlns:a="http://schemas.openxmlformats.org/drawingml/2006/main" xmlns:r="http://schemas.openxmlformats.org/officeDocument/2006/relationships" xmlns:p="http://schemas.openxmlformats.org/presentationml/2006/main">
+  <p:cSld>
+    <p:spTree>
+      <p:nvGrpSpPr>
+        <p:cNvPr id="1" name=""/>
+        <p:cNvGrpSpPr/>
+        <p:nvPr/>
+      </p:nvGrpSpPr>
+      <p:grpSpPr>
+        <a:xfrm>
+          <a:off x="0" y="0"/>
+          <a:ext cx="0" cy="0"/>
+          <a:chOff x="0" y="0"/>
+          <a:chExt cx="0" cy="0"/>
+        </a:xfrm>
+      </p:grpSpPr>
+      <p:grpSp>
+        <p:nvGrpSpPr>
+          <p:cNvPr id="7" name="Group 6">
+            <a:extLst>
+              <a:ext uri="{FF2B5EF4-FFF2-40B4-BE49-F238E27FC236}">
+                <a16:creationId xmlns:a16="http://schemas.microsoft.com/office/drawing/2014/main" id="{41AF362E-E6E4-4D43-9EEE-C4B88B9413EF}"/>
+              </a:ext>
+            </a:extLst>
+          </p:cNvPr>
+          <p:cNvGrpSpPr/>
+          <p:nvPr/>
+        </p:nvGrpSpPr>
+        <p:grpSpPr>
+          <a:xfrm>
+            <a:off x="926065" y="95799"/>
+            <a:ext cx="3051848" cy="6586576"/>
+            <a:chOff x="926065" y="95799"/>
+            <a:chExt cx="3051848" cy="6586576"/>
+          </a:xfrm>
+        </p:grpSpPr>
+        <p:grpSp>
+          <p:nvGrpSpPr>
+            <p:cNvPr id="22" name="Group 21">
+              <a:extLst>
+                <a:ext uri="{FF2B5EF4-FFF2-40B4-BE49-F238E27FC236}">
+                  <a16:creationId xmlns:a16="http://schemas.microsoft.com/office/drawing/2014/main" id="{957B23E6-662B-46EB-AF7A-CCEB1A708211}"/>
+                </a:ext>
+              </a:extLst>
+            </p:cNvPr>
+            <p:cNvGrpSpPr/>
+            <p:nvPr/>
+          </p:nvGrpSpPr>
+          <p:grpSpPr>
+            <a:xfrm>
+              <a:off x="926065" y="95799"/>
+              <a:ext cx="3032587" cy="6586576"/>
+              <a:chOff x="926065" y="95799"/>
+              <a:chExt cx="3032587" cy="6586576"/>
+            </a:xfrm>
+          </p:grpSpPr>
+          <p:grpSp>
+            <p:nvGrpSpPr>
+              <p:cNvPr id="10" name="Group 9">
+                <a:extLst>
+                  <a:ext uri="{FF2B5EF4-FFF2-40B4-BE49-F238E27FC236}">
+                    <a16:creationId xmlns:a16="http://schemas.microsoft.com/office/drawing/2014/main" id="{1360340D-5794-4B45-8E61-0231188D6F41}"/>
+                  </a:ext>
+                </a:extLst>
+              </p:cNvPr>
+              <p:cNvGrpSpPr/>
+              <p:nvPr/>
+            </p:nvGrpSpPr>
+            <p:grpSpPr>
+              <a:xfrm>
+                <a:off x="926065" y="95799"/>
+                <a:ext cx="3032587" cy="6586576"/>
+                <a:chOff x="926065" y="95799"/>
+                <a:chExt cx="3032587" cy="6586576"/>
+              </a:xfrm>
+            </p:grpSpPr>
+            <p:pic>
+              <p:nvPicPr>
+                <p:cNvPr id="3" name="Picture 2">
+                  <a:extLst>
+                    <a:ext uri="{FF2B5EF4-FFF2-40B4-BE49-F238E27FC236}">
+                      <a16:creationId xmlns:a16="http://schemas.microsoft.com/office/drawing/2014/main" id="{9F907D78-6977-44C0-A857-C10FDEA4DBF2}"/>
+                    </a:ext>
+                  </a:extLst>
+                </p:cNvPr>
+                <p:cNvPicPr>
+                  <a:picLocks noChangeAspect="1"/>
+                </p:cNvPicPr>
+                <p:nvPr/>
+              </p:nvPicPr>
+              <p:blipFill>
+                <a:blip r:embed="rId2">
+                  <a:extLst>
+                    <a:ext uri="{28A0092B-C50C-407E-A947-70E740481C1C}">
+                      <a14:useLocalDpi xmlns:a14="http://schemas.microsoft.com/office/drawing/2010/main" val="0"/>
+                    </a:ext>
+                  </a:extLst>
+                </a:blip>
+                <a:stretch>
+                  <a:fillRect/>
+                </a:stretch>
+              </p:blipFill>
+              <p:spPr>
+                <a:xfrm>
+                  <a:off x="926065" y="95799"/>
+                  <a:ext cx="3019487" cy="2156776"/>
+                </a:xfrm>
+                <a:prstGeom prst="rect">
+                  <a:avLst/>
+                </a:prstGeom>
+              </p:spPr>
+            </p:pic>
+            <p:pic>
+              <p:nvPicPr>
+                <p:cNvPr id="5" name="Picture 4">
+                  <a:extLst>
+                    <a:ext uri="{FF2B5EF4-FFF2-40B4-BE49-F238E27FC236}">
+                      <a16:creationId xmlns:a16="http://schemas.microsoft.com/office/drawing/2014/main" id="{86748CE2-E41C-4689-8DE6-4F1422CD49C0}"/>
+                    </a:ext>
+                  </a:extLst>
+                </p:cNvPr>
+                <p:cNvPicPr>
+                  <a:picLocks noChangeAspect="1"/>
+                </p:cNvPicPr>
+                <p:nvPr/>
+              </p:nvPicPr>
+              <p:blipFill>
+                <a:blip r:embed="rId3">
+                  <a:extLst>
+                    <a:ext uri="{28A0092B-C50C-407E-A947-70E740481C1C}">
+                      <a14:useLocalDpi xmlns:a14="http://schemas.microsoft.com/office/drawing/2010/main" val="0"/>
+                    </a:ext>
+                  </a:extLst>
+                </a:blip>
+                <a:srcRect/>
+                <a:stretch/>
+              </p:blipFill>
+              <p:spPr>
+                <a:xfrm>
+                  <a:off x="937993" y="1908694"/>
+                  <a:ext cx="3020659" cy="1905999"/>
+                </a:xfrm>
+                <a:prstGeom prst="rect">
+                  <a:avLst/>
+                </a:prstGeom>
+              </p:spPr>
+            </p:pic>
+            <p:pic>
+              <p:nvPicPr>
+                <p:cNvPr id="6" name="Picture 5">
+                  <a:extLst>
+                    <a:ext uri="{FF2B5EF4-FFF2-40B4-BE49-F238E27FC236}">
+                      <a16:creationId xmlns:a16="http://schemas.microsoft.com/office/drawing/2014/main" id="{FB191296-0010-4C17-8CA5-C31068A0B320}"/>
+                    </a:ext>
+                  </a:extLst>
+                </p:cNvPr>
+                <p:cNvPicPr>
+                  <a:picLocks noChangeAspect="1"/>
+                </p:cNvPicPr>
+                <p:nvPr/>
+              </p:nvPicPr>
+              <p:blipFill>
+                <a:blip r:embed="rId4">
+                  <a:extLst>
+                    <a:ext uri="{28A0092B-C50C-407E-A947-70E740481C1C}">
+                      <a14:useLocalDpi xmlns:a14="http://schemas.microsoft.com/office/drawing/2010/main" val="0"/>
+                    </a:ext>
+                  </a:extLst>
+                </a:blip>
+                <a:stretch>
+                  <a:fillRect/>
+                </a:stretch>
+              </p:blipFill>
+              <p:spPr>
+                <a:xfrm>
+                  <a:off x="1195731" y="3475934"/>
+                  <a:ext cx="2757774" cy="1736758"/>
+                </a:xfrm>
+                <a:prstGeom prst="rect">
+                  <a:avLst/>
+                </a:prstGeom>
+              </p:spPr>
+            </p:pic>
+            <p:pic>
+              <p:nvPicPr>
+                <p:cNvPr id="9" name="Picture 8">
+                  <a:extLst>
+                    <a:ext uri="{FF2B5EF4-FFF2-40B4-BE49-F238E27FC236}">
+                      <a16:creationId xmlns:a16="http://schemas.microsoft.com/office/drawing/2014/main" id="{6F8E4D96-3AE2-46D2-A28A-2E2581237F4F}"/>
+                    </a:ext>
+                  </a:extLst>
+                </p:cNvPr>
+                <p:cNvPicPr>
+                  <a:picLocks noChangeAspect="1"/>
+                </p:cNvPicPr>
+                <p:nvPr/>
+              </p:nvPicPr>
+              <p:blipFill>
+                <a:blip r:embed="rId5">
+                  <a:extLst>
+                    <a:ext uri="{28A0092B-C50C-407E-A947-70E740481C1C}">
+                      <a14:useLocalDpi xmlns:a14="http://schemas.microsoft.com/office/drawing/2010/main" val="0"/>
+                    </a:ext>
+                  </a:extLst>
+                </a:blip>
+                <a:stretch>
+                  <a:fillRect/>
+                </a:stretch>
+              </p:blipFill>
+              <p:spPr>
+                <a:xfrm>
+                  <a:off x="1169343" y="4940189"/>
+                  <a:ext cx="2757774" cy="1742186"/>
+                </a:xfrm>
+                <a:prstGeom prst="rect">
+                  <a:avLst/>
+                </a:prstGeom>
+              </p:spPr>
+            </p:pic>
+          </p:grpSp>
+          <p:sp>
+            <p:nvSpPr>
+              <p:cNvPr id="11" name="TextBox 10">
+                <a:extLst>
+                  <a:ext uri="{FF2B5EF4-FFF2-40B4-BE49-F238E27FC236}">
+                    <a16:creationId xmlns:a16="http://schemas.microsoft.com/office/drawing/2014/main" id="{8F1264D9-58C7-4BFD-A5A5-84999FB39EBF}"/>
+                  </a:ext>
+                </a:extLst>
+              </p:cNvPr>
+              <p:cNvSpPr txBox="1"/>
+              <p:nvPr/>
+            </p:nvSpPr>
+            <p:spPr>
+              <a:xfrm>
+                <a:off x="3600061" y="758027"/>
+                <a:ext cx="210793" cy="307777"/>
+              </a:xfrm>
+              <a:prstGeom prst="rect">
+                <a:avLst/>
+              </a:prstGeom>
+              <a:noFill/>
+            </p:spPr>
+            <p:txBody>
+              <a:bodyPr wrap="square" rtlCol="0">
+                <a:spAutoFit/>
+              </a:bodyPr>
+              <a:lstStyle/>
+              <a:p>
+                <a:r>
+                  <a:rPr lang="en-US" sz="1400" dirty="0"/>
+                  <a:t>*</a:t>
+                </a:r>
+              </a:p>
+            </p:txBody>
+          </p:sp>
+          <p:sp>
+            <p:nvSpPr>
+              <p:cNvPr id="12" name="TextBox 11">
+                <a:extLst>
+                  <a:ext uri="{FF2B5EF4-FFF2-40B4-BE49-F238E27FC236}">
+                    <a16:creationId xmlns:a16="http://schemas.microsoft.com/office/drawing/2014/main" id="{69193975-3DEB-48AD-9BDB-F40B75202302}"/>
+                  </a:ext>
+                </a:extLst>
+              </p:cNvPr>
+              <p:cNvSpPr txBox="1"/>
+              <p:nvPr/>
+            </p:nvSpPr>
+            <p:spPr>
+              <a:xfrm>
+                <a:off x="3731275" y="723302"/>
+                <a:ext cx="210793" cy="307777"/>
+              </a:xfrm>
+              <a:prstGeom prst="rect">
+                <a:avLst/>
+              </a:prstGeom>
+              <a:noFill/>
+            </p:spPr>
+            <p:txBody>
+              <a:bodyPr wrap="square" rtlCol="0">
+                <a:spAutoFit/>
+              </a:bodyPr>
+              <a:lstStyle/>
+              <a:p>
+                <a:r>
+                  <a:rPr lang="en-US" sz="1400" dirty="0"/>
+                  <a:t>*</a:t>
+                </a:r>
+              </a:p>
+            </p:txBody>
+          </p:sp>
+          <p:sp>
+            <p:nvSpPr>
+              <p:cNvPr id="13" name="TextBox 12">
+                <a:extLst>
+                  <a:ext uri="{FF2B5EF4-FFF2-40B4-BE49-F238E27FC236}">
+                    <a16:creationId xmlns:a16="http://schemas.microsoft.com/office/drawing/2014/main" id="{6398AA2B-5507-40BE-90BA-8541390A8AE2}"/>
+                  </a:ext>
+                </a:extLst>
+              </p:cNvPr>
+              <p:cNvSpPr txBox="1"/>
+              <p:nvPr/>
+            </p:nvSpPr>
+            <p:spPr>
+              <a:xfrm>
+                <a:off x="3135195" y="833330"/>
+                <a:ext cx="210793" cy="307777"/>
+              </a:xfrm>
+              <a:prstGeom prst="rect">
+                <a:avLst/>
+              </a:prstGeom>
+              <a:noFill/>
+            </p:spPr>
+            <p:txBody>
+              <a:bodyPr wrap="square" rtlCol="0">
+                <a:spAutoFit/>
+              </a:bodyPr>
+              <a:lstStyle/>
+              <a:p>
+                <a:r>
+                  <a:rPr lang="en-US" sz="1400" dirty="0"/>
+                  <a:t>*</a:t>
+                </a:r>
+              </a:p>
+            </p:txBody>
+          </p:sp>
+          <p:sp>
+            <p:nvSpPr>
+              <p:cNvPr id="14" name="TextBox 13">
+                <a:extLst>
+                  <a:ext uri="{FF2B5EF4-FFF2-40B4-BE49-F238E27FC236}">
+                    <a16:creationId xmlns:a16="http://schemas.microsoft.com/office/drawing/2014/main" id="{98D570A2-36E3-4C3E-AD99-081F75B803D8}"/>
+                  </a:ext>
+                </a:extLst>
+              </p:cNvPr>
+              <p:cNvSpPr txBox="1"/>
+              <p:nvPr/>
+            </p:nvSpPr>
+            <p:spPr>
+              <a:xfrm>
+                <a:off x="3480601" y="1902499"/>
+                <a:ext cx="210793" cy="307777"/>
+              </a:xfrm>
+              <a:prstGeom prst="rect">
+                <a:avLst/>
+              </a:prstGeom>
+              <a:noFill/>
+            </p:spPr>
+            <p:txBody>
+              <a:bodyPr wrap="square" rtlCol="0">
+                <a:spAutoFit/>
+              </a:bodyPr>
+              <a:lstStyle/>
+              <a:p>
+                <a:r>
+                  <a:rPr lang="en-US" sz="1400" dirty="0"/>
+                  <a:t>*</a:t>
+                </a:r>
+              </a:p>
+            </p:txBody>
+          </p:sp>
+          <p:sp>
+            <p:nvSpPr>
+              <p:cNvPr id="15" name="TextBox 14">
+                <a:extLst>
+                  <a:ext uri="{FF2B5EF4-FFF2-40B4-BE49-F238E27FC236}">
+                    <a16:creationId xmlns:a16="http://schemas.microsoft.com/office/drawing/2014/main" id="{BECF8610-DB82-4011-8E9A-36B1BB0D2142}"/>
+                  </a:ext>
+                </a:extLst>
+              </p:cNvPr>
+              <p:cNvSpPr txBox="1"/>
+              <p:nvPr/>
+            </p:nvSpPr>
+            <p:spPr>
+              <a:xfrm>
+                <a:off x="1945990" y="5434181"/>
+                <a:ext cx="210793" cy="307777"/>
+              </a:xfrm>
+              <a:prstGeom prst="rect">
+                <a:avLst/>
+              </a:prstGeom>
+              <a:noFill/>
+            </p:spPr>
+            <p:txBody>
+              <a:bodyPr wrap="square" rtlCol="0">
+                <a:spAutoFit/>
+              </a:bodyPr>
+              <a:lstStyle/>
+              <a:p>
+                <a:r>
+                  <a:rPr lang="en-US" sz="1400" dirty="0"/>
+                  <a:t>*</a:t>
+                </a:r>
+              </a:p>
+            </p:txBody>
+          </p:sp>
+          <p:sp>
+            <p:nvSpPr>
+              <p:cNvPr id="16" name="TextBox 15">
+                <a:extLst>
+                  <a:ext uri="{FF2B5EF4-FFF2-40B4-BE49-F238E27FC236}">
+                    <a16:creationId xmlns:a16="http://schemas.microsoft.com/office/drawing/2014/main" id="{E880AFC4-706A-4437-8B28-F391424C0A77}"/>
+                  </a:ext>
+                </a:extLst>
+              </p:cNvPr>
+              <p:cNvSpPr txBox="1"/>
+              <p:nvPr/>
+            </p:nvSpPr>
+            <p:spPr>
+              <a:xfrm>
+                <a:off x="2864511" y="5237039"/>
+                <a:ext cx="210793" cy="307777"/>
+              </a:xfrm>
+              <a:prstGeom prst="rect">
+                <a:avLst/>
+              </a:prstGeom>
+              <a:noFill/>
+            </p:spPr>
+            <p:txBody>
+              <a:bodyPr wrap="square" rtlCol="0">
+                <a:spAutoFit/>
+              </a:bodyPr>
+              <a:lstStyle/>
+              <a:p>
+                <a:r>
+                  <a:rPr lang="en-US" sz="1400" dirty="0"/>
+                  <a:t>*</a:t>
+                </a:r>
+              </a:p>
+            </p:txBody>
+          </p:sp>
+          <p:sp>
+            <p:nvSpPr>
+              <p:cNvPr id="17" name="TextBox 16">
+                <a:extLst>
+                  <a:ext uri="{FF2B5EF4-FFF2-40B4-BE49-F238E27FC236}">
+                    <a16:creationId xmlns:a16="http://schemas.microsoft.com/office/drawing/2014/main" id="{DFDEB025-D240-468B-979B-A0CA7B641919}"/>
+                  </a:ext>
+                </a:extLst>
+              </p:cNvPr>
+              <p:cNvSpPr txBox="1"/>
+              <p:nvPr/>
+            </p:nvSpPr>
+            <p:spPr>
+              <a:xfrm>
+                <a:off x="2974539" y="5198786"/>
+                <a:ext cx="210793" cy="307777"/>
+              </a:xfrm>
+              <a:prstGeom prst="rect">
+                <a:avLst/>
+              </a:prstGeom>
+              <a:noFill/>
+            </p:spPr>
+            <p:txBody>
+              <a:bodyPr wrap="square" rtlCol="0">
+                <a:spAutoFit/>
+              </a:bodyPr>
+              <a:lstStyle/>
+              <a:p>
+                <a:r>
+                  <a:rPr lang="en-US" sz="1400" dirty="0"/>
+                  <a:t>*</a:t>
+                </a:r>
+              </a:p>
+            </p:txBody>
+          </p:sp>
+          <p:sp>
+            <p:nvSpPr>
+              <p:cNvPr id="18" name="TextBox 17">
+                <a:extLst>
+                  <a:ext uri="{FF2B5EF4-FFF2-40B4-BE49-F238E27FC236}">
+                    <a16:creationId xmlns:a16="http://schemas.microsoft.com/office/drawing/2014/main" id="{EBDA7222-562D-4C85-A34C-4D318D609F00}"/>
+                  </a:ext>
+                </a:extLst>
+              </p:cNvPr>
+              <p:cNvSpPr txBox="1"/>
+              <p:nvPr/>
+            </p:nvSpPr>
+            <p:spPr>
+              <a:xfrm>
+                <a:off x="3123408" y="5079339"/>
+                <a:ext cx="210793" cy="307777"/>
+              </a:xfrm>
+              <a:prstGeom prst="rect">
+                <a:avLst/>
+              </a:prstGeom>
+              <a:noFill/>
+            </p:spPr>
+            <p:txBody>
+              <a:bodyPr wrap="square" rtlCol="0">
+                <a:spAutoFit/>
+              </a:bodyPr>
+              <a:lstStyle/>
+              <a:p>
+                <a:r>
+                  <a:rPr lang="en-US" sz="1400" dirty="0"/>
+                  <a:t>*</a:t>
+                </a:r>
+              </a:p>
+            </p:txBody>
+          </p:sp>
+          <p:sp>
+            <p:nvSpPr>
+              <p:cNvPr id="19" name="TextBox 18">
+                <a:extLst>
+                  <a:ext uri="{FF2B5EF4-FFF2-40B4-BE49-F238E27FC236}">
+                    <a16:creationId xmlns:a16="http://schemas.microsoft.com/office/drawing/2014/main" id="{A48A4536-D18A-4A2A-8AA3-C1961EC15192}"/>
+                  </a:ext>
+                </a:extLst>
+              </p:cNvPr>
+              <p:cNvSpPr txBox="1"/>
+              <p:nvPr/>
+            </p:nvSpPr>
+            <p:spPr>
+              <a:xfrm>
+                <a:off x="3445275" y="5221146"/>
+                <a:ext cx="210793" cy="307777"/>
+              </a:xfrm>
+              <a:prstGeom prst="rect">
+                <a:avLst/>
+              </a:prstGeom>
+              <a:noFill/>
+            </p:spPr>
+            <p:txBody>
+              <a:bodyPr wrap="square" rtlCol="0">
+                <a:spAutoFit/>
+              </a:bodyPr>
+              <a:lstStyle/>
+              <a:p>
+                <a:r>
+                  <a:rPr lang="en-US" sz="1400" dirty="0"/>
+                  <a:t>*</a:t>
+                </a:r>
+              </a:p>
+            </p:txBody>
+          </p:sp>
+          <p:sp>
+            <p:nvSpPr>
+              <p:cNvPr id="20" name="TextBox 19">
+                <a:extLst>
+                  <a:ext uri="{FF2B5EF4-FFF2-40B4-BE49-F238E27FC236}">
+                    <a16:creationId xmlns:a16="http://schemas.microsoft.com/office/drawing/2014/main" id="{84A1DD7B-9796-4A7E-BB49-AFFBBF719701}"/>
+                  </a:ext>
+                </a:extLst>
+              </p:cNvPr>
+              <p:cNvSpPr txBox="1"/>
+              <p:nvPr/>
+            </p:nvSpPr>
+            <p:spPr>
+              <a:xfrm>
+                <a:off x="3572958" y="5115810"/>
+                <a:ext cx="210793" cy="307777"/>
+              </a:xfrm>
+              <a:prstGeom prst="rect">
+                <a:avLst/>
+              </a:prstGeom>
+              <a:noFill/>
+            </p:spPr>
+            <p:txBody>
+              <a:bodyPr wrap="square" rtlCol="0">
+                <a:spAutoFit/>
+              </a:bodyPr>
+              <a:lstStyle/>
+              <a:p>
+                <a:r>
+                  <a:rPr lang="en-US" sz="1400" dirty="0"/>
+                  <a:t>*</a:t>
+                </a:r>
+              </a:p>
+            </p:txBody>
+          </p:sp>
+          <p:sp>
+            <p:nvSpPr>
+              <p:cNvPr id="21" name="TextBox 20">
+                <a:extLst>
+                  <a:ext uri="{FF2B5EF4-FFF2-40B4-BE49-F238E27FC236}">
+                    <a16:creationId xmlns:a16="http://schemas.microsoft.com/office/drawing/2014/main" id="{5F2A3DEF-A167-4503-B84A-F381C9D811E0}"/>
+                  </a:ext>
+                </a:extLst>
+              </p:cNvPr>
+              <p:cNvSpPr txBox="1"/>
+              <p:nvPr/>
+            </p:nvSpPr>
+            <p:spPr>
+              <a:xfrm>
+                <a:off x="3707130" y="4918095"/>
+                <a:ext cx="210793" cy="307777"/>
+              </a:xfrm>
+              <a:prstGeom prst="rect">
+                <a:avLst/>
+              </a:prstGeom>
+              <a:noFill/>
+            </p:spPr>
+            <p:txBody>
+              <a:bodyPr wrap="square" rtlCol="0">
+                <a:spAutoFit/>
+              </a:bodyPr>
+              <a:lstStyle/>
+              <a:p>
+                <a:r>
+                  <a:rPr lang="en-US" sz="1400" dirty="0"/>
+                  <a:t>*</a:t>
+                </a:r>
+              </a:p>
+            </p:txBody>
+          </p:sp>
+        </p:grpSp>
+        <p:sp>
+          <p:nvSpPr>
+            <p:cNvPr id="23" name="TextBox 22">
+              <a:extLst>
+                <a:ext uri="{FF2B5EF4-FFF2-40B4-BE49-F238E27FC236}">
+                  <a16:creationId xmlns:a16="http://schemas.microsoft.com/office/drawing/2014/main" id="{F51211AD-F2FB-4C5F-82D1-C01E722A8EA0}"/>
+                </a:ext>
+              </a:extLst>
+            </p:cNvPr>
+            <p:cNvSpPr txBox="1"/>
+            <p:nvPr/>
+          </p:nvSpPr>
+          <p:spPr>
+            <a:xfrm>
+              <a:off x="1573821" y="310792"/>
+              <a:ext cx="210793" cy="307777"/>
+            </a:xfrm>
+            <a:prstGeom prst="rect">
+              <a:avLst/>
+            </a:prstGeom>
+            <a:noFill/>
+          </p:spPr>
+          <p:txBody>
+            <a:bodyPr wrap="square" rtlCol="0">
+              <a:spAutoFit/>
+            </a:bodyPr>
+            <a:lstStyle/>
+            <a:p>
+              <a:r>
+                <a:rPr lang="en-US" sz="1400" dirty="0"/>
+                <a:t>A</a:t>
+              </a:r>
+            </a:p>
+          </p:txBody>
+        </p:sp>
+        <p:sp>
+          <p:nvSpPr>
+            <p:cNvPr id="24" name="TextBox 23">
+              <a:extLst>
+                <a:ext uri="{FF2B5EF4-FFF2-40B4-BE49-F238E27FC236}">
+                  <a16:creationId xmlns:a16="http://schemas.microsoft.com/office/drawing/2014/main" id="{7F4C0481-C375-4BBD-8662-E476D2625AAE}"/>
+                </a:ext>
+              </a:extLst>
+            </p:cNvPr>
+            <p:cNvSpPr txBox="1"/>
+            <p:nvPr/>
+          </p:nvSpPr>
+          <p:spPr>
+            <a:xfrm>
+              <a:off x="1571165" y="1922270"/>
+              <a:ext cx="210793" cy="307777"/>
+            </a:xfrm>
+            <a:prstGeom prst="rect">
+              <a:avLst/>
+            </a:prstGeom>
+            <a:noFill/>
+          </p:spPr>
+          <p:txBody>
+            <a:bodyPr wrap="square" rtlCol="0">
+              <a:spAutoFit/>
+            </a:bodyPr>
+            <a:lstStyle/>
+            <a:p>
+              <a:r>
+                <a:rPr lang="en-US" sz="1400" dirty="0"/>
+                <a:t>B</a:t>
+              </a:r>
+            </a:p>
+          </p:txBody>
+        </p:sp>
+        <p:sp>
+          <p:nvSpPr>
+            <p:cNvPr id="25" name="TextBox 24">
+              <a:extLst>
+                <a:ext uri="{FF2B5EF4-FFF2-40B4-BE49-F238E27FC236}">
+                  <a16:creationId xmlns:a16="http://schemas.microsoft.com/office/drawing/2014/main" id="{7DC1C9DA-C6EB-4E8D-BA73-90FAEBB3BFC5}"/>
+                </a:ext>
+              </a:extLst>
+            </p:cNvPr>
+            <p:cNvSpPr txBox="1"/>
+            <p:nvPr/>
+          </p:nvSpPr>
+          <p:spPr>
+            <a:xfrm>
+              <a:off x="1580439" y="3434361"/>
+              <a:ext cx="210793" cy="307777"/>
+            </a:xfrm>
+            <a:prstGeom prst="rect">
+              <a:avLst/>
+            </a:prstGeom>
+            <a:noFill/>
+          </p:spPr>
+          <p:txBody>
+            <a:bodyPr wrap="square" rtlCol="0">
+              <a:spAutoFit/>
+            </a:bodyPr>
+            <a:lstStyle/>
+            <a:p>
+              <a:r>
+                <a:rPr lang="en-US" sz="1400" dirty="0"/>
+                <a:t>C</a:t>
+              </a:r>
+            </a:p>
+          </p:txBody>
+        </p:sp>
+        <p:sp>
+          <p:nvSpPr>
+            <p:cNvPr id="26" name="TextBox 25">
+              <a:extLst>
+                <a:ext uri="{FF2B5EF4-FFF2-40B4-BE49-F238E27FC236}">
+                  <a16:creationId xmlns:a16="http://schemas.microsoft.com/office/drawing/2014/main" id="{2A05099D-25A7-4383-BE5E-F76EA545FA44}"/>
+                </a:ext>
+              </a:extLst>
+            </p:cNvPr>
+            <p:cNvSpPr txBox="1"/>
+            <p:nvPr/>
+          </p:nvSpPr>
+          <p:spPr>
+            <a:xfrm>
+              <a:off x="1577788" y="4890790"/>
+              <a:ext cx="210793" cy="307777"/>
+            </a:xfrm>
+            <a:prstGeom prst="rect">
+              <a:avLst/>
+            </a:prstGeom>
+            <a:noFill/>
+          </p:spPr>
+          <p:txBody>
+            <a:bodyPr wrap="square" rtlCol="0">
+              <a:spAutoFit/>
+            </a:bodyPr>
+            <a:lstStyle/>
+            <a:p>
+              <a:r>
+                <a:rPr lang="en-US" sz="1400" dirty="0"/>
+                <a:t>D</a:t>
+              </a:r>
+            </a:p>
+          </p:txBody>
+        </p:sp>
+        <p:sp>
+          <p:nvSpPr>
+            <p:cNvPr id="28" name="TextBox 27">
+              <a:extLst>
+                <a:ext uri="{FF2B5EF4-FFF2-40B4-BE49-F238E27FC236}">
+                  <a16:creationId xmlns:a16="http://schemas.microsoft.com/office/drawing/2014/main" id="{66A476B1-FEFC-40A8-98EB-423C9E3FD47C}"/>
+                </a:ext>
+              </a:extLst>
+            </p:cNvPr>
+            <p:cNvSpPr txBox="1"/>
+            <p:nvPr/>
+          </p:nvSpPr>
+          <p:spPr>
+            <a:xfrm>
+              <a:off x="2969907" y="1527189"/>
+              <a:ext cx="1008006" cy="369332"/>
+            </a:xfrm>
+            <a:prstGeom prst="rect">
+              <a:avLst/>
+            </a:prstGeom>
+            <a:noFill/>
+          </p:spPr>
+          <p:txBody>
+            <a:bodyPr wrap="square">
+              <a:spAutoFit/>
+            </a:bodyPr>
+            <a:lstStyle/>
+            <a:p>
+              <a:r>
+                <a:rPr lang="en-US" sz="1800" dirty="0"/>
+                <a:t> </a:t>
+              </a:r>
+              <a:r>
+                <a:rPr lang="en-US" sz="1400" dirty="0"/>
+                <a:t>* p &lt; 0.05 </a:t>
+              </a:r>
+            </a:p>
+          </p:txBody>
+        </p:sp>
+      </p:grpSp>
+    </p:spTree>
+    <p:extLst>
+      <p:ext uri="{BB962C8B-B14F-4D97-AF65-F5344CB8AC3E}">
+        <p14:creationId xmlns:p14="http://schemas.microsoft.com/office/powerpoint/2010/main" val="2599804069"/>
+      </p:ext>
+    </p:extLst>
+  </p:cSld>
+  <p:clrMapOvr>
+    <a:masterClrMapping/>
+  </p:clrMapOvr>
+</p:sld>
+</file>
+
+<file path=ppt/slides/slide15.xml><?xml version="1.0" encoding="utf-8"?>
+<p:sld xmlns:a="http://schemas.openxmlformats.org/drawingml/2006/main" xmlns:r="http://schemas.openxmlformats.org/officeDocument/2006/relationships" xmlns:p="http://schemas.openxmlformats.org/presentationml/2006/main">
+  <p:cSld>
+    <p:spTree>
+      <p:nvGrpSpPr>
+        <p:cNvPr id="1" name=""/>
+        <p:cNvGrpSpPr/>
+        <p:nvPr/>
+      </p:nvGrpSpPr>
+      <p:grpSpPr>
+        <a:xfrm>
+          <a:off x="0" y="0"/>
+          <a:ext cx="0" cy="0"/>
+          <a:chOff x="0" y="0"/>
+          <a:chExt cx="0" cy="0"/>
+        </a:xfrm>
+      </p:grpSpPr>
+      <p:grpSp>
+        <p:nvGrpSpPr>
+          <p:cNvPr id="14" name="Group 13">
+            <a:extLst>
+              <a:ext uri="{FF2B5EF4-FFF2-40B4-BE49-F238E27FC236}">
+                <a16:creationId xmlns:a16="http://schemas.microsoft.com/office/drawing/2014/main" id="{D4FD5FEE-C5CB-4BA2-A434-108A87720296}"/>
+              </a:ext>
+            </a:extLst>
+          </p:cNvPr>
+          <p:cNvGrpSpPr/>
+          <p:nvPr/>
+        </p:nvGrpSpPr>
+        <p:grpSpPr>
+          <a:xfrm>
+            <a:off x="1371576" y="1142983"/>
+            <a:ext cx="6819100" cy="4572033"/>
+            <a:chOff x="1371576" y="1142983"/>
+            <a:chExt cx="6819100" cy="4572033"/>
+          </a:xfrm>
+        </p:grpSpPr>
+        <p:grpSp>
+          <p:nvGrpSpPr>
+            <p:cNvPr id="10" name="Group 9">
+              <a:extLst>
+                <a:ext uri="{FF2B5EF4-FFF2-40B4-BE49-F238E27FC236}">
+                  <a16:creationId xmlns:a16="http://schemas.microsoft.com/office/drawing/2014/main" id="{EF7B3B4E-0E11-49D0-B7B6-F1B213BB9FAE}"/>
+                </a:ext>
+              </a:extLst>
+            </p:cNvPr>
+            <p:cNvGrpSpPr/>
+            <p:nvPr/>
+          </p:nvGrpSpPr>
+          <p:grpSpPr>
+            <a:xfrm>
+              <a:off x="1371576" y="1142983"/>
+              <a:ext cx="6819100" cy="4572033"/>
+              <a:chOff x="1371576" y="1142983"/>
+              <a:chExt cx="6819100" cy="4572033"/>
+            </a:xfrm>
+          </p:grpSpPr>
+          <p:pic>
+            <p:nvPicPr>
+              <p:cNvPr id="3" name="Picture 2">
+                <a:extLst>
+                  <a:ext uri="{FF2B5EF4-FFF2-40B4-BE49-F238E27FC236}">
+                    <a16:creationId xmlns:a16="http://schemas.microsoft.com/office/drawing/2014/main" id="{17B551D7-0DC5-4107-97BB-5B40B40E0500}"/>
+                  </a:ext>
+                </a:extLst>
+              </p:cNvPr>
+              <p:cNvPicPr>
+                <a:picLocks noChangeAspect="1"/>
+              </p:cNvPicPr>
+              <p:nvPr/>
+            </p:nvPicPr>
+            <p:blipFill>
+              <a:blip r:embed="rId2">
+                <a:extLst>
+                  <a:ext uri="{28A0092B-C50C-407E-A947-70E740481C1C}">
+                    <a14:useLocalDpi xmlns:a14="http://schemas.microsoft.com/office/drawing/2010/main" val="0"/>
+                  </a:ext>
+                </a:extLst>
+              </a:blip>
+              <a:stretch>
+                <a:fillRect/>
+              </a:stretch>
+            </p:blipFill>
+            <p:spPr>
+              <a:xfrm>
+                <a:off x="1371576" y="1142983"/>
+                <a:ext cx="6400847" cy="4572033"/>
+              </a:xfrm>
+              <a:prstGeom prst="rect">
+                <a:avLst/>
+              </a:prstGeom>
+            </p:spPr>
+          </p:pic>
+          <p:sp>
+            <p:nvSpPr>
+              <p:cNvPr id="4" name="TextBox 3">
+                <a:extLst>
+                  <a:ext uri="{FF2B5EF4-FFF2-40B4-BE49-F238E27FC236}">
+                    <a16:creationId xmlns:a16="http://schemas.microsoft.com/office/drawing/2014/main" id="{CD32581C-DA71-48BB-A047-6748492C8263}"/>
+                  </a:ext>
+                </a:extLst>
+              </p:cNvPr>
+              <p:cNvSpPr txBox="1"/>
+              <p:nvPr/>
+            </p:nvSpPr>
+            <p:spPr>
+              <a:xfrm>
+                <a:off x="5456840" y="2485102"/>
+                <a:ext cx="777801" cy="461665"/>
+              </a:xfrm>
+              <a:prstGeom prst="rect">
+                <a:avLst/>
+              </a:prstGeom>
+              <a:noFill/>
+            </p:spPr>
+            <p:txBody>
+              <a:bodyPr wrap="square" rtlCol="0">
+                <a:spAutoFit/>
+              </a:bodyPr>
+              <a:lstStyle/>
+              <a:p>
+                <a:r>
+                  <a:rPr lang="en-US" sz="2400" dirty="0"/>
+                  <a:t>*</a:t>
+                </a:r>
+              </a:p>
+            </p:txBody>
+          </p:sp>
+          <p:sp>
+            <p:nvSpPr>
+              <p:cNvPr id="5" name="TextBox 4">
+                <a:extLst>
+                  <a:ext uri="{FF2B5EF4-FFF2-40B4-BE49-F238E27FC236}">
+                    <a16:creationId xmlns:a16="http://schemas.microsoft.com/office/drawing/2014/main" id="{60CD68BD-E8C9-4F86-BCB0-418257107FB8}"/>
+                  </a:ext>
+                </a:extLst>
+              </p:cNvPr>
+              <p:cNvSpPr txBox="1"/>
+              <p:nvPr/>
+            </p:nvSpPr>
+            <p:spPr>
+              <a:xfrm>
+                <a:off x="5718297" y="2394221"/>
+                <a:ext cx="777801" cy="461665"/>
+              </a:xfrm>
+              <a:prstGeom prst="rect">
+                <a:avLst/>
+              </a:prstGeom>
+              <a:noFill/>
+            </p:spPr>
+            <p:txBody>
+              <a:bodyPr wrap="square" rtlCol="0">
+                <a:spAutoFit/>
+              </a:bodyPr>
+              <a:lstStyle/>
+              <a:p>
+                <a:r>
+                  <a:rPr lang="en-US" sz="2400" dirty="0"/>
+                  <a:t>*</a:t>
+                </a:r>
+              </a:p>
+            </p:txBody>
+          </p:sp>
+          <p:sp>
+            <p:nvSpPr>
+              <p:cNvPr id="6" name="TextBox 5">
+                <a:extLst>
+                  <a:ext uri="{FF2B5EF4-FFF2-40B4-BE49-F238E27FC236}">
+                    <a16:creationId xmlns:a16="http://schemas.microsoft.com/office/drawing/2014/main" id="{B912B941-9142-488D-BEA7-D573870043AD}"/>
+                  </a:ext>
+                </a:extLst>
+              </p:cNvPr>
+              <p:cNvSpPr txBox="1"/>
+              <p:nvPr/>
+            </p:nvSpPr>
+            <p:spPr>
+              <a:xfrm>
+                <a:off x="6045468" y="2150940"/>
+                <a:ext cx="777801" cy="461665"/>
+              </a:xfrm>
+              <a:prstGeom prst="rect">
+                <a:avLst/>
+              </a:prstGeom>
+              <a:noFill/>
+            </p:spPr>
+            <p:txBody>
+              <a:bodyPr wrap="square" rtlCol="0">
+                <a:spAutoFit/>
+              </a:bodyPr>
+              <a:lstStyle/>
+              <a:p>
+                <a:r>
+                  <a:rPr lang="en-US" sz="2400" dirty="0"/>
+                  <a:t>*</a:t>
+                </a:r>
+              </a:p>
+            </p:txBody>
+          </p:sp>
+          <p:sp>
+            <p:nvSpPr>
+              <p:cNvPr id="7" name="TextBox 6">
+                <a:extLst>
+                  <a:ext uri="{FF2B5EF4-FFF2-40B4-BE49-F238E27FC236}">
+                    <a16:creationId xmlns:a16="http://schemas.microsoft.com/office/drawing/2014/main" id="{D3B6ED79-17EB-44E5-98C1-B5B30EA38529}"/>
+                  </a:ext>
+                </a:extLst>
+              </p:cNvPr>
+              <p:cNvSpPr txBox="1"/>
+              <p:nvPr/>
+            </p:nvSpPr>
+            <p:spPr>
+              <a:xfrm>
+                <a:off x="6817256" y="2461333"/>
+                <a:ext cx="777801" cy="461665"/>
+              </a:xfrm>
+              <a:prstGeom prst="rect">
+                <a:avLst/>
+              </a:prstGeom>
+              <a:noFill/>
+            </p:spPr>
+            <p:txBody>
+              <a:bodyPr wrap="square" rtlCol="0">
+                <a:spAutoFit/>
+              </a:bodyPr>
+              <a:lstStyle/>
+              <a:p>
+                <a:r>
+                  <a:rPr lang="en-US" sz="2400" dirty="0"/>
+                  <a:t>*</a:t>
+                </a:r>
+              </a:p>
+            </p:txBody>
+          </p:sp>
+          <p:sp>
+            <p:nvSpPr>
+              <p:cNvPr id="8" name="TextBox 7">
+                <a:extLst>
+                  <a:ext uri="{FF2B5EF4-FFF2-40B4-BE49-F238E27FC236}">
+                    <a16:creationId xmlns:a16="http://schemas.microsoft.com/office/drawing/2014/main" id="{32D64524-6E3B-421C-B0DC-58D72D564774}"/>
+                  </a:ext>
+                </a:extLst>
+              </p:cNvPr>
+              <p:cNvSpPr txBox="1"/>
+              <p:nvPr/>
+            </p:nvSpPr>
+            <p:spPr>
+              <a:xfrm>
+                <a:off x="7094093" y="2226441"/>
+                <a:ext cx="777801" cy="461665"/>
+              </a:xfrm>
+              <a:prstGeom prst="rect">
+                <a:avLst/>
+              </a:prstGeom>
+              <a:noFill/>
+            </p:spPr>
+            <p:txBody>
+              <a:bodyPr wrap="square" rtlCol="0">
+                <a:spAutoFit/>
+              </a:bodyPr>
+              <a:lstStyle/>
+              <a:p>
+                <a:r>
+                  <a:rPr lang="en-US" sz="2400" dirty="0"/>
+                  <a:t>*</a:t>
+                </a:r>
+              </a:p>
+            </p:txBody>
+          </p:sp>
+          <p:sp>
+            <p:nvSpPr>
+              <p:cNvPr id="9" name="TextBox 8">
+                <a:extLst>
+                  <a:ext uri="{FF2B5EF4-FFF2-40B4-BE49-F238E27FC236}">
+                    <a16:creationId xmlns:a16="http://schemas.microsoft.com/office/drawing/2014/main" id="{EF35FD37-4BF9-4E52-B640-25F14E554688}"/>
+                  </a:ext>
+                </a:extLst>
+              </p:cNvPr>
+              <p:cNvSpPr txBox="1"/>
+              <p:nvPr/>
+            </p:nvSpPr>
+            <p:spPr>
+              <a:xfrm>
+                <a:off x="7412875" y="1765046"/>
+                <a:ext cx="777801" cy="461665"/>
+              </a:xfrm>
+              <a:prstGeom prst="rect">
+                <a:avLst/>
+              </a:prstGeom>
+              <a:noFill/>
+            </p:spPr>
+            <p:txBody>
+              <a:bodyPr wrap="square" rtlCol="0">
+                <a:spAutoFit/>
+              </a:bodyPr>
+              <a:lstStyle/>
+              <a:p>
+                <a:r>
+                  <a:rPr lang="en-US" sz="2400" dirty="0"/>
+                  <a:t>*</a:t>
+                </a:r>
+              </a:p>
+            </p:txBody>
+          </p:sp>
+        </p:grpSp>
+        <p:sp>
+          <p:nvSpPr>
+            <p:cNvPr id="12" name="TextBox 11">
+              <a:extLst>
+                <a:ext uri="{FF2B5EF4-FFF2-40B4-BE49-F238E27FC236}">
+                  <a16:creationId xmlns:a16="http://schemas.microsoft.com/office/drawing/2014/main" id="{BCA93342-BF4A-4308-871E-D3266C5DE6F3}"/>
+                </a:ext>
+              </a:extLst>
+            </p:cNvPr>
+            <p:cNvSpPr txBox="1"/>
+            <p:nvPr/>
+          </p:nvSpPr>
+          <p:spPr>
+            <a:xfrm>
+              <a:off x="6234641" y="1739663"/>
+              <a:ext cx="971502" cy="369332"/>
+            </a:xfrm>
+            <a:prstGeom prst="rect">
+              <a:avLst/>
+            </a:prstGeom>
+            <a:noFill/>
+          </p:spPr>
+          <p:txBody>
+            <a:bodyPr wrap="square">
+              <a:spAutoFit/>
+            </a:bodyPr>
+            <a:lstStyle/>
+            <a:p>
+              <a:r>
+                <a:rPr lang="en-US" sz="1800" i="1" dirty="0"/>
+                <a:t>p</a:t>
+              </a:r>
+              <a:r>
+                <a:rPr lang="en-US" sz="1800" dirty="0"/>
+                <a:t> &lt; 0.05 </a:t>
+              </a:r>
+              <a:endParaRPr lang="en-US" dirty="0"/>
+            </a:p>
+          </p:txBody>
+        </p:sp>
+      </p:grpSp>
+    </p:spTree>
+    <p:extLst>
+      <p:ext uri="{BB962C8B-B14F-4D97-AF65-F5344CB8AC3E}">
+        <p14:creationId xmlns:p14="http://schemas.microsoft.com/office/powerpoint/2010/main" val="3188496537"/>
+      </p:ext>
+    </p:extLst>
+  </p:cSld>
+  <p:clrMapOvr>
+    <a:masterClrMapping/>
+  </p:clrMapOvr>
+</p:sld>
+</file>
+
+<file path=ppt/slides/slide16.xml><?xml version="1.0" encoding="utf-8"?>
+<p:sld xmlns:a="http://schemas.openxmlformats.org/drawingml/2006/main" xmlns:r="http://schemas.openxmlformats.org/officeDocument/2006/relationships" xmlns:p="http://schemas.openxmlformats.org/presentationml/2006/main">
+  <p:cSld>
+    <p:spTree>
+      <p:nvGrpSpPr>
+        <p:cNvPr id="1" name=""/>
+        <p:cNvGrpSpPr/>
+        <p:nvPr/>
+      </p:nvGrpSpPr>
+      <p:grpSpPr>
+        <a:xfrm>
+          <a:off x="0" y="0"/>
+          <a:ext cx="0" cy="0"/>
+          <a:chOff x="0" y="0"/>
+          <a:chExt cx="0" cy="0"/>
+        </a:xfrm>
+      </p:grpSpPr>
+      <p:grpSp>
+        <p:nvGrpSpPr>
+          <p:cNvPr id="9" name="Group 8">
+            <a:extLst>
+              <a:ext uri="{FF2B5EF4-FFF2-40B4-BE49-F238E27FC236}">
+                <a16:creationId xmlns:a16="http://schemas.microsoft.com/office/drawing/2014/main" id="{7A2002F0-1601-4EA0-9CC7-53F6B9DA0CE0}"/>
+              </a:ext>
+            </a:extLst>
+          </p:cNvPr>
+          <p:cNvGrpSpPr/>
+          <p:nvPr/>
+        </p:nvGrpSpPr>
+        <p:grpSpPr>
+          <a:xfrm>
+            <a:off x="1187018" y="1512098"/>
+            <a:ext cx="6842867" cy="4572033"/>
+            <a:chOff x="1187018" y="1512098"/>
+            <a:chExt cx="6842867" cy="4572033"/>
+          </a:xfrm>
+        </p:grpSpPr>
+        <p:pic>
+          <p:nvPicPr>
+            <p:cNvPr id="3" name="Picture 2">
+              <a:extLst>
+                <a:ext uri="{FF2B5EF4-FFF2-40B4-BE49-F238E27FC236}">
+                  <a16:creationId xmlns:a16="http://schemas.microsoft.com/office/drawing/2014/main" id="{36B91368-B2D5-44D6-9B02-2ABD207165DD}"/>
+                </a:ext>
+              </a:extLst>
+            </p:cNvPr>
+            <p:cNvPicPr>
+              <a:picLocks noChangeAspect="1"/>
+            </p:cNvPicPr>
+            <p:nvPr/>
+          </p:nvPicPr>
+          <p:blipFill>
+            <a:blip r:embed="rId2">
+              <a:extLst>
+                <a:ext uri="{28A0092B-C50C-407E-A947-70E740481C1C}">
+                  <a14:useLocalDpi xmlns:a14="http://schemas.microsoft.com/office/drawing/2010/main" val="0"/>
+                </a:ext>
+              </a:extLst>
+            </a:blip>
+            <a:stretch>
+              <a:fillRect/>
+            </a:stretch>
+          </p:blipFill>
+          <p:spPr>
+            <a:xfrm>
+              <a:off x="1187018" y="1512098"/>
+              <a:ext cx="6400847" cy="4572033"/>
+            </a:xfrm>
+            <a:prstGeom prst="rect">
+              <a:avLst/>
+            </a:prstGeom>
+          </p:spPr>
+        </p:pic>
+        <p:sp>
+          <p:nvSpPr>
+            <p:cNvPr id="4" name="TextBox 3">
+              <a:extLst>
+                <a:ext uri="{FF2B5EF4-FFF2-40B4-BE49-F238E27FC236}">
+                  <a16:creationId xmlns:a16="http://schemas.microsoft.com/office/drawing/2014/main" id="{0E4717F8-6F32-4959-A0DF-2B95C40718C1}"/>
+                </a:ext>
+              </a:extLst>
+            </p:cNvPr>
+            <p:cNvSpPr txBox="1"/>
+            <p:nvPr/>
+          </p:nvSpPr>
+          <p:spPr>
+            <a:xfrm>
+              <a:off x="7252084" y="2954885"/>
+              <a:ext cx="777801" cy="461665"/>
+            </a:xfrm>
+            <a:prstGeom prst="rect">
+              <a:avLst/>
+            </a:prstGeom>
+            <a:noFill/>
+          </p:spPr>
+          <p:txBody>
+            <a:bodyPr wrap="square" rtlCol="0">
+              <a:spAutoFit/>
+            </a:bodyPr>
+            <a:lstStyle/>
+            <a:p>
+              <a:r>
+                <a:rPr lang="en-US" sz="2400" dirty="0"/>
+                <a:t>*</a:t>
+              </a:r>
+            </a:p>
+          </p:txBody>
+        </p:sp>
+        <p:sp>
+          <p:nvSpPr>
+            <p:cNvPr id="5" name="TextBox 4">
+              <a:extLst>
+                <a:ext uri="{FF2B5EF4-FFF2-40B4-BE49-F238E27FC236}">
+                  <a16:creationId xmlns:a16="http://schemas.microsoft.com/office/drawing/2014/main" id="{9848B786-C847-4E27-993C-48CE77D3EBA8}"/>
+                </a:ext>
+              </a:extLst>
+            </p:cNvPr>
+            <p:cNvSpPr txBox="1"/>
+            <p:nvPr/>
+          </p:nvSpPr>
+          <p:spPr>
+            <a:xfrm>
+              <a:off x="6966859" y="2996830"/>
+              <a:ext cx="285226" cy="461665"/>
+            </a:xfrm>
+            <a:prstGeom prst="rect">
+              <a:avLst/>
+            </a:prstGeom>
+            <a:noFill/>
+          </p:spPr>
+          <p:txBody>
+            <a:bodyPr wrap="square" rtlCol="0">
+              <a:spAutoFit/>
+            </a:bodyPr>
+            <a:lstStyle/>
+            <a:p>
+              <a:r>
+                <a:rPr lang="en-US" sz="2400" dirty="0"/>
+                <a:t>*</a:t>
+              </a:r>
+            </a:p>
+          </p:txBody>
+        </p:sp>
+        <p:sp>
+          <p:nvSpPr>
+            <p:cNvPr id="6" name="TextBox 5">
+              <a:extLst>
+                <a:ext uri="{FF2B5EF4-FFF2-40B4-BE49-F238E27FC236}">
+                  <a16:creationId xmlns:a16="http://schemas.microsoft.com/office/drawing/2014/main" id="{1C5F3E72-E765-4168-9505-427EFA3B7D2D}"/>
+                </a:ext>
+              </a:extLst>
+            </p:cNvPr>
+            <p:cNvSpPr txBox="1"/>
+            <p:nvPr/>
+          </p:nvSpPr>
+          <p:spPr>
+            <a:xfrm>
+              <a:off x="5985345" y="3198166"/>
+              <a:ext cx="777801" cy="461665"/>
+            </a:xfrm>
+            <a:prstGeom prst="rect">
+              <a:avLst/>
+            </a:prstGeom>
+            <a:noFill/>
+          </p:spPr>
+          <p:txBody>
+            <a:bodyPr wrap="square" rtlCol="0">
+              <a:spAutoFit/>
+            </a:bodyPr>
+            <a:lstStyle/>
+            <a:p>
+              <a:r>
+                <a:rPr lang="en-US" sz="2400" dirty="0"/>
+                <a:t>*</a:t>
+              </a:r>
+            </a:p>
+          </p:txBody>
+        </p:sp>
+        <p:sp>
+          <p:nvSpPr>
+            <p:cNvPr id="8" name="TextBox 7">
+              <a:extLst>
+                <a:ext uri="{FF2B5EF4-FFF2-40B4-BE49-F238E27FC236}">
+                  <a16:creationId xmlns:a16="http://schemas.microsoft.com/office/drawing/2014/main" id="{8226BBA8-B129-4CE6-840C-94E149216700}"/>
+                </a:ext>
+              </a:extLst>
+            </p:cNvPr>
+            <p:cNvSpPr txBox="1"/>
+            <p:nvPr/>
+          </p:nvSpPr>
+          <p:spPr>
+            <a:xfrm>
+              <a:off x="5750654" y="2474644"/>
+              <a:ext cx="1119930" cy="369332"/>
+            </a:xfrm>
+            <a:prstGeom prst="rect">
+              <a:avLst/>
+            </a:prstGeom>
+            <a:noFill/>
+          </p:spPr>
+          <p:txBody>
+            <a:bodyPr wrap="square">
+              <a:spAutoFit/>
+            </a:bodyPr>
+            <a:lstStyle/>
+            <a:p>
+              <a:r>
+                <a:rPr lang="en-US" sz="1800" dirty="0"/>
+                <a:t> </a:t>
+              </a:r>
+              <a:r>
+                <a:rPr lang="en-US" sz="1800" i="1" dirty="0"/>
+                <a:t>p</a:t>
+              </a:r>
+              <a:r>
+                <a:rPr lang="en-US" sz="1800" dirty="0"/>
+                <a:t> &lt; 0.05 </a:t>
+              </a:r>
+              <a:endParaRPr lang="en-US" dirty="0"/>
+            </a:p>
+          </p:txBody>
+        </p:sp>
+      </p:grpSp>
+    </p:spTree>
+    <p:extLst>
+      <p:ext uri="{BB962C8B-B14F-4D97-AF65-F5344CB8AC3E}">
+        <p14:creationId xmlns:p14="http://schemas.microsoft.com/office/powerpoint/2010/main" val="3716417875"/>
+      </p:ext>
+    </p:extLst>
+  </p:cSld>
+  <p:clrMapOvr>
+    <a:masterClrMapping/>
+  </p:clrMapOvr>
+</p:sld>
+</file>
+
+<file path=ppt/slides/slide17.xml><?xml version="1.0" encoding="utf-8"?>
+<p:sld xmlns:a="http://schemas.openxmlformats.org/drawingml/2006/main" xmlns:r="http://schemas.openxmlformats.org/officeDocument/2006/relationships" xmlns:p="http://schemas.openxmlformats.org/presentationml/2006/main">
+  <p:cSld>
+    <p:spTree>
+      <p:nvGrpSpPr>
+        <p:cNvPr id="1" name=""/>
+        <p:cNvGrpSpPr/>
+        <p:nvPr/>
+      </p:nvGrpSpPr>
+      <p:grpSpPr>
+        <a:xfrm>
+          <a:off x="0" y="0"/>
+          <a:ext cx="0" cy="0"/>
+          <a:chOff x="0" y="0"/>
+          <a:chExt cx="0" cy="0"/>
+        </a:xfrm>
+      </p:grpSpPr>
+      <p:pic>
+        <p:nvPicPr>
+          <p:cNvPr id="3" name="Picture 2">
+            <a:extLst>
+              <a:ext uri="{FF2B5EF4-FFF2-40B4-BE49-F238E27FC236}">
+                <a16:creationId xmlns:a16="http://schemas.microsoft.com/office/drawing/2014/main" id="{1AAC6A4E-436F-4B1B-B557-C1F79CBC0708}"/>
+              </a:ext>
+            </a:extLst>
+          </p:cNvPr>
+          <p:cNvPicPr>
+            <a:picLocks noChangeAspect="1"/>
+          </p:cNvPicPr>
+          <p:nvPr/>
+        </p:nvPicPr>
+        <p:blipFill>
+          <a:blip r:embed="rId2">
+            <a:extLst>
+              <a:ext uri="{28A0092B-C50C-407E-A947-70E740481C1C}">
+                <a14:useLocalDpi xmlns:a14="http://schemas.microsoft.com/office/drawing/2010/main" val="0"/>
+              </a:ext>
+            </a:extLst>
+          </a:blip>
+          <a:stretch>
+            <a:fillRect/>
+          </a:stretch>
+        </p:blipFill>
+        <p:spPr>
+          <a:xfrm>
+            <a:off x="1371576" y="1142983"/>
+            <a:ext cx="6400847" cy="4572033"/>
+          </a:xfrm>
+          <a:prstGeom prst="rect">
+            <a:avLst/>
+          </a:prstGeom>
+        </p:spPr>
+      </p:pic>
+      <p:sp>
+        <p:nvSpPr>
+          <p:cNvPr id="4" name="TextBox 3">
+            <a:extLst>
+              <a:ext uri="{FF2B5EF4-FFF2-40B4-BE49-F238E27FC236}">
+                <a16:creationId xmlns:a16="http://schemas.microsoft.com/office/drawing/2014/main" id="{C3C7D4A5-DE6C-44A5-9C87-44A5D8586051}"/>
+              </a:ext>
+            </a:extLst>
+          </p:cNvPr>
+          <p:cNvSpPr txBox="1"/>
+          <p:nvPr/>
+        </p:nvSpPr>
+        <p:spPr>
+          <a:xfrm>
+            <a:off x="7361141" y="3198166"/>
+            <a:ext cx="777801" cy="461665"/>
+          </a:xfrm>
+          <a:prstGeom prst="rect">
+            <a:avLst/>
+          </a:prstGeom>
+          <a:noFill/>
+        </p:spPr>
+        <p:txBody>
+          <a:bodyPr wrap="square" rtlCol="0">
+            <a:spAutoFit/>
+          </a:bodyPr>
+          <a:lstStyle/>
+          <a:p>
+            <a:r>
+              <a:rPr lang="en-US" sz="2400" dirty="0"/>
+              <a:t>*</a:t>
+            </a:r>
+          </a:p>
+        </p:txBody>
+      </p:sp>
+      <p:sp>
+        <p:nvSpPr>
+          <p:cNvPr id="6" name="TextBox 5">
+            <a:extLst>
+              <a:ext uri="{FF2B5EF4-FFF2-40B4-BE49-F238E27FC236}">
+                <a16:creationId xmlns:a16="http://schemas.microsoft.com/office/drawing/2014/main" id="{8130EE52-FD1E-44E6-9052-F3968B34575D}"/>
+              </a:ext>
+            </a:extLst>
+          </p:cNvPr>
+          <p:cNvSpPr txBox="1"/>
+          <p:nvPr/>
+        </p:nvSpPr>
+        <p:spPr>
+          <a:xfrm>
+            <a:off x="6972240" y="3721274"/>
+            <a:ext cx="777801" cy="461665"/>
+          </a:xfrm>
+          <a:prstGeom prst="rect">
+            <a:avLst/>
+          </a:prstGeom>
+          <a:noFill/>
+        </p:spPr>
+        <p:txBody>
+          <a:bodyPr wrap="square" rtlCol="0">
+            <a:spAutoFit/>
+          </a:bodyPr>
+          <a:lstStyle/>
+          <a:p>
+            <a:r>
+              <a:rPr lang="en-US" sz="2400" dirty="0"/>
+              <a:t>*</a:t>
+            </a:r>
+          </a:p>
+        </p:txBody>
+      </p:sp>
+      <p:sp>
+        <p:nvSpPr>
+          <p:cNvPr id="7" name="TextBox 6">
+            <a:extLst>
+              <a:ext uri="{FF2B5EF4-FFF2-40B4-BE49-F238E27FC236}">
+                <a16:creationId xmlns:a16="http://schemas.microsoft.com/office/drawing/2014/main" id="{1225965C-0C44-4B80-8E30-70B58AFA8F7E}"/>
+              </a:ext>
+            </a:extLst>
+          </p:cNvPr>
+          <p:cNvSpPr txBox="1"/>
+          <p:nvPr/>
+        </p:nvSpPr>
+        <p:spPr>
+          <a:xfrm>
+            <a:off x="6573874" y="3838364"/>
+            <a:ext cx="777801" cy="461665"/>
+          </a:xfrm>
+          <a:prstGeom prst="rect">
+            <a:avLst/>
+          </a:prstGeom>
+          <a:noFill/>
+        </p:spPr>
+        <p:txBody>
+          <a:bodyPr wrap="square" rtlCol="0">
+            <a:spAutoFit/>
+          </a:bodyPr>
+          <a:lstStyle/>
+          <a:p>
+            <a:r>
+              <a:rPr lang="en-US" sz="2400" dirty="0"/>
+              <a:t>*</a:t>
+            </a:r>
+          </a:p>
+        </p:txBody>
+      </p:sp>
+      <p:sp>
+        <p:nvSpPr>
+          <p:cNvPr id="8" name="TextBox 7">
+            <a:extLst>
+              <a:ext uri="{FF2B5EF4-FFF2-40B4-BE49-F238E27FC236}">
+                <a16:creationId xmlns:a16="http://schemas.microsoft.com/office/drawing/2014/main" id="{7356BA29-508C-4712-9267-A646FD40E6C4}"/>
+              </a:ext>
+            </a:extLst>
+          </p:cNvPr>
+          <p:cNvSpPr txBox="1"/>
+          <p:nvPr/>
+        </p:nvSpPr>
+        <p:spPr>
+          <a:xfrm>
+            <a:off x="5581793" y="3810116"/>
+            <a:ext cx="777801" cy="461665"/>
+          </a:xfrm>
+          <a:prstGeom prst="rect">
+            <a:avLst/>
+          </a:prstGeom>
+          <a:noFill/>
+        </p:spPr>
+        <p:txBody>
+          <a:bodyPr wrap="square" rtlCol="0">
+            <a:spAutoFit/>
+          </a:bodyPr>
+          <a:lstStyle/>
+          <a:p>
+            <a:r>
+              <a:rPr lang="en-US" sz="2400" dirty="0"/>
+              <a:t>*</a:t>
+            </a:r>
+          </a:p>
+        </p:txBody>
+      </p:sp>
+      <p:sp>
+        <p:nvSpPr>
+          <p:cNvPr id="9" name="TextBox 8">
+            <a:extLst>
+              <a:ext uri="{FF2B5EF4-FFF2-40B4-BE49-F238E27FC236}">
+                <a16:creationId xmlns:a16="http://schemas.microsoft.com/office/drawing/2014/main" id="{C346AF5A-1E8E-43BA-9158-1CE5151FBBDF}"/>
+              </a:ext>
+            </a:extLst>
+          </p:cNvPr>
+          <p:cNvSpPr txBox="1"/>
+          <p:nvPr/>
+        </p:nvSpPr>
+        <p:spPr>
+          <a:xfrm>
+            <a:off x="5203444" y="3964883"/>
+            <a:ext cx="777801" cy="461665"/>
+          </a:xfrm>
+          <a:prstGeom prst="rect">
+            <a:avLst/>
+          </a:prstGeom>
+          <a:noFill/>
+        </p:spPr>
+        <p:txBody>
+          <a:bodyPr wrap="square" rtlCol="0">
+            <a:spAutoFit/>
+          </a:bodyPr>
+          <a:lstStyle/>
+          <a:p>
+            <a:r>
+              <a:rPr lang="en-US" sz="2400" dirty="0"/>
+              <a:t>*</a:t>
+            </a:r>
+          </a:p>
+        </p:txBody>
+      </p:sp>
+      <p:sp>
+        <p:nvSpPr>
+          <p:cNvPr id="10" name="TextBox 9">
+            <a:extLst>
+              <a:ext uri="{FF2B5EF4-FFF2-40B4-BE49-F238E27FC236}">
+                <a16:creationId xmlns:a16="http://schemas.microsoft.com/office/drawing/2014/main" id="{AF2B484B-8A19-4270-B0B0-DBA16E1A0150}"/>
+              </a:ext>
+            </a:extLst>
+          </p:cNvPr>
+          <p:cNvSpPr txBox="1"/>
+          <p:nvPr/>
+        </p:nvSpPr>
+        <p:spPr>
+          <a:xfrm>
+            <a:off x="4793910" y="4130822"/>
+            <a:ext cx="777801" cy="461665"/>
+          </a:xfrm>
+          <a:prstGeom prst="rect">
+            <a:avLst/>
+          </a:prstGeom>
+          <a:noFill/>
+        </p:spPr>
+        <p:txBody>
+          <a:bodyPr wrap="square" rtlCol="0">
+            <a:spAutoFit/>
+          </a:bodyPr>
+          <a:lstStyle/>
+          <a:p>
+            <a:r>
+              <a:rPr lang="en-US" sz="2400" dirty="0"/>
+              <a:t>*</a:t>
+            </a:r>
+          </a:p>
+        </p:txBody>
+      </p:sp>
+      <p:sp>
+        <p:nvSpPr>
+          <p:cNvPr id="12" name="TextBox 11">
+            <a:extLst>
+              <a:ext uri="{FF2B5EF4-FFF2-40B4-BE49-F238E27FC236}">
+                <a16:creationId xmlns:a16="http://schemas.microsoft.com/office/drawing/2014/main" id="{991A4E60-8CFA-4EB2-A83F-DB06B67B60C6}"/>
+              </a:ext>
+            </a:extLst>
+          </p:cNvPr>
+          <p:cNvSpPr txBox="1"/>
+          <p:nvPr/>
+        </p:nvSpPr>
+        <p:spPr>
+          <a:xfrm>
+            <a:off x="2592423" y="1787543"/>
+            <a:ext cx="4572000" cy="400110"/>
+          </a:xfrm>
+          <a:prstGeom prst="rect">
+            <a:avLst/>
+          </a:prstGeom>
+          <a:noFill/>
+        </p:spPr>
+        <p:txBody>
+          <a:bodyPr wrap="square">
+            <a:spAutoFit/>
+          </a:bodyPr>
+          <a:lstStyle/>
+          <a:p>
+            <a:r>
+              <a:rPr lang="en-US" dirty="0"/>
+              <a:t> </a:t>
+            </a:r>
+            <a:r>
+              <a:rPr lang="en-US" sz="2000" dirty="0"/>
+              <a:t>* p &lt; 0.001 </a:t>
+            </a:r>
+          </a:p>
+        </p:txBody>
+      </p:sp>
+    </p:spTree>
+    <p:extLst>
+      <p:ext uri="{BB962C8B-B14F-4D97-AF65-F5344CB8AC3E}">
+        <p14:creationId xmlns:p14="http://schemas.microsoft.com/office/powerpoint/2010/main" val="2763018191"/>
+      </p:ext>
+    </p:extLst>
+  </p:cSld>
+  <p:clrMapOvr>
+    <a:masterClrMapping/>
+  </p:clrMapOvr>
+</p:sld>
+</file>
+
+<file path=ppt/slides/slide18.xml><?xml version="1.0" encoding="utf-8"?>
+<p:sld xmlns:a="http://schemas.openxmlformats.org/drawingml/2006/main" xmlns:r="http://schemas.openxmlformats.org/officeDocument/2006/relationships" xmlns:p="http://schemas.openxmlformats.org/presentationml/2006/main">
+  <p:cSld>
+    <p:spTree>
+      <p:nvGrpSpPr>
+        <p:cNvPr id="1" name=""/>
+        <p:cNvGrpSpPr/>
+        <p:nvPr/>
+      </p:nvGrpSpPr>
+      <p:grpSpPr>
+        <a:xfrm>
+          <a:off x="0" y="0"/>
+          <a:ext cx="0" cy="0"/>
+          <a:chOff x="0" y="0"/>
+          <a:chExt cx="0" cy="0"/>
+        </a:xfrm>
+      </p:grpSpPr>
+      <p:grpSp>
+        <p:nvGrpSpPr>
+          <p:cNvPr id="11" name="Group 10">
+            <a:extLst>
+              <a:ext uri="{FF2B5EF4-FFF2-40B4-BE49-F238E27FC236}">
+                <a16:creationId xmlns:a16="http://schemas.microsoft.com/office/drawing/2014/main" id="{F51744F5-9876-2D21-7DF4-3E2AA42A7F80}"/>
+              </a:ext>
+            </a:extLst>
+          </p:cNvPr>
+          <p:cNvGrpSpPr/>
+          <p:nvPr/>
+        </p:nvGrpSpPr>
+        <p:grpSpPr>
+          <a:xfrm>
+            <a:off x="894837" y="999786"/>
+            <a:ext cx="7705500" cy="4858428"/>
+            <a:chOff x="894837" y="999786"/>
+            <a:chExt cx="7705500" cy="4858428"/>
+          </a:xfrm>
+        </p:grpSpPr>
+        <p:pic>
+          <p:nvPicPr>
+            <p:cNvPr id="3" name="Picture 2">
+              <a:extLst>
+                <a:ext uri="{FF2B5EF4-FFF2-40B4-BE49-F238E27FC236}">
+                  <a16:creationId xmlns:a16="http://schemas.microsoft.com/office/drawing/2014/main" id="{E43BDBDA-CF38-B454-08CC-935EB14E42B1}"/>
+                </a:ext>
+              </a:extLst>
+            </p:cNvPr>
+            <p:cNvPicPr>
+              <a:picLocks noChangeAspect="1"/>
+            </p:cNvPicPr>
+            <p:nvPr/>
+          </p:nvPicPr>
+          <p:blipFill>
+            <a:blip r:embed="rId2">
+              <a:extLst>
+                <a:ext uri="{28A0092B-C50C-407E-A947-70E740481C1C}">
+                  <a14:useLocalDpi xmlns:a14="http://schemas.microsoft.com/office/drawing/2010/main" val="0"/>
+                </a:ext>
+              </a:extLst>
+            </a:blip>
+            <a:stretch>
+              <a:fillRect/>
+            </a:stretch>
+          </p:blipFill>
+          <p:spPr>
+            <a:xfrm>
+              <a:off x="894837" y="999786"/>
+              <a:ext cx="7354326" cy="4858428"/>
+            </a:xfrm>
+            <a:prstGeom prst="rect">
+              <a:avLst/>
+            </a:prstGeom>
+          </p:spPr>
+        </p:pic>
+        <p:sp>
+          <p:nvSpPr>
+            <p:cNvPr id="4" name="TextBox 3">
+              <a:extLst>
+                <a:ext uri="{FF2B5EF4-FFF2-40B4-BE49-F238E27FC236}">
+                  <a16:creationId xmlns:a16="http://schemas.microsoft.com/office/drawing/2014/main" id="{10FBCB93-A15B-A3FE-D924-DA4B8762EAEC}"/>
+                </a:ext>
+              </a:extLst>
+            </p:cNvPr>
+            <p:cNvSpPr txBox="1"/>
+            <p:nvPr/>
+          </p:nvSpPr>
+          <p:spPr>
+            <a:xfrm>
+              <a:off x="7822536" y="4149618"/>
+              <a:ext cx="777801" cy="461665"/>
+            </a:xfrm>
+            <a:prstGeom prst="rect">
+              <a:avLst/>
+            </a:prstGeom>
+            <a:noFill/>
+          </p:spPr>
+          <p:txBody>
+            <a:bodyPr wrap="square" rtlCol="0">
+              <a:spAutoFit/>
+            </a:bodyPr>
+            <a:lstStyle/>
+            <a:p>
+              <a:r>
+                <a:rPr lang="en-US" sz="2400" dirty="0"/>
+                <a:t>*</a:t>
+              </a:r>
+            </a:p>
+          </p:txBody>
+        </p:sp>
+        <p:sp>
+          <p:nvSpPr>
+            <p:cNvPr id="5" name="TextBox 4">
+              <a:extLst>
+                <a:ext uri="{FF2B5EF4-FFF2-40B4-BE49-F238E27FC236}">
+                  <a16:creationId xmlns:a16="http://schemas.microsoft.com/office/drawing/2014/main" id="{6F99E429-59E0-18BC-5D9D-67BF0C2EAC59}"/>
+                </a:ext>
+              </a:extLst>
+            </p:cNvPr>
+            <p:cNvSpPr txBox="1"/>
+            <p:nvPr/>
+          </p:nvSpPr>
+          <p:spPr>
+            <a:xfrm>
+              <a:off x="7341356" y="4328777"/>
+              <a:ext cx="777801" cy="461665"/>
+            </a:xfrm>
+            <a:prstGeom prst="rect">
+              <a:avLst/>
+            </a:prstGeom>
+            <a:noFill/>
+          </p:spPr>
+          <p:txBody>
+            <a:bodyPr wrap="square" rtlCol="0">
+              <a:spAutoFit/>
+            </a:bodyPr>
+            <a:lstStyle/>
+            <a:p>
+              <a:r>
+                <a:rPr lang="en-US" sz="2400" dirty="0"/>
+                <a:t>*</a:t>
+              </a:r>
+            </a:p>
+          </p:txBody>
+        </p:sp>
+        <p:sp>
+          <p:nvSpPr>
+            <p:cNvPr id="6" name="TextBox 5">
+              <a:extLst>
+                <a:ext uri="{FF2B5EF4-FFF2-40B4-BE49-F238E27FC236}">
+                  <a16:creationId xmlns:a16="http://schemas.microsoft.com/office/drawing/2014/main" id="{9EC3BFE8-6975-5230-2046-18F8B20D6E95}"/>
+                </a:ext>
+              </a:extLst>
+            </p:cNvPr>
+            <p:cNvSpPr txBox="1"/>
+            <p:nvPr/>
+          </p:nvSpPr>
+          <p:spPr>
+            <a:xfrm>
+              <a:off x="6884267" y="4378755"/>
+              <a:ext cx="777801" cy="461665"/>
+            </a:xfrm>
+            <a:prstGeom prst="rect">
+              <a:avLst/>
+            </a:prstGeom>
+            <a:noFill/>
+          </p:spPr>
+          <p:txBody>
+            <a:bodyPr wrap="square" rtlCol="0">
+              <a:spAutoFit/>
+            </a:bodyPr>
+            <a:lstStyle/>
+            <a:p>
+              <a:r>
+                <a:rPr lang="en-US" sz="2400" dirty="0"/>
+                <a:t>*</a:t>
+              </a:r>
+            </a:p>
+          </p:txBody>
+        </p:sp>
+        <p:sp>
+          <p:nvSpPr>
+            <p:cNvPr id="7" name="TextBox 6">
+              <a:extLst>
+                <a:ext uri="{FF2B5EF4-FFF2-40B4-BE49-F238E27FC236}">
+                  <a16:creationId xmlns:a16="http://schemas.microsoft.com/office/drawing/2014/main" id="{6D84329B-3959-C79E-AAF3-4018EEC14C05}"/>
+                </a:ext>
+              </a:extLst>
+            </p:cNvPr>
+            <p:cNvSpPr txBox="1"/>
+            <p:nvPr/>
+          </p:nvSpPr>
+          <p:spPr>
+            <a:xfrm>
+              <a:off x="5724406" y="4384063"/>
+              <a:ext cx="777801" cy="461665"/>
+            </a:xfrm>
+            <a:prstGeom prst="rect">
+              <a:avLst/>
+            </a:prstGeom>
+            <a:noFill/>
+          </p:spPr>
+          <p:txBody>
+            <a:bodyPr wrap="square" rtlCol="0">
+              <a:spAutoFit/>
+            </a:bodyPr>
+            <a:lstStyle/>
+            <a:p>
+              <a:r>
+                <a:rPr lang="en-US" sz="2400" dirty="0"/>
+                <a:t>*</a:t>
+              </a:r>
+            </a:p>
+          </p:txBody>
+        </p:sp>
+        <p:sp>
+          <p:nvSpPr>
+            <p:cNvPr id="8" name="TextBox 7">
+              <a:extLst>
+                <a:ext uri="{FF2B5EF4-FFF2-40B4-BE49-F238E27FC236}">
+                  <a16:creationId xmlns:a16="http://schemas.microsoft.com/office/drawing/2014/main" id="{652C30F5-C39A-3BAF-2F54-687E7C8142B5}"/>
+                </a:ext>
+              </a:extLst>
+            </p:cNvPr>
+            <p:cNvSpPr txBox="1"/>
+            <p:nvPr/>
+          </p:nvSpPr>
+          <p:spPr>
+            <a:xfrm>
+              <a:off x="5268286" y="4440994"/>
+              <a:ext cx="712959" cy="461665"/>
+            </a:xfrm>
+            <a:prstGeom prst="rect">
+              <a:avLst/>
+            </a:prstGeom>
+            <a:noFill/>
+          </p:spPr>
+          <p:txBody>
+            <a:bodyPr wrap="square" rtlCol="0">
+              <a:spAutoFit/>
+            </a:bodyPr>
+            <a:lstStyle/>
+            <a:p>
+              <a:r>
+                <a:rPr lang="en-US" sz="2400" dirty="0"/>
+                <a:t>*</a:t>
+              </a:r>
+            </a:p>
+          </p:txBody>
+        </p:sp>
+        <p:sp>
+          <p:nvSpPr>
+            <p:cNvPr id="9" name="TextBox 8">
+              <a:extLst>
+                <a:ext uri="{FF2B5EF4-FFF2-40B4-BE49-F238E27FC236}">
+                  <a16:creationId xmlns:a16="http://schemas.microsoft.com/office/drawing/2014/main" id="{A9551A98-09CB-80CC-2EE9-DEA651656E89}"/>
+                </a:ext>
+              </a:extLst>
+            </p:cNvPr>
+            <p:cNvSpPr txBox="1"/>
+            <p:nvPr/>
+          </p:nvSpPr>
+          <p:spPr>
+            <a:xfrm>
+              <a:off x="4793910" y="4503433"/>
+              <a:ext cx="777801" cy="461665"/>
+            </a:xfrm>
+            <a:prstGeom prst="rect">
+              <a:avLst/>
+            </a:prstGeom>
+            <a:noFill/>
+          </p:spPr>
+          <p:txBody>
+            <a:bodyPr wrap="square" rtlCol="0">
+              <a:spAutoFit/>
+            </a:bodyPr>
+            <a:lstStyle/>
+            <a:p>
+              <a:r>
+                <a:rPr lang="en-US" sz="2400" dirty="0"/>
+                <a:t>*</a:t>
+              </a:r>
+            </a:p>
+          </p:txBody>
+        </p:sp>
+        <p:sp>
+          <p:nvSpPr>
+            <p:cNvPr id="10" name="TextBox 9">
+              <a:extLst>
+                <a:ext uri="{FF2B5EF4-FFF2-40B4-BE49-F238E27FC236}">
+                  <a16:creationId xmlns:a16="http://schemas.microsoft.com/office/drawing/2014/main" id="{F0437691-62BF-B4CA-5D8B-97FD52D40629}"/>
+                </a:ext>
+              </a:extLst>
+            </p:cNvPr>
+            <p:cNvSpPr txBox="1"/>
+            <p:nvPr/>
+          </p:nvSpPr>
+          <p:spPr>
+            <a:xfrm>
+              <a:off x="2106649" y="1625618"/>
+              <a:ext cx="4572000" cy="400110"/>
+            </a:xfrm>
+            <a:prstGeom prst="rect">
+              <a:avLst/>
+            </a:prstGeom>
+            <a:noFill/>
+          </p:spPr>
+          <p:txBody>
+            <a:bodyPr wrap="square">
+              <a:spAutoFit/>
+            </a:bodyPr>
+            <a:lstStyle/>
+            <a:p>
+              <a:r>
+                <a:rPr lang="en-US" dirty="0"/>
+                <a:t> </a:t>
+              </a:r>
+              <a:r>
+                <a:rPr lang="en-US" sz="2000" dirty="0"/>
+                <a:t>* p &lt; 0.001 </a:t>
+              </a:r>
+            </a:p>
+          </p:txBody>
+        </p:sp>
+      </p:grpSp>
+    </p:spTree>
+    <p:extLst>
+      <p:ext uri="{BB962C8B-B14F-4D97-AF65-F5344CB8AC3E}">
+        <p14:creationId xmlns:p14="http://schemas.microsoft.com/office/powerpoint/2010/main" val="1796969174"/>
+      </p:ext>
+    </p:extLst>
+  </p:cSld>
+  <p:clrMapOvr>
+    <a:masterClrMapping/>
+  </p:clrMapOvr>
+</p:sld>
+</file>
+
+<file path=ppt/slides/slide19.xml><?xml version="1.0" encoding="utf-8"?>
+<p:sld xmlns:a="http://schemas.openxmlformats.org/drawingml/2006/main" xmlns:r="http://schemas.openxmlformats.org/officeDocument/2006/relationships" xmlns:p="http://schemas.openxmlformats.org/presentationml/2006/main">
+  <p:cSld>
+    <p:spTree>
+      <p:nvGrpSpPr>
+        <p:cNvPr id="1" name=""/>
+        <p:cNvGrpSpPr/>
+        <p:nvPr/>
+      </p:nvGrpSpPr>
+      <p:grpSpPr>
+        <a:xfrm>
+          <a:off x="0" y="0"/>
+          <a:ext cx="0" cy="0"/>
+          <a:chOff x="0" y="0"/>
+          <a:chExt cx="0" cy="0"/>
+        </a:xfrm>
+      </p:grpSpPr>
+      <p:grpSp>
+        <p:nvGrpSpPr>
+          <p:cNvPr id="5" name="Group 4">
+            <a:extLst>
+              <a:ext uri="{FF2B5EF4-FFF2-40B4-BE49-F238E27FC236}">
+                <a16:creationId xmlns:a16="http://schemas.microsoft.com/office/drawing/2014/main" id="{CD15047C-BAEC-4A59-B5A0-33B79F391280}"/>
+              </a:ext>
+            </a:extLst>
+          </p:cNvPr>
+          <p:cNvGrpSpPr/>
+          <p:nvPr/>
+        </p:nvGrpSpPr>
+        <p:grpSpPr>
+          <a:xfrm>
+            <a:off x="313002" y="1"/>
+            <a:ext cx="3593394" cy="8596824"/>
+            <a:chOff x="313002" y="1"/>
+            <a:chExt cx="3593394" cy="8596824"/>
+          </a:xfrm>
+        </p:grpSpPr>
+        <p:pic>
+          <p:nvPicPr>
+            <p:cNvPr id="3" name="Picture 2">
+              <a:extLst>
+                <a:ext uri="{FF2B5EF4-FFF2-40B4-BE49-F238E27FC236}">
+                  <a16:creationId xmlns:a16="http://schemas.microsoft.com/office/drawing/2014/main" id="{15456AF1-9327-42D8-981D-0BED5AE93402}"/>
+                </a:ext>
+              </a:extLst>
+            </p:cNvPr>
+            <p:cNvPicPr>
+              <a:picLocks noChangeAspect="1"/>
+            </p:cNvPicPr>
+            <p:nvPr/>
+          </p:nvPicPr>
+          <p:blipFill>
+            <a:blip r:embed="rId2">
+              <a:extLst>
+                <a:ext uri="{28A0092B-C50C-407E-A947-70E740481C1C}">
+                  <a14:useLocalDpi xmlns:a14="http://schemas.microsoft.com/office/drawing/2010/main" val="0"/>
+                </a:ext>
+              </a:extLst>
+            </a:blip>
+            <a:stretch>
+              <a:fillRect/>
+            </a:stretch>
+          </p:blipFill>
+          <p:spPr>
+            <a:xfrm>
+              <a:off x="320017" y="1"/>
+              <a:ext cx="3557039" cy="2540742"/>
+            </a:xfrm>
+            <a:prstGeom prst="rect">
+              <a:avLst/>
+            </a:prstGeom>
+          </p:spPr>
+        </p:pic>
+        <p:pic>
+          <p:nvPicPr>
+            <p:cNvPr id="7" name="Picture 6">
+              <a:extLst>
+                <a:ext uri="{FF2B5EF4-FFF2-40B4-BE49-F238E27FC236}">
+                  <a16:creationId xmlns:a16="http://schemas.microsoft.com/office/drawing/2014/main" id="{3745AB38-F4A6-4015-B5F3-C3C67A94A8BA}"/>
+                </a:ext>
+              </a:extLst>
+            </p:cNvPr>
+            <p:cNvPicPr>
+              <a:picLocks noChangeAspect="1"/>
+            </p:cNvPicPr>
+            <p:nvPr/>
+          </p:nvPicPr>
+          <p:blipFill>
+            <a:blip r:embed="rId3">
+              <a:extLst>
+                <a:ext uri="{28A0092B-C50C-407E-A947-70E740481C1C}">
+                  <a14:useLocalDpi xmlns:a14="http://schemas.microsoft.com/office/drawing/2010/main" val="0"/>
+                </a:ext>
+              </a:extLst>
+            </a:blip>
+            <a:stretch>
+              <a:fillRect/>
+            </a:stretch>
+          </p:blipFill>
+          <p:spPr>
+            <a:xfrm>
+              <a:off x="313002" y="2117773"/>
+              <a:ext cx="3593394" cy="2566710"/>
+            </a:xfrm>
+            <a:prstGeom prst="rect">
+              <a:avLst/>
+            </a:prstGeom>
+          </p:spPr>
+        </p:pic>
+        <p:pic>
+          <p:nvPicPr>
+            <p:cNvPr id="2" name="Picture 1">
+              <a:extLst>
+                <a:ext uri="{FF2B5EF4-FFF2-40B4-BE49-F238E27FC236}">
+                  <a16:creationId xmlns:a16="http://schemas.microsoft.com/office/drawing/2014/main" id="{21539F28-B500-4D5C-8BC3-0AB13A315BF4}"/>
+                </a:ext>
+              </a:extLst>
+            </p:cNvPr>
+            <p:cNvPicPr>
+              <a:picLocks noChangeAspect="1"/>
+            </p:cNvPicPr>
+            <p:nvPr/>
+          </p:nvPicPr>
+          <p:blipFill>
+            <a:blip r:embed="rId4"/>
+            <a:stretch>
+              <a:fillRect/>
+            </a:stretch>
+          </p:blipFill>
+          <p:spPr>
+            <a:xfrm>
+              <a:off x="628651" y="4280534"/>
+              <a:ext cx="3248406" cy="2320290"/>
+            </a:xfrm>
+            <a:prstGeom prst="rect">
+              <a:avLst/>
+            </a:prstGeom>
+          </p:spPr>
+        </p:pic>
+        <p:pic>
+          <p:nvPicPr>
+            <p:cNvPr id="4" name="Picture 3">
+              <a:extLst>
+                <a:ext uri="{FF2B5EF4-FFF2-40B4-BE49-F238E27FC236}">
+                  <a16:creationId xmlns:a16="http://schemas.microsoft.com/office/drawing/2014/main" id="{AE26DAF7-0EF0-48BB-84F7-33A8ED9DDEE1}"/>
+                </a:ext>
+              </a:extLst>
+            </p:cNvPr>
+            <p:cNvPicPr>
+              <a:picLocks noChangeAspect="1"/>
+            </p:cNvPicPr>
+            <p:nvPr/>
+          </p:nvPicPr>
+          <p:blipFill>
+            <a:blip r:embed="rId5"/>
+            <a:stretch>
+              <a:fillRect/>
+            </a:stretch>
+          </p:blipFill>
+          <p:spPr>
+            <a:xfrm>
+              <a:off x="588081" y="6276535"/>
+              <a:ext cx="3248406" cy="2320290"/>
+            </a:xfrm>
+            <a:prstGeom prst="rect">
+              <a:avLst/>
+            </a:prstGeom>
+          </p:spPr>
+        </p:pic>
+      </p:grpSp>
+    </p:spTree>
+    <p:extLst>
+      <p:ext uri="{BB962C8B-B14F-4D97-AF65-F5344CB8AC3E}">
+        <p14:creationId xmlns:p14="http://schemas.microsoft.com/office/powerpoint/2010/main" val="3882482366"/>
+      </p:ext>
+    </p:extLst>
+  </p:cSld>
+  <p:clrMapOvr>
+    <a:masterClrMapping/>
+  </p:clrMapOvr>
 </p:sld>
 </file>
 
@@ -4883,6 +7786,397 @@
 </p:sld>
 </file>
 
+<file path=ppt/slides/slide20.xml><?xml version="1.0" encoding="utf-8"?>
+<p:sld xmlns:a="http://schemas.openxmlformats.org/drawingml/2006/main" xmlns:r="http://schemas.openxmlformats.org/officeDocument/2006/relationships" xmlns:p="http://schemas.openxmlformats.org/presentationml/2006/main">
+  <p:cSld>
+    <p:spTree>
+      <p:nvGrpSpPr>
+        <p:cNvPr id="1" name=""/>
+        <p:cNvGrpSpPr/>
+        <p:nvPr/>
+      </p:nvGrpSpPr>
+      <p:grpSpPr>
+        <a:xfrm>
+          <a:off x="0" y="0"/>
+          <a:ext cx="0" cy="0"/>
+          <a:chOff x="0" y="0"/>
+          <a:chExt cx="0" cy="0"/>
+        </a:xfrm>
+      </p:grpSpPr>
+      <p:grpSp>
+        <p:nvGrpSpPr>
+          <p:cNvPr id="22" name="Group 21">
+            <a:extLst>
+              <a:ext uri="{FF2B5EF4-FFF2-40B4-BE49-F238E27FC236}">
+                <a16:creationId xmlns:a16="http://schemas.microsoft.com/office/drawing/2014/main" id="{302D63A6-6FBA-456C-8ED5-13DBD5B30B7F}"/>
+              </a:ext>
+            </a:extLst>
+          </p:cNvPr>
+          <p:cNvGrpSpPr/>
+          <p:nvPr/>
+        </p:nvGrpSpPr>
+        <p:grpSpPr>
+          <a:xfrm>
+            <a:off x="167318" y="-13759"/>
+            <a:ext cx="3862071" cy="7614453"/>
+            <a:chOff x="167318" y="-13759"/>
+            <a:chExt cx="3862071" cy="7614453"/>
+          </a:xfrm>
+        </p:grpSpPr>
+        <p:grpSp>
+          <p:nvGrpSpPr>
+            <p:cNvPr id="17" name="Group 16">
+              <a:extLst>
+                <a:ext uri="{FF2B5EF4-FFF2-40B4-BE49-F238E27FC236}">
+                  <a16:creationId xmlns:a16="http://schemas.microsoft.com/office/drawing/2014/main" id="{20C6B191-E1F7-4CFD-9B21-6B4AC9C7EB21}"/>
+                </a:ext>
+              </a:extLst>
+            </p:cNvPr>
+            <p:cNvGrpSpPr/>
+            <p:nvPr/>
+          </p:nvGrpSpPr>
+          <p:grpSpPr>
+            <a:xfrm>
+              <a:off x="167318" y="-13759"/>
+              <a:ext cx="3862071" cy="7614453"/>
+              <a:chOff x="167318" y="-13759"/>
+              <a:chExt cx="3862071" cy="7614453"/>
+            </a:xfrm>
+          </p:grpSpPr>
+          <p:pic>
+            <p:nvPicPr>
+              <p:cNvPr id="13" name="Picture 12">
+                <a:extLst>
+                  <a:ext uri="{FF2B5EF4-FFF2-40B4-BE49-F238E27FC236}">
+                    <a16:creationId xmlns:a16="http://schemas.microsoft.com/office/drawing/2014/main" id="{4E64F57C-7F77-4D42-9BA3-B666E1C773FB}"/>
+                  </a:ext>
+                </a:extLst>
+              </p:cNvPr>
+              <p:cNvPicPr>
+                <a:picLocks noChangeAspect="1"/>
+              </p:cNvPicPr>
+              <p:nvPr/>
+            </p:nvPicPr>
+            <p:blipFill>
+              <a:blip r:embed="rId2">
+                <a:extLst>
+                  <a:ext uri="{28A0092B-C50C-407E-A947-70E740481C1C}">
+                    <a14:useLocalDpi xmlns:a14="http://schemas.microsoft.com/office/drawing/2010/main" val="0"/>
+                  </a:ext>
+                </a:extLst>
+              </a:blip>
+              <a:stretch>
+                <a:fillRect/>
+              </a:stretch>
+            </p:blipFill>
+            <p:spPr>
+              <a:xfrm>
+                <a:off x="414671" y="5447345"/>
+                <a:ext cx="3014690" cy="2153349"/>
+              </a:xfrm>
+              <a:prstGeom prst="rect">
+                <a:avLst/>
+              </a:prstGeom>
+            </p:spPr>
+          </p:pic>
+          <p:pic>
+            <p:nvPicPr>
+              <p:cNvPr id="11" name="Picture 10">
+                <a:extLst>
+                  <a:ext uri="{FF2B5EF4-FFF2-40B4-BE49-F238E27FC236}">
+                    <a16:creationId xmlns:a16="http://schemas.microsoft.com/office/drawing/2014/main" id="{1EAE7F7A-0992-4179-A597-1CFBB052805A}"/>
+                  </a:ext>
+                </a:extLst>
+              </p:cNvPr>
+              <p:cNvPicPr>
+                <a:picLocks noChangeAspect="1"/>
+              </p:cNvPicPr>
+              <p:nvPr/>
+            </p:nvPicPr>
+            <p:blipFill>
+              <a:blip r:embed="rId3">
+                <a:extLst>
+                  <a:ext uri="{28A0092B-C50C-407E-A947-70E740481C1C}">
+                    <a14:useLocalDpi xmlns:a14="http://schemas.microsoft.com/office/drawing/2010/main" val="0"/>
+                  </a:ext>
+                </a:extLst>
+              </a:blip>
+              <a:stretch>
+                <a:fillRect/>
+              </a:stretch>
+            </p:blipFill>
+            <p:spPr>
+              <a:xfrm>
+                <a:off x="447997" y="3715143"/>
+                <a:ext cx="2981364" cy="1796377"/>
+              </a:xfrm>
+              <a:prstGeom prst="rect">
+                <a:avLst/>
+              </a:prstGeom>
+            </p:spPr>
+          </p:pic>
+          <p:pic>
+            <p:nvPicPr>
+              <p:cNvPr id="9" name="Picture 8">
+                <a:extLst>
+                  <a:ext uri="{FF2B5EF4-FFF2-40B4-BE49-F238E27FC236}">
+                    <a16:creationId xmlns:a16="http://schemas.microsoft.com/office/drawing/2014/main" id="{B7D2541B-EDB2-4C21-9C2D-4F5A36D738D3}"/>
+                  </a:ext>
+                </a:extLst>
+              </p:cNvPr>
+              <p:cNvPicPr>
+                <a:picLocks noChangeAspect="1"/>
+              </p:cNvPicPr>
+              <p:nvPr/>
+            </p:nvPicPr>
+            <p:blipFill>
+              <a:blip r:embed="rId4">
+                <a:extLst>
+                  <a:ext uri="{28A0092B-C50C-407E-A947-70E740481C1C}">
+                    <a14:useLocalDpi xmlns:a14="http://schemas.microsoft.com/office/drawing/2010/main" val="0"/>
+                  </a:ext>
+                </a:extLst>
+              </a:blip>
+              <a:stretch>
+                <a:fillRect/>
+              </a:stretch>
+            </p:blipFill>
+            <p:spPr>
+              <a:xfrm>
+                <a:off x="167318" y="1835668"/>
+                <a:ext cx="3238930" cy="1914739"/>
+              </a:xfrm>
+              <a:prstGeom prst="rect">
+                <a:avLst/>
+              </a:prstGeom>
+            </p:spPr>
+          </p:pic>
+          <p:pic>
+            <p:nvPicPr>
+              <p:cNvPr id="7" name="Picture 6">
+                <a:extLst>
+                  <a:ext uri="{FF2B5EF4-FFF2-40B4-BE49-F238E27FC236}">
+                    <a16:creationId xmlns:a16="http://schemas.microsoft.com/office/drawing/2014/main" id="{97E014B1-85DC-4B5F-AA81-CD1BA20A4ED8}"/>
+                  </a:ext>
+                </a:extLst>
+              </p:cNvPr>
+              <p:cNvPicPr>
+                <a:picLocks noChangeAspect="1"/>
+              </p:cNvPicPr>
+              <p:nvPr/>
+            </p:nvPicPr>
+            <p:blipFill>
+              <a:blip r:embed="rId5">
+                <a:extLst>
+                  <a:ext uri="{28A0092B-C50C-407E-A947-70E740481C1C}">
+                    <a14:useLocalDpi xmlns:a14="http://schemas.microsoft.com/office/drawing/2010/main" val="0"/>
+                  </a:ext>
+                </a:extLst>
+              </a:blip>
+              <a:srcRect/>
+              <a:stretch/>
+            </p:blipFill>
+            <p:spPr>
+              <a:xfrm>
+                <a:off x="179117" y="-13759"/>
+                <a:ext cx="3195235" cy="1914739"/>
+              </a:xfrm>
+              <a:prstGeom prst="rect">
+                <a:avLst/>
+              </a:prstGeom>
+            </p:spPr>
+          </p:pic>
+          <p:pic>
+            <p:nvPicPr>
+              <p:cNvPr id="15" name="Picture 14">
+                <a:extLst>
+                  <a:ext uri="{FF2B5EF4-FFF2-40B4-BE49-F238E27FC236}">
+                    <a16:creationId xmlns:a16="http://schemas.microsoft.com/office/drawing/2014/main" id="{E6DD69DC-2DCB-4204-86AF-4AA8A96897AD}"/>
+                  </a:ext>
+                </a:extLst>
+              </p:cNvPr>
+              <p:cNvPicPr>
+                <a:picLocks noChangeAspect="1"/>
+              </p:cNvPicPr>
+              <p:nvPr/>
+            </p:nvPicPr>
+            <p:blipFill>
+              <a:blip r:embed="rId6">
+                <a:extLst>
+                  <a:ext uri="{28A0092B-C50C-407E-A947-70E740481C1C}">
+                    <a14:useLocalDpi xmlns:a14="http://schemas.microsoft.com/office/drawing/2010/main" val="0"/>
+                  </a:ext>
+                </a:extLst>
+              </a:blip>
+              <a:stretch>
+                <a:fillRect/>
+              </a:stretch>
+            </p:blipFill>
+            <p:spPr>
+              <a:xfrm>
+                <a:off x="3218598" y="246343"/>
+                <a:ext cx="810791" cy="1140724"/>
+              </a:xfrm>
+              <a:prstGeom prst="rect">
+                <a:avLst/>
+              </a:prstGeom>
+            </p:spPr>
+          </p:pic>
+        </p:grpSp>
+        <p:sp>
+          <p:nvSpPr>
+            <p:cNvPr id="18" name="TextBox 17">
+              <a:extLst>
+                <a:ext uri="{FF2B5EF4-FFF2-40B4-BE49-F238E27FC236}">
+                  <a16:creationId xmlns:a16="http://schemas.microsoft.com/office/drawing/2014/main" id="{2FDD6164-5191-4C5C-8B0E-FCB2C383F559}"/>
+                </a:ext>
+              </a:extLst>
+            </p:cNvPr>
+            <p:cNvSpPr txBox="1"/>
+            <p:nvPr/>
+          </p:nvSpPr>
+          <p:spPr>
+            <a:xfrm>
+              <a:off x="878495" y="1519697"/>
+              <a:ext cx="210793" cy="307777"/>
+            </a:xfrm>
+            <a:prstGeom prst="rect">
+              <a:avLst/>
+            </a:prstGeom>
+            <a:noFill/>
+          </p:spPr>
+          <p:txBody>
+            <a:bodyPr wrap="square" rtlCol="0">
+              <a:spAutoFit/>
+            </a:bodyPr>
+            <a:lstStyle/>
+            <a:p>
+              <a:r>
+                <a:rPr lang="en-US" sz="1400" dirty="0"/>
+                <a:t>A</a:t>
+              </a:r>
+            </a:p>
+          </p:txBody>
+        </p:sp>
+        <p:sp>
+          <p:nvSpPr>
+            <p:cNvPr id="19" name="TextBox 18">
+              <a:extLst>
+                <a:ext uri="{FF2B5EF4-FFF2-40B4-BE49-F238E27FC236}">
+                  <a16:creationId xmlns:a16="http://schemas.microsoft.com/office/drawing/2014/main" id="{06BAC056-F97C-4EC8-8DF3-2D4B2110E974}"/>
+                </a:ext>
+              </a:extLst>
+            </p:cNvPr>
+            <p:cNvSpPr txBox="1"/>
+            <p:nvPr/>
+          </p:nvSpPr>
+          <p:spPr>
+            <a:xfrm>
+              <a:off x="878494" y="3365439"/>
+              <a:ext cx="210793" cy="307777"/>
+            </a:xfrm>
+            <a:prstGeom prst="rect">
+              <a:avLst/>
+            </a:prstGeom>
+            <a:noFill/>
+          </p:spPr>
+          <p:txBody>
+            <a:bodyPr wrap="square" rtlCol="0">
+              <a:spAutoFit/>
+            </a:bodyPr>
+            <a:lstStyle/>
+            <a:p>
+              <a:r>
+                <a:rPr lang="en-US" sz="1400" dirty="0"/>
+                <a:t>B</a:t>
+              </a:r>
+            </a:p>
+          </p:txBody>
+        </p:sp>
+        <p:sp>
+          <p:nvSpPr>
+            <p:cNvPr id="20" name="TextBox 19">
+              <a:extLst>
+                <a:ext uri="{FF2B5EF4-FFF2-40B4-BE49-F238E27FC236}">
+                  <a16:creationId xmlns:a16="http://schemas.microsoft.com/office/drawing/2014/main" id="{9861B8E5-81B2-4D61-9F7D-FC957782B374}"/>
+                </a:ext>
+              </a:extLst>
+            </p:cNvPr>
+            <p:cNvSpPr txBox="1"/>
+            <p:nvPr/>
+          </p:nvSpPr>
+          <p:spPr>
+            <a:xfrm>
+              <a:off x="878494" y="5130010"/>
+              <a:ext cx="210793" cy="307777"/>
+            </a:xfrm>
+            <a:prstGeom prst="rect">
+              <a:avLst/>
+            </a:prstGeom>
+            <a:noFill/>
+          </p:spPr>
+          <p:txBody>
+            <a:bodyPr wrap="square" rtlCol="0">
+              <a:spAutoFit/>
+            </a:bodyPr>
+            <a:lstStyle/>
+            <a:p>
+              <a:r>
+                <a:rPr lang="en-US" sz="1400" dirty="0"/>
+                <a:t>C</a:t>
+              </a:r>
+            </a:p>
+          </p:txBody>
+        </p:sp>
+        <p:sp>
+          <p:nvSpPr>
+            <p:cNvPr id="21" name="TextBox 20">
+              <a:extLst>
+                <a:ext uri="{FF2B5EF4-FFF2-40B4-BE49-F238E27FC236}">
+                  <a16:creationId xmlns:a16="http://schemas.microsoft.com/office/drawing/2014/main" id="{3711D18A-DBDF-44D3-9C50-98D7C30C858F}"/>
+                </a:ext>
+              </a:extLst>
+            </p:cNvPr>
+            <p:cNvSpPr txBox="1"/>
+            <p:nvPr/>
+          </p:nvSpPr>
+          <p:spPr>
+            <a:xfrm>
+              <a:off x="878494" y="6879939"/>
+              <a:ext cx="210793" cy="307777"/>
+            </a:xfrm>
+            <a:prstGeom prst="rect">
+              <a:avLst/>
+            </a:prstGeom>
+            <a:noFill/>
+          </p:spPr>
+          <p:txBody>
+            <a:bodyPr wrap="square" rtlCol="0">
+              <a:spAutoFit/>
+            </a:bodyPr>
+            <a:lstStyle/>
+            <a:p>
+              <a:r>
+                <a:rPr lang="en-US" sz="1400" dirty="0"/>
+                <a:t>D</a:t>
+              </a:r>
+            </a:p>
+          </p:txBody>
+        </p:sp>
+      </p:grpSp>
+    </p:spTree>
+    <p:extLst>
+      <p:ext uri="{BB962C8B-B14F-4D97-AF65-F5344CB8AC3E}">
+        <p14:creationId xmlns:p14="http://schemas.microsoft.com/office/powerpoint/2010/main" val="1161502571"/>
+      </p:ext>
+    </p:extLst>
+  </p:cSld>
+  <p:clrMapOvr>
+    <a:masterClrMapping/>
+  </p:clrMapOvr>
+</p:sld>
+</file>
+
 <file path=ppt/slides/slide3.xml><?xml version="1.0" encoding="utf-8"?>
 <p:sld xmlns:a="http://schemas.openxmlformats.org/drawingml/2006/main" xmlns:r="http://schemas.openxmlformats.org/officeDocument/2006/relationships" xmlns:p="http://schemas.openxmlformats.org/presentationml/2006/main">
   <p:cSld>
@@ -4979,7 +8273,7 @@
         </p:nvSpPr>
         <p:spPr>
           <a:xfrm>
-            <a:off x="7592617" y="2716010"/>
+            <a:off x="7592617" y="2658860"/>
             <a:ext cx="210793" cy="461665"/>
           </a:xfrm>
           <a:prstGeom prst="rect">
@@ -5014,8 +8308,8 @@
         </p:nvSpPr>
         <p:spPr>
           <a:xfrm>
-            <a:off x="8046359" y="2722215"/>
-            <a:ext cx="619987" cy="461665"/>
+            <a:off x="8045450" y="2654300"/>
+            <a:ext cx="595496" cy="461665"/>
           </a:xfrm>
           <a:prstGeom prst="rect">
             <a:avLst/>
@@ -5639,6 +8933,537 @@
 </file>
 
 <file path=ppt/slides/slide4.xml><?xml version="1.0" encoding="utf-8"?>
+<p:sld xmlns:a="http://schemas.openxmlformats.org/drawingml/2006/main" xmlns:r="http://schemas.openxmlformats.org/officeDocument/2006/relationships" xmlns:p="http://schemas.openxmlformats.org/presentationml/2006/main">
+  <p:cSld>
+    <p:spTree>
+      <p:nvGrpSpPr>
+        <p:cNvPr id="1" name=""/>
+        <p:cNvGrpSpPr/>
+        <p:nvPr/>
+      </p:nvGrpSpPr>
+      <p:grpSpPr>
+        <a:xfrm>
+          <a:off x="0" y="0"/>
+          <a:ext cx="0" cy="0"/>
+          <a:chOff x="0" y="0"/>
+          <a:chExt cx="0" cy="0"/>
+        </a:xfrm>
+      </p:grpSpPr>
+      <p:pic>
+        <p:nvPicPr>
+          <p:cNvPr id="5" name="Picture 4">
+            <a:extLst>
+              <a:ext uri="{FF2B5EF4-FFF2-40B4-BE49-F238E27FC236}">
+                <a16:creationId xmlns:a16="http://schemas.microsoft.com/office/drawing/2014/main" id="{72D29FF4-2799-CBB5-403E-B7D1469A5998}"/>
+              </a:ext>
+            </a:extLst>
+          </p:cNvPr>
+          <p:cNvPicPr>
+            <a:picLocks noChangeAspect="1"/>
+          </p:cNvPicPr>
+          <p:nvPr/>
+        </p:nvPicPr>
+        <p:blipFill>
+          <a:blip r:embed="rId2">
+            <a:extLst>
+              <a:ext uri="{28A0092B-C50C-407E-A947-70E740481C1C}">
+                <a14:useLocalDpi xmlns:a14="http://schemas.microsoft.com/office/drawing/2010/main" val="0"/>
+              </a:ext>
+            </a:extLst>
+          </a:blip>
+          <a:stretch>
+            <a:fillRect/>
+          </a:stretch>
+        </p:blipFill>
+        <p:spPr>
+          <a:xfrm>
+            <a:off x="909126" y="571101"/>
+            <a:ext cx="7325747" cy="5715798"/>
+          </a:xfrm>
+          <a:prstGeom prst="rect">
+            <a:avLst/>
+          </a:prstGeom>
+        </p:spPr>
+      </p:pic>
+      <p:sp>
+        <p:nvSpPr>
+          <p:cNvPr id="6" name="TextBox 5">
+            <a:extLst>
+              <a:ext uri="{FF2B5EF4-FFF2-40B4-BE49-F238E27FC236}">
+                <a16:creationId xmlns:a16="http://schemas.microsoft.com/office/drawing/2014/main" id="{BF9CFA05-97C3-4566-DFA1-63A96A72A0BD}"/>
+              </a:ext>
+            </a:extLst>
+          </p:cNvPr>
+          <p:cNvSpPr txBox="1"/>
+          <p:nvPr/>
+        </p:nvSpPr>
+        <p:spPr>
+          <a:xfrm>
+            <a:off x="7567695" y="4162540"/>
+            <a:ext cx="210793" cy="461665"/>
+          </a:xfrm>
+          <a:prstGeom prst="rect">
+            <a:avLst/>
+          </a:prstGeom>
+          <a:noFill/>
+        </p:spPr>
+        <p:txBody>
+          <a:bodyPr wrap="square" rtlCol="0">
+            <a:spAutoFit/>
+          </a:bodyPr>
+          <a:lstStyle/>
+          <a:p>
+            <a:r>
+              <a:rPr lang="en-US" sz="2400" dirty="0"/>
+              <a:t>*</a:t>
+            </a:r>
+          </a:p>
+        </p:txBody>
+      </p:sp>
+      <p:sp>
+        <p:nvSpPr>
+          <p:cNvPr id="7" name="TextBox 6">
+            <a:extLst>
+              <a:ext uri="{FF2B5EF4-FFF2-40B4-BE49-F238E27FC236}">
+                <a16:creationId xmlns:a16="http://schemas.microsoft.com/office/drawing/2014/main" id="{80266BAD-3FD5-BA20-B9FC-EB014733C6BE}"/>
+              </a:ext>
+            </a:extLst>
+          </p:cNvPr>
+          <p:cNvSpPr txBox="1"/>
+          <p:nvPr/>
+        </p:nvSpPr>
+        <p:spPr>
+          <a:xfrm>
+            <a:off x="7942894" y="4157980"/>
+            <a:ext cx="595496" cy="461665"/>
+          </a:xfrm>
+          <a:prstGeom prst="rect">
+            <a:avLst/>
+          </a:prstGeom>
+          <a:noFill/>
+        </p:spPr>
+        <p:txBody>
+          <a:bodyPr wrap="square" rtlCol="0">
+            <a:spAutoFit/>
+          </a:bodyPr>
+          <a:lstStyle/>
+          <a:p>
+            <a:r>
+              <a:rPr lang="en-US" sz="2400" dirty="0"/>
+              <a:t>**</a:t>
+            </a:r>
+          </a:p>
+        </p:txBody>
+      </p:sp>
+      <p:sp>
+        <p:nvSpPr>
+          <p:cNvPr id="18" name="TextBox 17">
+            <a:extLst>
+              <a:ext uri="{FF2B5EF4-FFF2-40B4-BE49-F238E27FC236}">
+                <a16:creationId xmlns:a16="http://schemas.microsoft.com/office/drawing/2014/main" id="{83DB5CC2-19A5-3A49-F7EF-4A75C2C25309}"/>
+              </a:ext>
+            </a:extLst>
+          </p:cNvPr>
+          <p:cNvSpPr txBox="1"/>
+          <p:nvPr/>
+        </p:nvSpPr>
+        <p:spPr>
+          <a:xfrm>
+            <a:off x="7185740" y="3134222"/>
+            <a:ext cx="1242268" cy="584775"/>
+          </a:xfrm>
+          <a:prstGeom prst="rect">
+            <a:avLst/>
+          </a:prstGeom>
+          <a:noFill/>
+        </p:spPr>
+        <p:txBody>
+          <a:bodyPr wrap="square">
+            <a:spAutoFit/>
+          </a:bodyPr>
+          <a:lstStyle/>
+          <a:p>
+            <a:r>
+              <a:rPr lang="en-US" sz="1600" dirty="0"/>
+              <a:t>  * p &lt; 0.05 </a:t>
+            </a:r>
+          </a:p>
+          <a:p>
+            <a:r>
+              <a:rPr lang="en-US" sz="1600" dirty="0"/>
+              <a:t>** p &lt; 0.01</a:t>
+            </a:r>
+          </a:p>
+        </p:txBody>
+      </p:sp>
+      <p:sp>
+        <p:nvSpPr>
+          <p:cNvPr id="20" name="TextBox 19">
+            <a:extLst>
+              <a:ext uri="{FF2B5EF4-FFF2-40B4-BE49-F238E27FC236}">
+                <a16:creationId xmlns:a16="http://schemas.microsoft.com/office/drawing/2014/main" id="{3CEF5B32-86A2-B532-9020-91B4E3E1B0CD}"/>
+              </a:ext>
+            </a:extLst>
+          </p:cNvPr>
+          <p:cNvSpPr txBox="1"/>
+          <p:nvPr/>
+        </p:nvSpPr>
+        <p:spPr>
+          <a:xfrm>
+            <a:off x="6275122" y="1153126"/>
+            <a:ext cx="595496" cy="461665"/>
+          </a:xfrm>
+          <a:prstGeom prst="rect">
+            <a:avLst/>
+          </a:prstGeom>
+          <a:noFill/>
+        </p:spPr>
+        <p:txBody>
+          <a:bodyPr wrap="square" rtlCol="0">
+            <a:spAutoFit/>
+          </a:bodyPr>
+          <a:lstStyle/>
+          <a:p>
+            <a:r>
+              <a:rPr lang="en-US" sz="2400" dirty="0"/>
+              <a:t>**</a:t>
+            </a:r>
+          </a:p>
+        </p:txBody>
+      </p:sp>
+      <p:sp>
+        <p:nvSpPr>
+          <p:cNvPr id="21" name="TextBox 20">
+            <a:extLst>
+              <a:ext uri="{FF2B5EF4-FFF2-40B4-BE49-F238E27FC236}">
+                <a16:creationId xmlns:a16="http://schemas.microsoft.com/office/drawing/2014/main" id="{BDF3CC31-6386-CFDA-0715-F72624921D6A}"/>
+              </a:ext>
+            </a:extLst>
+          </p:cNvPr>
+          <p:cNvSpPr txBox="1"/>
+          <p:nvPr/>
+        </p:nvSpPr>
+        <p:spPr>
+          <a:xfrm>
+            <a:off x="7944377" y="985157"/>
+            <a:ext cx="210793" cy="461665"/>
+          </a:xfrm>
+          <a:prstGeom prst="rect">
+            <a:avLst/>
+          </a:prstGeom>
+          <a:noFill/>
+        </p:spPr>
+        <p:txBody>
+          <a:bodyPr wrap="square" rtlCol="0">
+            <a:spAutoFit/>
+          </a:bodyPr>
+          <a:lstStyle/>
+          <a:p>
+            <a:r>
+              <a:rPr lang="en-US" sz="2400" dirty="0"/>
+              <a:t>*</a:t>
+            </a:r>
+          </a:p>
+        </p:txBody>
+      </p:sp>
+    </p:spTree>
+    <p:extLst>
+      <p:ext uri="{BB962C8B-B14F-4D97-AF65-F5344CB8AC3E}">
+        <p14:creationId xmlns:p14="http://schemas.microsoft.com/office/powerpoint/2010/main" val="1487403460"/>
+      </p:ext>
+    </p:extLst>
+  </p:cSld>
+  <p:clrMapOvr>
+    <a:masterClrMapping/>
+  </p:clrMapOvr>
+</p:sld>
+</file>
+
+<file path=ppt/slides/slide5.xml><?xml version="1.0" encoding="utf-8"?>
+<p:sld xmlns:a="http://schemas.openxmlformats.org/drawingml/2006/main" xmlns:r="http://schemas.openxmlformats.org/officeDocument/2006/relationships" xmlns:p="http://schemas.openxmlformats.org/presentationml/2006/main">
+  <p:cSld>
+    <p:spTree>
+      <p:nvGrpSpPr>
+        <p:cNvPr id="1" name=""/>
+        <p:cNvGrpSpPr/>
+        <p:nvPr/>
+      </p:nvGrpSpPr>
+      <p:grpSpPr>
+        <a:xfrm>
+          <a:off x="0" y="0"/>
+          <a:ext cx="0" cy="0"/>
+          <a:chOff x="0" y="0"/>
+          <a:chExt cx="0" cy="0"/>
+        </a:xfrm>
+      </p:grpSpPr>
+      <p:grpSp>
+        <p:nvGrpSpPr>
+          <p:cNvPr id="9" name="Group 8">
+            <a:extLst>
+              <a:ext uri="{FF2B5EF4-FFF2-40B4-BE49-F238E27FC236}">
+                <a16:creationId xmlns:a16="http://schemas.microsoft.com/office/drawing/2014/main" id="{DF37F403-BFAB-40A3-8960-86240219ED92}"/>
+              </a:ext>
+            </a:extLst>
+          </p:cNvPr>
+          <p:cNvGrpSpPr/>
+          <p:nvPr/>
+        </p:nvGrpSpPr>
+        <p:grpSpPr>
+          <a:xfrm>
+            <a:off x="923416" y="571101"/>
+            <a:ext cx="8278073" cy="5715798"/>
+            <a:chOff x="923416" y="571101"/>
+            <a:chExt cx="8278073" cy="5715798"/>
+          </a:xfrm>
+        </p:grpSpPr>
+        <p:pic>
+          <p:nvPicPr>
+            <p:cNvPr id="3" name="Picture 2">
+              <a:extLst>
+                <a:ext uri="{FF2B5EF4-FFF2-40B4-BE49-F238E27FC236}">
+                  <a16:creationId xmlns:a16="http://schemas.microsoft.com/office/drawing/2014/main" id="{75987913-85B8-84C0-8BEC-3029669E2834}"/>
+                </a:ext>
+              </a:extLst>
+            </p:cNvPr>
+            <p:cNvPicPr>
+              <a:picLocks noChangeAspect="1"/>
+            </p:cNvPicPr>
+            <p:nvPr/>
+          </p:nvPicPr>
+          <p:blipFill>
+            <a:blip r:embed="rId2">
+              <a:extLst>
+                <a:ext uri="{28A0092B-C50C-407E-A947-70E740481C1C}">
+                  <a14:useLocalDpi xmlns:a14="http://schemas.microsoft.com/office/drawing/2010/main" val="0"/>
+                </a:ext>
+              </a:extLst>
+            </a:blip>
+            <a:stretch>
+              <a:fillRect/>
+            </a:stretch>
+          </p:blipFill>
+          <p:spPr>
+            <a:xfrm>
+              <a:off x="923416" y="571101"/>
+              <a:ext cx="7297168" cy="5715798"/>
+            </a:xfrm>
+            <a:prstGeom prst="rect">
+              <a:avLst/>
+            </a:prstGeom>
+          </p:spPr>
+        </p:pic>
+        <p:sp>
+          <p:nvSpPr>
+            <p:cNvPr id="4" name="TextBox 3">
+              <a:extLst>
+                <a:ext uri="{FF2B5EF4-FFF2-40B4-BE49-F238E27FC236}">
+                  <a16:creationId xmlns:a16="http://schemas.microsoft.com/office/drawing/2014/main" id="{6CBFA660-BA9C-8329-74A8-3CFB5ADFEE84}"/>
+                </a:ext>
+              </a:extLst>
+            </p:cNvPr>
+            <p:cNvSpPr txBox="1"/>
+            <p:nvPr/>
+          </p:nvSpPr>
+          <p:spPr>
+            <a:xfrm>
+              <a:off x="7567695" y="4162540"/>
+              <a:ext cx="210793" cy="461665"/>
+            </a:xfrm>
+            <a:prstGeom prst="rect">
+              <a:avLst/>
+            </a:prstGeom>
+            <a:noFill/>
+          </p:spPr>
+          <p:txBody>
+            <a:bodyPr wrap="square" rtlCol="0">
+              <a:spAutoFit/>
+            </a:bodyPr>
+            <a:lstStyle/>
+            <a:p>
+              <a:r>
+                <a:rPr lang="en-US" sz="2400" dirty="0"/>
+                <a:t>*</a:t>
+              </a:r>
+            </a:p>
+          </p:txBody>
+        </p:sp>
+        <p:sp>
+          <p:nvSpPr>
+            <p:cNvPr id="5" name="TextBox 4">
+              <a:extLst>
+                <a:ext uri="{FF2B5EF4-FFF2-40B4-BE49-F238E27FC236}">
+                  <a16:creationId xmlns:a16="http://schemas.microsoft.com/office/drawing/2014/main" id="{6DCD26CB-5516-5358-8A6D-CD98E69BE5C6}"/>
+                </a:ext>
+              </a:extLst>
+            </p:cNvPr>
+            <p:cNvSpPr txBox="1"/>
+            <p:nvPr/>
+          </p:nvSpPr>
+          <p:spPr>
+            <a:xfrm>
+              <a:off x="7942894" y="4157980"/>
+              <a:ext cx="595496" cy="461665"/>
+            </a:xfrm>
+            <a:prstGeom prst="rect">
+              <a:avLst/>
+            </a:prstGeom>
+            <a:noFill/>
+          </p:spPr>
+          <p:txBody>
+            <a:bodyPr wrap="square" rtlCol="0">
+              <a:spAutoFit/>
+            </a:bodyPr>
+            <a:lstStyle/>
+            <a:p>
+              <a:r>
+                <a:rPr lang="en-US" sz="2400" dirty="0"/>
+                <a:t>**</a:t>
+              </a:r>
+            </a:p>
+          </p:txBody>
+        </p:sp>
+        <p:sp>
+          <p:nvSpPr>
+            <p:cNvPr id="6" name="TextBox 5">
+              <a:extLst>
+                <a:ext uri="{FF2B5EF4-FFF2-40B4-BE49-F238E27FC236}">
+                  <a16:creationId xmlns:a16="http://schemas.microsoft.com/office/drawing/2014/main" id="{050CE097-FFD2-B3BC-9F60-BFAF2EE794AC}"/>
+                </a:ext>
+              </a:extLst>
+            </p:cNvPr>
+            <p:cNvSpPr txBox="1"/>
+            <p:nvPr/>
+          </p:nvSpPr>
+          <p:spPr>
+            <a:xfrm>
+              <a:off x="6898056" y="3074990"/>
+              <a:ext cx="2303433" cy="707886"/>
+            </a:xfrm>
+            <a:prstGeom prst="rect">
+              <a:avLst/>
+            </a:prstGeom>
+            <a:noFill/>
+          </p:spPr>
+          <p:txBody>
+            <a:bodyPr wrap="square">
+              <a:spAutoFit/>
+            </a:bodyPr>
+            <a:lstStyle/>
+            <a:p>
+              <a:r>
+                <a:rPr lang="en-US" sz="2000" dirty="0"/>
+                <a:t>  * </a:t>
+              </a:r>
+              <a:r>
+                <a:rPr lang="en-US" sz="2000" i="1" dirty="0"/>
+                <a:t>p</a:t>
+              </a:r>
+              <a:r>
+                <a:rPr lang="en-US" sz="2000" dirty="0"/>
+                <a:t> &lt; 0.05 </a:t>
+              </a:r>
+            </a:p>
+            <a:p>
+              <a:r>
+                <a:rPr lang="en-US" sz="2000" dirty="0"/>
+                <a:t>** </a:t>
+              </a:r>
+              <a:r>
+                <a:rPr lang="en-US" sz="2000" i="1" dirty="0"/>
+                <a:t>p</a:t>
+              </a:r>
+              <a:r>
+                <a:rPr lang="en-US" sz="2000" dirty="0"/>
+                <a:t> &lt; 0.01</a:t>
+              </a:r>
+            </a:p>
+          </p:txBody>
+        </p:sp>
+        <p:sp>
+          <p:nvSpPr>
+            <p:cNvPr id="7" name="TextBox 6">
+              <a:extLst>
+                <a:ext uri="{FF2B5EF4-FFF2-40B4-BE49-F238E27FC236}">
+                  <a16:creationId xmlns:a16="http://schemas.microsoft.com/office/drawing/2014/main" id="{5BF024ED-B3CB-789D-2192-F0B1CC89764F}"/>
+                </a:ext>
+              </a:extLst>
+            </p:cNvPr>
+            <p:cNvSpPr txBox="1"/>
+            <p:nvPr/>
+          </p:nvSpPr>
+          <p:spPr>
+            <a:xfrm>
+              <a:off x="6275122" y="1153126"/>
+              <a:ext cx="595496" cy="461665"/>
+            </a:xfrm>
+            <a:prstGeom prst="rect">
+              <a:avLst/>
+            </a:prstGeom>
+            <a:noFill/>
+          </p:spPr>
+          <p:txBody>
+            <a:bodyPr wrap="square" rtlCol="0">
+              <a:spAutoFit/>
+            </a:bodyPr>
+            <a:lstStyle/>
+            <a:p>
+              <a:r>
+                <a:rPr lang="en-US" sz="2400" dirty="0"/>
+                <a:t>**</a:t>
+              </a:r>
+            </a:p>
+          </p:txBody>
+        </p:sp>
+        <p:sp>
+          <p:nvSpPr>
+            <p:cNvPr id="8" name="TextBox 7">
+              <a:extLst>
+                <a:ext uri="{FF2B5EF4-FFF2-40B4-BE49-F238E27FC236}">
+                  <a16:creationId xmlns:a16="http://schemas.microsoft.com/office/drawing/2014/main" id="{DB9A4EBF-77DF-D364-0930-AAB7C53ACF57}"/>
+                </a:ext>
+              </a:extLst>
+            </p:cNvPr>
+            <p:cNvSpPr txBox="1"/>
+            <p:nvPr/>
+          </p:nvSpPr>
+          <p:spPr>
+            <a:xfrm>
+              <a:off x="7944377" y="985157"/>
+              <a:ext cx="210793" cy="461665"/>
+            </a:xfrm>
+            <a:prstGeom prst="rect">
+              <a:avLst/>
+            </a:prstGeom>
+            <a:noFill/>
+          </p:spPr>
+          <p:txBody>
+            <a:bodyPr wrap="square" rtlCol="0">
+              <a:spAutoFit/>
+            </a:bodyPr>
+            <a:lstStyle/>
+            <a:p>
+              <a:r>
+                <a:rPr lang="en-US" sz="2400" dirty="0"/>
+                <a:t>*</a:t>
+              </a:r>
+            </a:p>
+          </p:txBody>
+        </p:sp>
+      </p:grpSp>
+    </p:spTree>
+    <p:extLst>
+      <p:ext uri="{BB962C8B-B14F-4D97-AF65-F5344CB8AC3E}">
+        <p14:creationId xmlns:p14="http://schemas.microsoft.com/office/powerpoint/2010/main" val="2585554342"/>
+      </p:ext>
+    </p:extLst>
+  </p:cSld>
+  <p:clrMapOvr>
+    <a:masterClrMapping/>
+  </p:clrMapOvr>
+</p:sld>
+</file>
+
+<file path=ppt/slides/slide6.xml><?xml version="1.0" encoding="utf-8"?>
 <p:sld xmlns:a="http://schemas.openxmlformats.org/drawingml/2006/main" xmlns:r="http://schemas.openxmlformats.org/officeDocument/2006/relationships" xmlns:p="http://schemas.openxmlformats.org/presentationml/2006/main">
   <p:cSld>
     <p:spTree>
@@ -7014,7 +10839,7 @@
 </p:sld>
 </file>
 
-<file path=ppt/slides/slide5.xml><?xml version="1.0" encoding="utf-8"?>
+<file path=ppt/slides/slide7.xml><?xml version="1.0" encoding="utf-8"?>
 <p:sld xmlns:a="http://schemas.openxmlformats.org/drawingml/2006/main" xmlns:r="http://schemas.openxmlformats.org/officeDocument/2006/relationships" xmlns:p="http://schemas.openxmlformats.org/presentationml/2006/main">
   <p:cSld>
     <p:spTree>
@@ -7181,7 +11006,7 @@
 </p:sld>
 </file>
 
-<file path=ppt/slides/slide6.xml><?xml version="1.0" encoding="utf-8"?>
+<file path=ppt/slides/slide8.xml><?xml version="1.0" encoding="utf-8"?>
 <p:sld xmlns:a="http://schemas.openxmlformats.org/drawingml/2006/main" xmlns:r="http://schemas.openxmlformats.org/officeDocument/2006/relationships" xmlns:p="http://schemas.openxmlformats.org/presentationml/2006/main">
   <p:cSld>
     <p:spTree>
@@ -7512,7 +11337,7 @@
 </p:sld>
 </file>
 
-<file path=ppt/slides/slide7.xml><?xml version="1.0" encoding="utf-8"?>
+<file path=ppt/slides/slide9.xml><?xml version="1.0" encoding="utf-8"?>
 <p:sld xmlns:a="http://schemas.openxmlformats.org/drawingml/2006/main" xmlns:r="http://schemas.openxmlformats.org/officeDocument/2006/relationships" xmlns:p="http://schemas.openxmlformats.org/presentationml/2006/main">
   <p:cSld>
     <p:spTree>
@@ -8714,118 +12539,6 @@
 </p:sld>
 </file>
 
-<file path=ppt/slides/slide8.xml><?xml version="1.0" encoding="utf-8"?>
-<p:sld xmlns:a="http://schemas.openxmlformats.org/drawingml/2006/main" xmlns:r="http://schemas.openxmlformats.org/officeDocument/2006/relationships" xmlns:p="http://schemas.openxmlformats.org/presentationml/2006/main">
-  <p:cSld>
-    <p:spTree>
-      <p:nvGrpSpPr>
-        <p:cNvPr id="1" name=""/>
-        <p:cNvGrpSpPr/>
-        <p:nvPr/>
-      </p:nvGrpSpPr>
-      <p:grpSpPr>
-        <a:xfrm>
-          <a:off x="0" y="0"/>
-          <a:ext cx="0" cy="0"/>
-          <a:chOff x="0" y="0"/>
-          <a:chExt cx="0" cy="0"/>
-        </a:xfrm>
-      </p:grpSpPr>
-      <p:sp>
-        <p:nvSpPr>
-          <p:cNvPr id="3" name="Title 2">
-            <a:extLst>
-              <a:ext uri="{FF2B5EF4-FFF2-40B4-BE49-F238E27FC236}">
-                <a16:creationId xmlns:a16="http://schemas.microsoft.com/office/drawing/2014/main" id="{5FD93C3D-6D1F-4531-892F-ED7128FAEC8E}"/>
-              </a:ext>
-            </a:extLst>
-          </p:cNvPr>
-          <p:cNvSpPr>
-            <a:spLocks noGrp="1"/>
-          </p:cNvSpPr>
-          <p:nvPr>
-            <p:ph type="title"/>
-          </p:nvPr>
-        </p:nvSpPr>
-        <p:spPr/>
-        <p:txBody>
-          <a:bodyPr/>
-          <a:lstStyle/>
-          <a:p>
-            <a:r>
-              <a:rPr lang="en-US" dirty="0"/>
-              <a:t>Subcanopy NPP is </a:t>
-            </a:r>
-            <a:r>
-              <a:rPr lang="en-US" i="1" dirty="0"/>
-              <a:t>not</a:t>
-            </a:r>
-            <a:r>
-              <a:rPr lang="en-US" dirty="0"/>
-              <a:t> well predicted by subcanopy </a:t>
-            </a:r>
-            <a:r>
-              <a:rPr lang="en-US" dirty="0" err="1"/>
-              <a:t>A</a:t>
-            </a:r>
-            <a:r>
-              <a:rPr lang="en-US" baseline="-25000" dirty="0" err="1"/>
-              <a:t>sat</a:t>
-            </a:r>
-            <a:r>
-              <a:rPr lang="en-US" dirty="0"/>
-              <a:t> alone</a:t>
-            </a:r>
-          </a:p>
-        </p:txBody>
-      </p:sp>
-      <p:pic>
-        <p:nvPicPr>
-          <p:cNvPr id="9" name="Content Placeholder 8">
-            <a:extLst>
-              <a:ext uri="{FF2B5EF4-FFF2-40B4-BE49-F238E27FC236}">
-                <a16:creationId xmlns:a16="http://schemas.microsoft.com/office/drawing/2014/main" id="{98D1C94B-DB38-4599-9E56-3A80A1FC47C2}"/>
-              </a:ext>
-            </a:extLst>
-          </p:cNvPr>
-          <p:cNvPicPr>
-            <a:picLocks noGrp="1" noChangeAspect="1"/>
-          </p:cNvPicPr>
-          <p:nvPr>
-            <p:ph idx="1"/>
-          </p:nvPr>
-        </p:nvPicPr>
-        <p:blipFill>
-          <a:blip r:embed="rId2">
-            <a:extLst>
-              <a:ext uri="{28A0092B-C50C-407E-A947-70E740481C1C}">
-                <a14:useLocalDpi xmlns:a14="http://schemas.microsoft.com/office/drawing/2010/main" val="0"/>
-              </a:ext>
-            </a:extLst>
-          </a:blip>
-          <a:srcRect/>
-          <a:stretch/>
-        </p:blipFill>
-        <p:spPr>
-          <a:xfrm>
-            <a:off x="979616" y="1825625"/>
-            <a:ext cx="7184767" cy="4351337"/>
-          </a:xfrm>
-        </p:spPr>
-      </p:pic>
-    </p:spTree>
-    <p:extLst>
-      <p:ext uri="{BB962C8B-B14F-4D97-AF65-F5344CB8AC3E}">
-        <p14:creationId xmlns:p14="http://schemas.microsoft.com/office/powerpoint/2010/main" val="3275953508"/>
-      </p:ext>
-    </p:extLst>
-  </p:cSld>
-  <p:clrMapOvr>
-    <a:masterClrMapping/>
-  </p:clrMapOvr>
-</p:sld>
-</file>
-
 <file path=ppt/theme/theme1.xml><?xml version="1.0" encoding="utf-8"?>
 <a:theme xmlns:a="http://schemas.openxmlformats.org/drawingml/2006/main" name="Office Theme">
   <a:themeElements>

</xml_diff>

<commit_message>
a few more changes prior to resubmission to FFGC
</commit_message>
<xml_diff>
--- a/docs/draft_figs_Ch2_manuscript.pptx
+++ b/docs/draft_figs_Ch2_manuscript.pptx
@@ -10,21 +10,25 @@
     <p:sldId id="257" r:id="rId4"/>
     <p:sldId id="283" r:id="rId5"/>
     <p:sldId id="284" r:id="rId6"/>
-    <p:sldId id="258" r:id="rId7"/>
-    <p:sldId id="272" r:id="rId8"/>
-    <p:sldId id="261" r:id="rId9"/>
-    <p:sldId id="266" r:id="rId10"/>
-    <p:sldId id="271" r:id="rId11"/>
-    <p:sldId id="273" r:id="rId12"/>
-    <p:sldId id="274" r:id="rId13"/>
-    <p:sldId id="275" r:id="rId14"/>
-    <p:sldId id="276" r:id="rId15"/>
-    <p:sldId id="280" r:id="rId16"/>
-    <p:sldId id="281" r:id="rId17"/>
-    <p:sldId id="277" r:id="rId18"/>
-    <p:sldId id="282" r:id="rId19"/>
-    <p:sldId id="278" r:id="rId20"/>
-    <p:sldId id="279" r:id="rId21"/>
+    <p:sldId id="285" r:id="rId7"/>
+    <p:sldId id="258" r:id="rId8"/>
+    <p:sldId id="272" r:id="rId9"/>
+    <p:sldId id="261" r:id="rId10"/>
+    <p:sldId id="266" r:id="rId11"/>
+    <p:sldId id="271" r:id="rId12"/>
+    <p:sldId id="273" r:id="rId13"/>
+    <p:sldId id="274" r:id="rId14"/>
+    <p:sldId id="275" r:id="rId15"/>
+    <p:sldId id="276" r:id="rId16"/>
+    <p:sldId id="280" r:id="rId17"/>
+    <p:sldId id="281" r:id="rId18"/>
+    <p:sldId id="277" r:id="rId19"/>
+    <p:sldId id="282" r:id="rId20"/>
+    <p:sldId id="278" r:id="rId21"/>
+    <p:sldId id="279" r:id="rId22"/>
+    <p:sldId id="286" r:id="rId23"/>
+    <p:sldId id="287" r:id="rId24"/>
+    <p:sldId id="288" r:id="rId25"/>
   </p:sldIdLst>
   <p:sldSz cx="9144000" cy="6858000" type="screen4x3"/>
   <p:notesSz cx="6858000" cy="9144000"/>
@@ -262,7 +266,7 @@
           <a:p>
             <a:fld id="{FACB04D5-96DD-4806-A651-9F27C349FD0D}" type="datetimeFigureOut">
               <a:rPr lang="en-US" smtClean="0"/>
-              <a:t>8/21/2022</a:t>
+              <a:t>1/23/2023</a:t>
             </a:fld>
             <a:endParaRPr lang="en-US"/>
           </a:p>
@@ -432,7 +436,7 @@
           <a:p>
             <a:fld id="{FACB04D5-96DD-4806-A651-9F27C349FD0D}" type="datetimeFigureOut">
               <a:rPr lang="en-US" smtClean="0"/>
-              <a:t>8/21/2022</a:t>
+              <a:t>1/23/2023</a:t>
             </a:fld>
             <a:endParaRPr lang="en-US"/>
           </a:p>
@@ -612,7 +616,7 @@
           <a:p>
             <a:fld id="{FACB04D5-96DD-4806-A651-9F27C349FD0D}" type="datetimeFigureOut">
               <a:rPr lang="en-US" smtClean="0"/>
-              <a:t>8/21/2022</a:t>
+              <a:t>1/23/2023</a:t>
             </a:fld>
             <a:endParaRPr lang="en-US"/>
           </a:p>
@@ -782,7 +786,7 @@
           <a:p>
             <a:fld id="{FACB04D5-96DD-4806-A651-9F27C349FD0D}" type="datetimeFigureOut">
               <a:rPr lang="en-US" smtClean="0"/>
-              <a:t>8/21/2022</a:t>
+              <a:t>1/23/2023</a:t>
             </a:fld>
             <a:endParaRPr lang="en-US"/>
           </a:p>
@@ -1026,7 +1030,7 @@
           <a:p>
             <a:fld id="{FACB04D5-96DD-4806-A651-9F27C349FD0D}" type="datetimeFigureOut">
               <a:rPr lang="en-US" smtClean="0"/>
-              <a:t>8/21/2022</a:t>
+              <a:t>1/23/2023</a:t>
             </a:fld>
             <a:endParaRPr lang="en-US"/>
           </a:p>
@@ -1258,7 +1262,7 @@
           <a:p>
             <a:fld id="{FACB04D5-96DD-4806-A651-9F27C349FD0D}" type="datetimeFigureOut">
               <a:rPr lang="en-US" smtClean="0"/>
-              <a:t>8/21/2022</a:t>
+              <a:t>1/23/2023</a:t>
             </a:fld>
             <a:endParaRPr lang="en-US"/>
           </a:p>
@@ -1625,7 +1629,7 @@
           <a:p>
             <a:fld id="{FACB04D5-96DD-4806-A651-9F27C349FD0D}" type="datetimeFigureOut">
               <a:rPr lang="en-US" smtClean="0"/>
-              <a:t>8/21/2022</a:t>
+              <a:t>1/23/2023</a:t>
             </a:fld>
             <a:endParaRPr lang="en-US"/>
           </a:p>
@@ -1743,7 +1747,7 @@
           <a:p>
             <a:fld id="{FACB04D5-96DD-4806-A651-9F27C349FD0D}" type="datetimeFigureOut">
               <a:rPr lang="en-US" smtClean="0"/>
-              <a:t>8/21/2022</a:t>
+              <a:t>1/23/2023</a:t>
             </a:fld>
             <a:endParaRPr lang="en-US"/>
           </a:p>
@@ -1838,7 +1842,7 @@
           <a:p>
             <a:fld id="{FACB04D5-96DD-4806-A651-9F27C349FD0D}" type="datetimeFigureOut">
               <a:rPr lang="en-US" smtClean="0"/>
-              <a:t>8/21/2022</a:t>
+              <a:t>1/23/2023</a:t>
             </a:fld>
             <a:endParaRPr lang="en-US"/>
           </a:p>
@@ -2115,7 +2119,7 @@
           <a:p>
             <a:fld id="{FACB04D5-96DD-4806-A651-9F27C349FD0D}" type="datetimeFigureOut">
               <a:rPr lang="en-US" smtClean="0"/>
-              <a:t>8/21/2022</a:t>
+              <a:t>1/23/2023</a:t>
             </a:fld>
             <a:endParaRPr lang="en-US"/>
           </a:p>
@@ -2372,7 +2376,7 @@
           <a:p>
             <a:fld id="{FACB04D5-96DD-4806-A651-9F27C349FD0D}" type="datetimeFigureOut">
               <a:rPr lang="en-US" smtClean="0"/>
-              <a:t>8/21/2022</a:t>
+              <a:t>1/23/2023</a:t>
             </a:fld>
             <a:endParaRPr lang="en-US"/>
           </a:p>
@@ -2585,7 +2589,7 @@
           <a:p>
             <a:fld id="{FACB04D5-96DD-4806-A651-9F27C349FD0D}" type="datetimeFigureOut">
               <a:rPr lang="en-US" smtClean="0"/>
-              <a:t>8/21/2022</a:t>
+              <a:t>1/23/2023</a:t>
             </a:fld>
             <a:endParaRPr lang="en-US"/>
           </a:p>
@@ -4277,6 +4281,1208 @@
       </p:grpSpPr>
       <p:sp>
         <p:nvSpPr>
+          <p:cNvPr id="2" name="Title 1">
+            <a:extLst>
+              <a:ext uri="{FF2B5EF4-FFF2-40B4-BE49-F238E27FC236}">
+                <a16:creationId xmlns:a16="http://schemas.microsoft.com/office/drawing/2014/main" id="{8E84F6F4-F3B9-4672-B944-E50C0187ABDF}"/>
+              </a:ext>
+            </a:extLst>
+          </p:cNvPr>
+          <p:cNvSpPr>
+            <a:spLocks noGrp="1"/>
+          </p:cNvSpPr>
+          <p:nvPr>
+            <p:ph type="title"/>
+          </p:nvPr>
+        </p:nvSpPr>
+        <p:spPr/>
+        <p:txBody>
+          <a:bodyPr/>
+          <a:lstStyle/>
+          <a:p>
+            <a:r>
+              <a:rPr lang="en-US" dirty="0"/>
+              <a:t>Subcanopy NPP</a:t>
+            </a:r>
+          </a:p>
+        </p:txBody>
+      </p:sp>
+      <p:pic>
+        <p:nvPicPr>
+          <p:cNvPr id="5" name="Picture 4">
+            <a:extLst>
+              <a:ext uri="{FF2B5EF4-FFF2-40B4-BE49-F238E27FC236}">
+                <a16:creationId xmlns:a16="http://schemas.microsoft.com/office/drawing/2014/main" id="{46D4F526-9E33-42E9-B096-C7E77E94A785}"/>
+              </a:ext>
+            </a:extLst>
+          </p:cNvPr>
+          <p:cNvPicPr>
+            <a:picLocks noChangeAspect="1"/>
+          </p:cNvPicPr>
+          <p:nvPr/>
+        </p:nvPicPr>
+        <p:blipFill>
+          <a:blip r:embed="rId2">
+            <a:extLst>
+              <a:ext uri="{28A0092B-C50C-407E-A947-70E740481C1C}">
+                <a14:useLocalDpi xmlns:a14="http://schemas.microsoft.com/office/drawing/2010/main" val="0"/>
+              </a:ext>
+            </a:extLst>
+          </a:blip>
+          <a:srcRect/>
+          <a:stretch/>
+        </p:blipFill>
+        <p:spPr>
+          <a:xfrm>
+            <a:off x="1045669" y="1498934"/>
+            <a:ext cx="7100041" cy="4225844"/>
+          </a:xfrm>
+          <a:prstGeom prst="rect">
+            <a:avLst/>
+          </a:prstGeom>
+        </p:spPr>
+      </p:pic>
+      <p:sp>
+        <p:nvSpPr>
+          <p:cNvPr id="6" name="TextBox 5">
+            <a:extLst>
+              <a:ext uri="{FF2B5EF4-FFF2-40B4-BE49-F238E27FC236}">
+                <a16:creationId xmlns:a16="http://schemas.microsoft.com/office/drawing/2014/main" id="{DB298DD0-278C-493C-BC95-0CA99171087A}"/>
+              </a:ext>
+            </a:extLst>
+          </p:cNvPr>
+          <p:cNvSpPr txBox="1"/>
+          <p:nvPr/>
+        </p:nvSpPr>
+        <p:spPr>
+          <a:xfrm>
+            <a:off x="6801843" y="200597"/>
+            <a:ext cx="3427013" cy="584775"/>
+          </a:xfrm>
+          <a:prstGeom prst="rect">
+            <a:avLst/>
+          </a:prstGeom>
+          <a:noFill/>
+        </p:spPr>
+        <p:txBody>
+          <a:bodyPr wrap="square" rtlCol="0">
+            <a:spAutoFit/>
+          </a:bodyPr>
+          <a:lstStyle/>
+          <a:p>
+            <a:r>
+              <a:rPr lang="en-US" sz="1600" dirty="0" err="1"/>
+              <a:t>Neidermaier</a:t>
+            </a:r>
+            <a:r>
+              <a:rPr lang="en-US" sz="1600" dirty="0"/>
+              <a:t> et al. </a:t>
+            </a:r>
+            <a:r>
+              <a:rPr lang="en-US" sz="1600" i="1" dirty="0"/>
+              <a:t>in prep</a:t>
+            </a:r>
+          </a:p>
+          <a:p>
+            <a:r>
+              <a:rPr lang="en-US" sz="1600" dirty="0"/>
+              <a:t>Session B45P-04</a:t>
+            </a:r>
+          </a:p>
+        </p:txBody>
+      </p:sp>
+      <p:sp>
+        <p:nvSpPr>
+          <p:cNvPr id="7" name="TextBox 6">
+            <a:extLst>
+              <a:ext uri="{FF2B5EF4-FFF2-40B4-BE49-F238E27FC236}">
+                <a16:creationId xmlns:a16="http://schemas.microsoft.com/office/drawing/2014/main" id="{DDEC9E0B-C5E0-484A-8801-A27ED108B4E6}"/>
+              </a:ext>
+            </a:extLst>
+          </p:cNvPr>
+          <p:cNvSpPr txBox="1"/>
+          <p:nvPr/>
+        </p:nvSpPr>
+        <p:spPr>
+          <a:xfrm>
+            <a:off x="4723582" y="4226028"/>
+            <a:ext cx="210793" cy="461665"/>
+          </a:xfrm>
+          <a:prstGeom prst="rect">
+            <a:avLst/>
+          </a:prstGeom>
+          <a:noFill/>
+        </p:spPr>
+        <p:txBody>
+          <a:bodyPr wrap="square" rtlCol="0">
+            <a:spAutoFit/>
+          </a:bodyPr>
+          <a:lstStyle/>
+          <a:p>
+            <a:r>
+              <a:rPr lang="en-US" sz="2400" dirty="0"/>
+              <a:t>*</a:t>
+            </a:r>
+          </a:p>
+        </p:txBody>
+      </p:sp>
+      <p:sp>
+        <p:nvSpPr>
+          <p:cNvPr id="8" name="TextBox 7">
+            <a:extLst>
+              <a:ext uri="{FF2B5EF4-FFF2-40B4-BE49-F238E27FC236}">
+                <a16:creationId xmlns:a16="http://schemas.microsoft.com/office/drawing/2014/main" id="{6C55972B-BB1C-4628-BB3B-4C70A30F2E63}"/>
+              </a:ext>
+            </a:extLst>
+          </p:cNvPr>
+          <p:cNvSpPr txBox="1"/>
+          <p:nvPr/>
+        </p:nvSpPr>
+        <p:spPr>
+          <a:xfrm>
+            <a:off x="5245997" y="4083415"/>
+            <a:ext cx="210793" cy="461665"/>
+          </a:xfrm>
+          <a:prstGeom prst="rect">
+            <a:avLst/>
+          </a:prstGeom>
+          <a:noFill/>
+        </p:spPr>
+        <p:txBody>
+          <a:bodyPr wrap="square" rtlCol="0">
+            <a:spAutoFit/>
+          </a:bodyPr>
+          <a:lstStyle/>
+          <a:p>
+            <a:r>
+              <a:rPr lang="en-US" sz="2400" dirty="0"/>
+              <a:t>*</a:t>
+            </a:r>
+          </a:p>
+        </p:txBody>
+      </p:sp>
+      <p:sp>
+        <p:nvSpPr>
+          <p:cNvPr id="9" name="TextBox 8">
+            <a:extLst>
+              <a:ext uri="{FF2B5EF4-FFF2-40B4-BE49-F238E27FC236}">
+                <a16:creationId xmlns:a16="http://schemas.microsoft.com/office/drawing/2014/main" id="{C455D0A0-EA33-4F2E-8F9F-3D41532C5762}"/>
+              </a:ext>
+            </a:extLst>
+          </p:cNvPr>
+          <p:cNvSpPr txBox="1"/>
+          <p:nvPr/>
+        </p:nvSpPr>
+        <p:spPr>
+          <a:xfrm>
+            <a:off x="5768412" y="3915636"/>
+            <a:ext cx="210793" cy="461665"/>
+          </a:xfrm>
+          <a:prstGeom prst="rect">
+            <a:avLst/>
+          </a:prstGeom>
+          <a:noFill/>
+        </p:spPr>
+        <p:txBody>
+          <a:bodyPr wrap="square" rtlCol="0">
+            <a:spAutoFit/>
+          </a:bodyPr>
+          <a:lstStyle/>
+          <a:p>
+            <a:r>
+              <a:rPr lang="en-US" sz="2400" dirty="0"/>
+              <a:t>*</a:t>
+            </a:r>
+          </a:p>
+        </p:txBody>
+      </p:sp>
+      <p:sp>
+        <p:nvSpPr>
+          <p:cNvPr id="10" name="TextBox 9">
+            <a:extLst>
+              <a:ext uri="{FF2B5EF4-FFF2-40B4-BE49-F238E27FC236}">
+                <a16:creationId xmlns:a16="http://schemas.microsoft.com/office/drawing/2014/main" id="{C6DC961C-FF8A-4A25-9C14-039F6DEA7053}"/>
+              </a:ext>
+            </a:extLst>
+          </p:cNvPr>
+          <p:cNvSpPr txBox="1"/>
+          <p:nvPr/>
+        </p:nvSpPr>
+        <p:spPr>
+          <a:xfrm>
+            <a:off x="6851664" y="3954354"/>
+            <a:ext cx="210793" cy="461665"/>
+          </a:xfrm>
+          <a:prstGeom prst="rect">
+            <a:avLst/>
+          </a:prstGeom>
+          <a:noFill/>
+        </p:spPr>
+        <p:txBody>
+          <a:bodyPr wrap="square" rtlCol="0">
+            <a:spAutoFit/>
+          </a:bodyPr>
+          <a:lstStyle/>
+          <a:p>
+            <a:r>
+              <a:rPr lang="en-US" sz="2400" dirty="0"/>
+              <a:t>*</a:t>
+            </a:r>
+          </a:p>
+        </p:txBody>
+      </p:sp>
+      <p:sp>
+        <p:nvSpPr>
+          <p:cNvPr id="11" name="TextBox 10">
+            <a:extLst>
+              <a:ext uri="{FF2B5EF4-FFF2-40B4-BE49-F238E27FC236}">
+                <a16:creationId xmlns:a16="http://schemas.microsoft.com/office/drawing/2014/main" id="{5F652240-A721-43C2-B755-8A45FDA8BC0B}"/>
+              </a:ext>
+            </a:extLst>
+          </p:cNvPr>
+          <p:cNvSpPr txBox="1"/>
+          <p:nvPr/>
+        </p:nvSpPr>
+        <p:spPr>
+          <a:xfrm>
+            <a:off x="7287894" y="3811741"/>
+            <a:ext cx="210793" cy="461665"/>
+          </a:xfrm>
+          <a:prstGeom prst="rect">
+            <a:avLst/>
+          </a:prstGeom>
+          <a:noFill/>
+        </p:spPr>
+        <p:txBody>
+          <a:bodyPr wrap="square" rtlCol="0">
+            <a:spAutoFit/>
+          </a:bodyPr>
+          <a:lstStyle/>
+          <a:p>
+            <a:r>
+              <a:rPr lang="en-US" sz="2400" dirty="0"/>
+              <a:t>*</a:t>
+            </a:r>
+          </a:p>
+        </p:txBody>
+      </p:sp>
+      <p:sp>
+        <p:nvSpPr>
+          <p:cNvPr id="12" name="TextBox 11">
+            <a:extLst>
+              <a:ext uri="{FF2B5EF4-FFF2-40B4-BE49-F238E27FC236}">
+                <a16:creationId xmlns:a16="http://schemas.microsoft.com/office/drawing/2014/main" id="{C94BCF7A-1E9A-450F-A042-196B6ABA706C}"/>
+              </a:ext>
+            </a:extLst>
+          </p:cNvPr>
+          <p:cNvSpPr txBox="1"/>
+          <p:nvPr/>
+        </p:nvSpPr>
+        <p:spPr>
+          <a:xfrm>
+            <a:off x="7716802" y="3350076"/>
+            <a:ext cx="210793" cy="461665"/>
+          </a:xfrm>
+          <a:prstGeom prst="rect">
+            <a:avLst/>
+          </a:prstGeom>
+          <a:noFill/>
+        </p:spPr>
+        <p:txBody>
+          <a:bodyPr wrap="square" rtlCol="0">
+            <a:spAutoFit/>
+          </a:bodyPr>
+          <a:lstStyle/>
+          <a:p>
+            <a:r>
+              <a:rPr lang="en-US" sz="2400" dirty="0"/>
+              <a:t>*</a:t>
+            </a:r>
+          </a:p>
+        </p:txBody>
+      </p:sp>
+      <p:sp>
+        <p:nvSpPr>
+          <p:cNvPr id="13" name="TextBox 12">
+            <a:extLst>
+              <a:ext uri="{FF2B5EF4-FFF2-40B4-BE49-F238E27FC236}">
+                <a16:creationId xmlns:a16="http://schemas.microsoft.com/office/drawing/2014/main" id="{0B1C1A82-F997-40DF-A6BD-3D0C0C640FAC}"/>
+              </a:ext>
+            </a:extLst>
+          </p:cNvPr>
+          <p:cNvSpPr txBox="1"/>
+          <p:nvPr/>
+        </p:nvSpPr>
+        <p:spPr>
+          <a:xfrm>
+            <a:off x="7393290" y="5464282"/>
+            <a:ext cx="1325461" cy="369332"/>
+          </a:xfrm>
+          <a:prstGeom prst="rect">
+            <a:avLst/>
+          </a:prstGeom>
+          <a:noFill/>
+        </p:spPr>
+        <p:txBody>
+          <a:bodyPr wrap="square">
+            <a:spAutoFit/>
+          </a:bodyPr>
+          <a:lstStyle/>
+          <a:p>
+            <a:r>
+              <a:rPr lang="en-US" dirty="0"/>
+              <a:t>* p &lt; 0.05</a:t>
+            </a:r>
+          </a:p>
+        </p:txBody>
+      </p:sp>
+      <mc:AlternateContent xmlns:mc="http://schemas.openxmlformats.org/markup-compatibility/2006" xmlns:a14="http://schemas.microsoft.com/office/drawing/2010/main">
+        <mc:Choice Requires="a14">
+          <p:sp>
+            <p:nvSpPr>
+              <p:cNvPr id="14" name="TextBox 13">
+                <a:extLst>
+                  <a:ext uri="{FF2B5EF4-FFF2-40B4-BE49-F238E27FC236}">
+                    <a16:creationId xmlns:a16="http://schemas.microsoft.com/office/drawing/2014/main" id="{0F3FDD95-E768-4541-AB7F-3C82980BE5EF}"/>
+                  </a:ext>
+                </a:extLst>
+              </p:cNvPr>
+              <p:cNvSpPr txBox="1"/>
+              <p:nvPr/>
+            </p:nvSpPr>
+            <p:spPr>
+              <a:xfrm>
+                <a:off x="0" y="6077504"/>
+                <a:ext cx="9204862" cy="415370"/>
+              </a:xfrm>
+              <a:prstGeom prst="rect">
+                <a:avLst/>
+              </a:prstGeom>
+              <a:noFill/>
+            </p:spPr>
+            <p:txBody>
+              <a:bodyPr wrap="square">
+                <a:spAutoFit/>
+              </a:bodyPr>
+              <a:lstStyle/>
+              <a:p>
+                <a:pPr marL="0" marR="0">
+                  <a:lnSpc>
+                    <a:spcPct val="107000"/>
+                  </a:lnSpc>
+                  <a:spcBef>
+                    <a:spcPts val="0"/>
+                  </a:spcBef>
+                  <a:spcAft>
+                    <a:spcPts val="0"/>
+                  </a:spcAft>
+                </a:pPr>
+                <a14:m>
+                  <m:oMathPara xmlns:m="http://schemas.openxmlformats.org/officeDocument/2006/math">
+                    <m:oMathParaPr>
+                      <m:jc m:val="centerGroup"/>
+                    </m:oMathParaPr>
+                    <m:oMath xmlns:m="http://schemas.openxmlformats.org/officeDocument/2006/math">
+                      <m:sSub>
+                        <m:sSubPr>
+                          <m:ctrlPr>
+                            <a:rPr lang="en-US" sz="1800" i="1" smtClean="0">
+                              <a:solidFill>
+                                <a:srgbClr val="000000"/>
+                              </a:solidFill>
+                              <a:effectLst/>
+                              <a:latin typeface="Cambria Math" panose="02040503050406030204" pitchFamily="18" charset="0"/>
+                              <a:ea typeface="Calibri" panose="020F0502020204030204" pitchFamily="34" charset="0"/>
+                            </a:rPr>
+                          </m:ctrlPr>
+                        </m:sSubPr>
+                        <m:e>
+                          <m:r>
+                            <m:rPr>
+                              <m:sty m:val="p"/>
+                            </m:rPr>
+                            <a:rPr lang="en-US" sz="1800" b="0" i="0" smtClean="0">
+                              <a:solidFill>
+                                <a:srgbClr val="000000"/>
+                              </a:solidFill>
+                              <a:effectLst/>
+                              <a:latin typeface="Cambria Math" panose="02040503050406030204" pitchFamily="18" charset="0"/>
+                              <a:ea typeface="Calibri" panose="020F0502020204030204" pitchFamily="34" charset="0"/>
+                            </a:rPr>
+                            <m:t>log</m:t>
+                          </m:r>
+                          <m:r>
+                            <a:rPr lang="en-US" sz="1800" b="0" i="1" smtClean="0">
+                              <a:solidFill>
+                                <a:srgbClr val="000000"/>
+                              </a:solidFill>
+                              <a:effectLst/>
+                              <a:latin typeface="Cambria Math" panose="02040503050406030204" pitchFamily="18" charset="0"/>
+                              <a:ea typeface="Calibri" panose="020F0502020204030204" pitchFamily="34" charset="0"/>
+                            </a:rPr>
+                            <m:t>⁡(</m:t>
+                          </m:r>
+                          <m:r>
+                            <a:rPr lang="en-US" sz="1800" i="1">
+                              <a:solidFill>
+                                <a:srgbClr val="000000"/>
+                              </a:solidFill>
+                              <a:effectLst/>
+                              <a:latin typeface="Cambria Math" panose="02040503050406030204" pitchFamily="18" charset="0"/>
+                              <a:ea typeface="Calibri" panose="020F0502020204030204" pitchFamily="34" charset="0"/>
+                            </a:rPr>
+                            <m:t>𝑌</m:t>
+                          </m:r>
+                        </m:e>
+                        <m:sub>
+                          <m:r>
+                            <a:rPr lang="en-US" sz="1800" i="1">
+                              <a:solidFill>
+                                <a:srgbClr val="000000"/>
+                              </a:solidFill>
+                              <a:effectLst/>
+                              <a:latin typeface="Cambria Math" panose="02040503050406030204" pitchFamily="18" charset="0"/>
+                              <a:ea typeface="Calibri" panose="020F0502020204030204" pitchFamily="34" charset="0"/>
+                            </a:rPr>
+                            <m:t>𝑖𝑗𝑘</m:t>
+                          </m:r>
+                        </m:sub>
+                      </m:sSub>
+                      <m:r>
+                        <a:rPr lang="en-US" sz="1800" b="0" i="1" smtClean="0">
+                          <a:solidFill>
+                            <a:srgbClr val="000000"/>
+                          </a:solidFill>
+                          <a:effectLst/>
+                          <a:latin typeface="Cambria Math" panose="02040503050406030204" pitchFamily="18" charset="0"/>
+                          <a:ea typeface="Calibri" panose="020F0502020204030204" pitchFamily="34" charset="0"/>
+                        </a:rPr>
+                        <m:t>)</m:t>
+                      </m:r>
+                      <m:r>
+                        <a:rPr lang="en-US" sz="1800" i="1">
+                          <a:solidFill>
+                            <a:srgbClr val="000000"/>
+                          </a:solidFill>
+                          <a:effectLst/>
+                          <a:latin typeface="Cambria Math" panose="02040503050406030204" pitchFamily="18" charset="0"/>
+                          <a:ea typeface="Calibri" panose="020F0502020204030204" pitchFamily="34" charset="0"/>
+                        </a:rPr>
+                        <m:t>= </m:t>
+                      </m:r>
+                      <m:r>
+                        <a:rPr lang="en-US" sz="1800" i="1">
+                          <a:solidFill>
+                            <a:srgbClr val="000000"/>
+                          </a:solidFill>
+                          <a:effectLst/>
+                          <a:latin typeface="Cambria Math" panose="02040503050406030204" pitchFamily="18" charset="0"/>
+                          <a:ea typeface="Calibri" panose="020F0502020204030204" pitchFamily="34" charset="0"/>
+                        </a:rPr>
+                        <m:t>𝜇</m:t>
+                      </m:r>
+                      <m:r>
+                        <a:rPr lang="en-US" sz="1800" i="1">
+                          <a:solidFill>
+                            <a:srgbClr val="000000"/>
+                          </a:solidFill>
+                          <a:effectLst/>
+                          <a:latin typeface="Cambria Math" panose="02040503050406030204" pitchFamily="18" charset="0"/>
+                          <a:ea typeface="Calibri" panose="020F0502020204030204" pitchFamily="34" charset="0"/>
+                        </a:rPr>
+                        <m:t>+</m:t>
+                      </m:r>
+                      <m:sSub>
+                        <m:sSubPr>
+                          <m:ctrlPr>
+                            <a:rPr lang="en-US" sz="1800" i="1">
+                              <a:solidFill>
+                                <a:srgbClr val="000000"/>
+                              </a:solidFill>
+                              <a:effectLst/>
+                              <a:latin typeface="Cambria Math" panose="02040503050406030204" pitchFamily="18" charset="0"/>
+                              <a:ea typeface="Calibri" panose="020F0502020204030204" pitchFamily="34" charset="0"/>
+                            </a:rPr>
+                          </m:ctrlPr>
+                        </m:sSubPr>
+                        <m:e>
+                          <m:r>
+                            <a:rPr lang="en-US" sz="1800" i="1">
+                              <a:solidFill>
+                                <a:srgbClr val="000000"/>
+                              </a:solidFill>
+                              <a:effectLst/>
+                              <a:latin typeface="Cambria Math" panose="02040503050406030204" pitchFamily="18" charset="0"/>
+                              <a:ea typeface="Calibri" panose="020F0502020204030204" pitchFamily="34" charset="0"/>
+                            </a:rPr>
+                            <m:t>𝑅𝑒𝑝</m:t>
+                          </m:r>
+                        </m:e>
+                        <m:sub>
+                          <m:r>
+                            <a:rPr lang="en-US" sz="1800" i="1">
+                              <a:solidFill>
+                                <a:srgbClr val="000000"/>
+                              </a:solidFill>
+                              <a:effectLst/>
+                              <a:latin typeface="Cambria Math" panose="02040503050406030204" pitchFamily="18" charset="0"/>
+                              <a:ea typeface="Calibri" panose="020F0502020204030204" pitchFamily="34" charset="0"/>
+                            </a:rPr>
+                            <m:t>𝑖</m:t>
+                          </m:r>
+                        </m:sub>
+                      </m:sSub>
+                      <m:r>
+                        <a:rPr lang="en-US" sz="1800" i="1">
+                          <a:solidFill>
+                            <a:srgbClr val="000000"/>
+                          </a:solidFill>
+                          <a:effectLst/>
+                          <a:latin typeface="Cambria Math" panose="02040503050406030204" pitchFamily="18" charset="0"/>
+                          <a:ea typeface="Calibri" panose="020F0502020204030204" pitchFamily="34" charset="0"/>
+                        </a:rPr>
+                        <m:t>+ </m:t>
+                      </m:r>
+                      <m:sSub>
+                        <m:sSubPr>
+                          <m:ctrlPr>
+                            <a:rPr lang="en-US" sz="1800" i="1">
+                              <a:solidFill>
+                                <a:srgbClr val="000000"/>
+                              </a:solidFill>
+                              <a:effectLst/>
+                              <a:latin typeface="Cambria Math" panose="02040503050406030204" pitchFamily="18" charset="0"/>
+                              <a:ea typeface="Calibri" panose="020F0502020204030204" pitchFamily="34" charset="0"/>
+                            </a:rPr>
+                          </m:ctrlPr>
+                        </m:sSubPr>
+                        <m:e>
+                          <m:r>
+                            <a:rPr lang="en-US" sz="1800" i="1">
+                              <a:solidFill>
+                                <a:srgbClr val="000000"/>
+                              </a:solidFill>
+                              <a:effectLst/>
+                              <a:latin typeface="Cambria Math" panose="02040503050406030204" pitchFamily="18" charset="0"/>
+                              <a:ea typeface="Calibri" panose="020F0502020204030204" pitchFamily="34" charset="0"/>
+                            </a:rPr>
+                            <m:t>𝑌𝑒𝑎𝑟</m:t>
+                          </m:r>
+                        </m:e>
+                        <m:sub>
+                          <m:r>
+                            <a:rPr lang="en-US" sz="1800" i="1">
+                              <a:solidFill>
+                                <a:srgbClr val="000000"/>
+                              </a:solidFill>
+                              <a:effectLst/>
+                              <a:latin typeface="Cambria Math" panose="02040503050406030204" pitchFamily="18" charset="0"/>
+                              <a:ea typeface="Calibri" panose="020F0502020204030204" pitchFamily="34" charset="0"/>
+                            </a:rPr>
+                            <m:t>𝑗</m:t>
+                          </m:r>
+                        </m:sub>
+                      </m:sSub>
+                      <m:r>
+                        <a:rPr lang="en-US" sz="1800" i="1">
+                          <a:solidFill>
+                            <a:srgbClr val="000000"/>
+                          </a:solidFill>
+                          <a:effectLst/>
+                          <a:latin typeface="Cambria Math" panose="02040503050406030204" pitchFamily="18" charset="0"/>
+                          <a:ea typeface="Calibri" panose="020F0502020204030204" pitchFamily="34" charset="0"/>
+                        </a:rPr>
+                        <m:t>+ </m:t>
+                      </m:r>
+                      <m:sSub>
+                        <m:sSubPr>
+                          <m:ctrlPr>
+                            <a:rPr lang="en-US" sz="1800" i="1">
+                              <a:solidFill>
+                                <a:srgbClr val="000000"/>
+                              </a:solidFill>
+                              <a:effectLst/>
+                              <a:latin typeface="Cambria Math" panose="02040503050406030204" pitchFamily="18" charset="0"/>
+                              <a:ea typeface="Calibri" panose="020F0502020204030204" pitchFamily="34" charset="0"/>
+                            </a:rPr>
+                          </m:ctrlPr>
+                        </m:sSubPr>
+                        <m:e>
+                          <m:r>
+                            <a:rPr lang="en-US" sz="1800" i="1">
+                              <a:solidFill>
+                                <a:srgbClr val="000000"/>
+                              </a:solidFill>
+                              <a:effectLst/>
+                              <a:latin typeface="Cambria Math" panose="02040503050406030204" pitchFamily="18" charset="0"/>
+                              <a:ea typeface="Calibri" panose="020F0502020204030204" pitchFamily="34" charset="0"/>
+                            </a:rPr>
+                            <m:t>𝑆𝑒𝑣𝑒𝑟𝑖𝑡𝑦</m:t>
+                          </m:r>
+                        </m:e>
+                        <m:sub>
+                          <m:r>
+                            <a:rPr lang="en-US" sz="1800" i="1">
+                              <a:solidFill>
+                                <a:srgbClr val="000000"/>
+                              </a:solidFill>
+                              <a:effectLst/>
+                              <a:latin typeface="Cambria Math" panose="02040503050406030204" pitchFamily="18" charset="0"/>
+                              <a:ea typeface="Calibri" panose="020F0502020204030204" pitchFamily="34" charset="0"/>
+                            </a:rPr>
+                            <m:t>𝑘</m:t>
+                          </m:r>
+                          <m:r>
+                            <a:rPr lang="en-US" sz="1800" i="1">
+                              <a:solidFill>
+                                <a:srgbClr val="000000"/>
+                              </a:solidFill>
+                              <a:effectLst/>
+                              <a:latin typeface="Cambria Math" panose="02040503050406030204" pitchFamily="18" charset="0"/>
+                              <a:ea typeface="Calibri" panose="020F0502020204030204" pitchFamily="34" charset="0"/>
+                            </a:rPr>
+                            <m:t>|</m:t>
+                          </m:r>
+                          <m:r>
+                            <a:rPr lang="en-US" sz="1800" i="1">
+                              <a:solidFill>
+                                <a:srgbClr val="000000"/>
+                              </a:solidFill>
+                              <a:effectLst/>
+                              <a:latin typeface="Cambria Math" panose="02040503050406030204" pitchFamily="18" charset="0"/>
+                              <a:ea typeface="Calibri" panose="020F0502020204030204" pitchFamily="34" charset="0"/>
+                            </a:rPr>
+                            <m:t>𝑖</m:t>
+                          </m:r>
+                        </m:sub>
+                      </m:sSub>
+                      <m:r>
+                        <a:rPr lang="en-US" sz="1800" i="1">
+                          <a:solidFill>
+                            <a:srgbClr val="000000"/>
+                          </a:solidFill>
+                          <a:effectLst/>
+                          <a:latin typeface="Cambria Math" panose="02040503050406030204" pitchFamily="18" charset="0"/>
+                          <a:ea typeface="Calibri" panose="020F0502020204030204" pitchFamily="34" charset="0"/>
+                        </a:rPr>
+                        <m:t>+</m:t>
+                      </m:r>
+                      <m:r>
+                        <a:rPr lang="en-US" sz="1800" i="1">
+                          <a:solidFill>
+                            <a:srgbClr val="000000"/>
+                          </a:solidFill>
+                          <a:effectLst/>
+                          <a:latin typeface="Cambria Math" panose="02040503050406030204" pitchFamily="18" charset="0"/>
+                          <a:ea typeface="Calibri" panose="020F0502020204030204" pitchFamily="34" charset="0"/>
+                        </a:rPr>
+                        <m:t>𝑌𝑒𝑎𝑟</m:t>
+                      </m:r>
+                      <m:r>
+                        <a:rPr lang="en-US" sz="1800" i="1">
+                          <a:solidFill>
+                            <a:srgbClr val="000000"/>
+                          </a:solidFill>
+                          <a:effectLst/>
+                          <a:latin typeface="Cambria Math" panose="02040503050406030204" pitchFamily="18" charset="0"/>
+                          <a:ea typeface="Calibri" panose="020F0502020204030204" pitchFamily="34" charset="0"/>
+                        </a:rPr>
+                        <m:t>∗</m:t>
+                      </m:r>
+                      <m:sSub>
+                        <m:sSubPr>
+                          <m:ctrlPr>
+                            <a:rPr lang="en-US" sz="1800" i="1">
+                              <a:solidFill>
+                                <a:srgbClr val="000000"/>
+                              </a:solidFill>
+                              <a:effectLst/>
+                              <a:latin typeface="Cambria Math" panose="02040503050406030204" pitchFamily="18" charset="0"/>
+                              <a:ea typeface="Calibri" panose="020F0502020204030204" pitchFamily="34" charset="0"/>
+                            </a:rPr>
+                          </m:ctrlPr>
+                        </m:sSubPr>
+                        <m:e>
+                          <m:r>
+                            <a:rPr lang="en-US" sz="1800" i="1">
+                              <a:solidFill>
+                                <a:srgbClr val="000000"/>
+                              </a:solidFill>
+                              <a:effectLst/>
+                              <a:latin typeface="Cambria Math" panose="02040503050406030204" pitchFamily="18" charset="0"/>
+                              <a:ea typeface="Calibri" panose="020F0502020204030204" pitchFamily="34" charset="0"/>
+                            </a:rPr>
+                            <m:t>𝑆𝑒𝑣</m:t>
+                          </m:r>
+                        </m:e>
+                        <m:sub>
+                          <m:r>
+                            <a:rPr lang="en-US" sz="1800" i="1">
+                              <a:solidFill>
+                                <a:srgbClr val="000000"/>
+                              </a:solidFill>
+                              <a:effectLst/>
+                              <a:latin typeface="Cambria Math" panose="02040503050406030204" pitchFamily="18" charset="0"/>
+                              <a:ea typeface="Calibri" panose="020F0502020204030204" pitchFamily="34" charset="0"/>
+                            </a:rPr>
+                            <m:t>𝑗𝑘</m:t>
+                          </m:r>
+                          <m:r>
+                            <a:rPr lang="en-US" sz="1800" i="1">
+                              <a:solidFill>
+                                <a:srgbClr val="000000"/>
+                              </a:solidFill>
+                              <a:effectLst/>
+                              <a:latin typeface="Cambria Math" panose="02040503050406030204" pitchFamily="18" charset="0"/>
+                              <a:ea typeface="Calibri" panose="020F0502020204030204" pitchFamily="34" charset="0"/>
+                            </a:rPr>
+                            <m:t>|</m:t>
+                          </m:r>
+                          <m:r>
+                            <a:rPr lang="en-US" sz="1800" i="1">
+                              <a:solidFill>
+                                <a:srgbClr val="000000"/>
+                              </a:solidFill>
+                              <a:effectLst/>
+                              <a:latin typeface="Cambria Math" panose="02040503050406030204" pitchFamily="18" charset="0"/>
+                              <a:ea typeface="Calibri" panose="020F0502020204030204" pitchFamily="34" charset="0"/>
+                            </a:rPr>
+                            <m:t>𝑖</m:t>
+                          </m:r>
+                        </m:sub>
+                      </m:sSub>
+                      <m:r>
+                        <a:rPr lang="en-US" sz="1800" i="1">
+                          <a:solidFill>
+                            <a:srgbClr val="000000"/>
+                          </a:solidFill>
+                          <a:effectLst/>
+                          <a:latin typeface="Cambria Math" panose="02040503050406030204" pitchFamily="18" charset="0"/>
+                          <a:ea typeface="Calibri" panose="020F0502020204030204" pitchFamily="34" charset="0"/>
+                        </a:rPr>
+                        <m:t> [+ </m:t>
+                      </m:r>
+                      <m:sSub>
+                        <m:sSubPr>
+                          <m:ctrlPr>
+                            <a:rPr lang="en-US" sz="1800" i="1">
+                              <a:solidFill>
+                                <a:srgbClr val="000000"/>
+                              </a:solidFill>
+                              <a:effectLst/>
+                              <a:latin typeface="Cambria Math" panose="02040503050406030204" pitchFamily="18" charset="0"/>
+                              <a:ea typeface="Calibri" panose="020F0502020204030204" pitchFamily="34" charset="0"/>
+                            </a:rPr>
+                          </m:ctrlPr>
+                        </m:sSubPr>
+                        <m:e>
+                          <m:r>
+                            <a:rPr lang="en-US" sz="1800" i="1">
+                              <a:solidFill>
+                                <a:srgbClr val="000000"/>
+                              </a:solidFill>
+                              <a:effectLst/>
+                              <a:latin typeface="Cambria Math" panose="02040503050406030204" pitchFamily="18" charset="0"/>
+                              <a:ea typeface="Calibri" panose="020F0502020204030204" pitchFamily="34" charset="0"/>
+                            </a:rPr>
+                            <m:t>𝜀</m:t>
+                          </m:r>
+                        </m:e>
+                        <m:sub>
+                          <m:r>
+                            <a:rPr lang="en-US" sz="1800" i="1">
+                              <a:solidFill>
+                                <a:srgbClr val="000000"/>
+                              </a:solidFill>
+                              <a:effectLst/>
+                              <a:latin typeface="Cambria Math" panose="02040503050406030204" pitchFamily="18" charset="0"/>
+                              <a:ea typeface="Calibri" panose="020F0502020204030204" pitchFamily="34" charset="0"/>
+                            </a:rPr>
+                            <m:t>𝑖𝑗𝑘</m:t>
+                          </m:r>
+                        </m:sub>
+                      </m:sSub>
+                      <m:r>
+                        <a:rPr lang="en-US" sz="1800" i="1">
+                          <a:solidFill>
+                            <a:srgbClr val="000000"/>
+                          </a:solidFill>
+                          <a:effectLst/>
+                          <a:latin typeface="Cambria Math" panose="02040503050406030204" pitchFamily="18" charset="0"/>
+                          <a:ea typeface="Calibri" panose="020F0502020204030204" pitchFamily="34" charset="0"/>
+                        </a:rPr>
+                        <m:t>]</m:t>
+                      </m:r>
+                    </m:oMath>
+                  </m:oMathPara>
+                </a14:m>
+                <a:endParaRPr lang="en-US" sz="1800" dirty="0">
+                  <a:effectLst/>
+                  <a:latin typeface="Calibri" panose="020F0502020204030204" pitchFamily="34" charset="0"/>
+                  <a:ea typeface="Calibri" panose="020F0502020204030204" pitchFamily="34" charset="0"/>
+                </a:endParaRPr>
+              </a:p>
+            </p:txBody>
+          </p:sp>
+        </mc:Choice>
+        <mc:Fallback xmlns="">
+          <p:sp>
+            <p:nvSpPr>
+              <p:cNvPr id="14" name="TextBox 13">
+                <a:extLst>
+                  <a:ext uri="{FF2B5EF4-FFF2-40B4-BE49-F238E27FC236}">
+                    <a16:creationId xmlns:a16="http://schemas.microsoft.com/office/drawing/2014/main" id="{0F3FDD95-E768-4541-AB7F-3C82980BE5EF}"/>
+                  </a:ext>
+                </a:extLst>
+              </p:cNvPr>
+              <p:cNvSpPr txBox="1">
+                <a:spLocks noRot="1" noChangeAspect="1" noMove="1" noResize="1" noEditPoints="1" noAdjustHandles="1" noChangeArrowheads="1" noChangeShapeType="1" noTextEdit="1"/>
+              </p:cNvSpPr>
+              <p:nvPr/>
+            </p:nvSpPr>
+            <p:spPr>
+              <a:xfrm>
+                <a:off x="0" y="6077504"/>
+                <a:ext cx="9204862" cy="415370"/>
+              </a:xfrm>
+              <a:prstGeom prst="rect">
+                <a:avLst/>
+              </a:prstGeom>
+              <a:blipFill>
+                <a:blip r:embed="rId3"/>
+                <a:stretch>
+                  <a:fillRect b="-8824"/>
+                </a:stretch>
+              </a:blipFill>
+            </p:spPr>
+            <p:txBody>
+              <a:bodyPr/>
+              <a:lstStyle/>
+              <a:p>
+                <a:r>
+                  <a:rPr lang="en-US">
+                    <a:noFill/>
+                  </a:rPr>
+                  <a:t> </a:t>
+                </a:r>
+              </a:p>
+            </p:txBody>
+          </p:sp>
+        </mc:Fallback>
+      </mc:AlternateContent>
+      <p:pic>
+        <p:nvPicPr>
+          <p:cNvPr id="3" name="Picture 2">
+            <a:extLst>
+              <a:ext uri="{FF2B5EF4-FFF2-40B4-BE49-F238E27FC236}">
+                <a16:creationId xmlns:a16="http://schemas.microsoft.com/office/drawing/2014/main" id="{0F42ADBD-B9DF-47DA-88D6-5BC0BCB84424}"/>
+              </a:ext>
+            </a:extLst>
+          </p:cNvPr>
+          <p:cNvPicPr>
+            <a:picLocks noChangeAspect="1"/>
+          </p:cNvPicPr>
+          <p:nvPr/>
+        </p:nvPicPr>
+        <p:blipFill>
+          <a:blip r:embed="rId4"/>
+          <a:stretch>
+            <a:fillRect/>
+          </a:stretch>
+        </p:blipFill>
+        <p:spPr>
+          <a:xfrm>
+            <a:off x="5768412" y="5974306"/>
+            <a:ext cx="1499746" cy="627942"/>
+          </a:xfrm>
+          <a:prstGeom prst="rect">
+            <a:avLst/>
+          </a:prstGeom>
+        </p:spPr>
+      </p:pic>
+      <p:sp>
+        <p:nvSpPr>
+          <p:cNvPr id="15" name="Oval 14">
+            <a:extLst>
+              <a:ext uri="{FF2B5EF4-FFF2-40B4-BE49-F238E27FC236}">
+                <a16:creationId xmlns:a16="http://schemas.microsoft.com/office/drawing/2014/main" id="{63E959BD-1826-4267-B9B2-2763A2173AD0}"/>
+              </a:ext>
+            </a:extLst>
+          </p:cNvPr>
+          <p:cNvSpPr/>
+          <p:nvPr/>
+        </p:nvSpPr>
+        <p:spPr>
+          <a:xfrm>
+            <a:off x="3506680" y="6050807"/>
+            <a:ext cx="683580" cy="468763"/>
+          </a:xfrm>
+          <a:prstGeom prst="ellipse">
+            <a:avLst/>
+          </a:prstGeom>
+          <a:noFill/>
+          <a:ln w="38100">
+            <a:solidFill>
+              <a:schemeClr val="accent2"/>
+            </a:solidFill>
+          </a:ln>
+        </p:spPr>
+        <p:style>
+          <a:lnRef idx="2">
+            <a:schemeClr val="accent1">
+              <a:shade val="50000"/>
+            </a:schemeClr>
+          </a:lnRef>
+          <a:fillRef idx="1">
+            <a:schemeClr val="accent1"/>
+          </a:fillRef>
+          <a:effectRef idx="0">
+            <a:schemeClr val="accent1"/>
+          </a:effectRef>
+          <a:fontRef idx="minor">
+            <a:schemeClr val="lt1"/>
+          </a:fontRef>
+        </p:style>
+        <p:txBody>
+          <a:bodyPr rtlCol="0" anchor="ctr"/>
+          <a:lstStyle>
+            <a:defPPr>
+              <a:defRPr lang="en-US"/>
+            </a:defPPr>
+            <a:lvl1pPr marL="0" algn="l" defTabSz="457200" rtl="0" eaLnBrk="1" latinLnBrk="0" hangingPunct="1">
+              <a:defRPr sz="1800" kern="1200">
+                <a:solidFill>
+                  <a:schemeClr val="lt1"/>
+                </a:solidFill>
+                <a:latin typeface="+mn-lt"/>
+                <a:ea typeface="+mn-ea"/>
+                <a:cs typeface="+mn-cs"/>
+              </a:defRPr>
+            </a:lvl1pPr>
+            <a:lvl2pPr marL="457200" algn="l" defTabSz="457200" rtl="0" eaLnBrk="1" latinLnBrk="0" hangingPunct="1">
+              <a:defRPr sz="1800" kern="1200">
+                <a:solidFill>
+                  <a:schemeClr val="lt1"/>
+                </a:solidFill>
+                <a:latin typeface="+mn-lt"/>
+                <a:ea typeface="+mn-ea"/>
+                <a:cs typeface="+mn-cs"/>
+              </a:defRPr>
+            </a:lvl2pPr>
+            <a:lvl3pPr marL="914400" algn="l" defTabSz="457200" rtl="0" eaLnBrk="1" latinLnBrk="0" hangingPunct="1">
+              <a:defRPr sz="1800" kern="1200">
+                <a:solidFill>
+                  <a:schemeClr val="lt1"/>
+                </a:solidFill>
+                <a:latin typeface="+mn-lt"/>
+                <a:ea typeface="+mn-ea"/>
+                <a:cs typeface="+mn-cs"/>
+              </a:defRPr>
+            </a:lvl3pPr>
+            <a:lvl4pPr marL="1371600" algn="l" defTabSz="457200" rtl="0" eaLnBrk="1" latinLnBrk="0" hangingPunct="1">
+              <a:defRPr sz="1800" kern="1200">
+                <a:solidFill>
+                  <a:schemeClr val="lt1"/>
+                </a:solidFill>
+                <a:latin typeface="+mn-lt"/>
+                <a:ea typeface="+mn-ea"/>
+                <a:cs typeface="+mn-cs"/>
+              </a:defRPr>
+            </a:lvl4pPr>
+            <a:lvl5pPr marL="1828800" algn="l" defTabSz="457200" rtl="0" eaLnBrk="1" latinLnBrk="0" hangingPunct="1">
+              <a:defRPr sz="1800" kern="1200">
+                <a:solidFill>
+                  <a:schemeClr val="lt1"/>
+                </a:solidFill>
+                <a:latin typeface="+mn-lt"/>
+                <a:ea typeface="+mn-ea"/>
+                <a:cs typeface="+mn-cs"/>
+              </a:defRPr>
+            </a:lvl5pPr>
+            <a:lvl6pPr marL="2286000" algn="l" defTabSz="457200" rtl="0" eaLnBrk="1" latinLnBrk="0" hangingPunct="1">
+              <a:defRPr sz="1800" kern="1200">
+                <a:solidFill>
+                  <a:schemeClr val="lt1"/>
+                </a:solidFill>
+                <a:latin typeface="+mn-lt"/>
+                <a:ea typeface="+mn-ea"/>
+                <a:cs typeface="+mn-cs"/>
+              </a:defRPr>
+            </a:lvl6pPr>
+            <a:lvl7pPr marL="2743200" algn="l" defTabSz="457200" rtl="0" eaLnBrk="1" latinLnBrk="0" hangingPunct="1">
+              <a:defRPr sz="1800" kern="1200">
+                <a:solidFill>
+                  <a:schemeClr val="lt1"/>
+                </a:solidFill>
+                <a:latin typeface="+mn-lt"/>
+                <a:ea typeface="+mn-ea"/>
+                <a:cs typeface="+mn-cs"/>
+              </a:defRPr>
+            </a:lvl7pPr>
+            <a:lvl8pPr marL="3200400" algn="l" defTabSz="457200" rtl="0" eaLnBrk="1" latinLnBrk="0" hangingPunct="1">
+              <a:defRPr sz="1800" kern="1200">
+                <a:solidFill>
+                  <a:schemeClr val="lt1"/>
+                </a:solidFill>
+                <a:latin typeface="+mn-lt"/>
+                <a:ea typeface="+mn-ea"/>
+                <a:cs typeface="+mn-cs"/>
+              </a:defRPr>
+            </a:lvl8pPr>
+            <a:lvl9pPr marL="3657600" algn="l" defTabSz="457200" rtl="0" eaLnBrk="1" latinLnBrk="0" hangingPunct="1">
+              <a:defRPr sz="1800" kern="1200">
+                <a:solidFill>
+                  <a:schemeClr val="lt1"/>
+                </a:solidFill>
+                <a:latin typeface="+mn-lt"/>
+                <a:ea typeface="+mn-ea"/>
+                <a:cs typeface="+mn-cs"/>
+              </a:defRPr>
+            </a:lvl9pPr>
+          </a:lstStyle>
+          <a:p>
+            <a:pPr algn="ctr"/>
+            <a:endParaRPr lang="en-US"/>
+          </a:p>
+        </p:txBody>
+      </p:sp>
+    </p:spTree>
+    <p:extLst>
+      <p:ext uri="{BB962C8B-B14F-4D97-AF65-F5344CB8AC3E}">
+        <p14:creationId xmlns:p14="http://schemas.microsoft.com/office/powerpoint/2010/main" val="11548347"/>
+      </p:ext>
+    </p:extLst>
+  </p:cSld>
+  <p:clrMapOvr>
+    <a:masterClrMapping/>
+  </p:clrMapOvr>
+  <p:timing>
+    <p:tnLst>
+      <p:par>
+        <p:cTn id="1" dur="indefinite" restart="never" nodeType="tmRoot">
+          <p:childTnLst>
+            <p:seq concurrent="1" nextAc="seek">
+              <p:cTn id="2" dur="indefinite" nodeType="mainSeq">
+                <p:childTnLst>
+                  <p:par>
+                    <p:cTn id="3" fill="hold">
+                      <p:stCondLst>
+                        <p:cond delay="indefinite"/>
+                      </p:stCondLst>
+                      <p:childTnLst>
+                        <p:par>
+                          <p:cTn id="4" fill="hold">
+                            <p:stCondLst>
+                              <p:cond delay="0"/>
+                            </p:stCondLst>
+                            <p:childTnLst>
+                              <p:par>
+                                <p:cTn id="5" presetID="1" presetClass="entr" presetSubtype="0" fill="hold" grpId="0" nodeType="clickEffect">
+                                  <p:stCondLst>
+                                    <p:cond delay="0"/>
+                                  </p:stCondLst>
+                                  <p:childTnLst>
+                                    <p:set>
+                                      <p:cBhvr>
+                                        <p:cTn id="6" dur="1" fill="hold">
+                                          <p:stCondLst>
+                                            <p:cond delay="0"/>
+                                          </p:stCondLst>
+                                        </p:cTn>
+                                        <p:tgtEl>
+                                          <p:spTgt spid="15"/>
+                                        </p:tgtEl>
+                                        <p:attrNameLst>
+                                          <p:attrName>style.visibility</p:attrName>
+                                        </p:attrNameLst>
+                                      </p:cBhvr>
+                                      <p:to>
+                                        <p:strVal val="visible"/>
+                                      </p:to>
+                                    </p:set>
+                                  </p:childTnLst>
+                                </p:cTn>
+                              </p:par>
+                              <p:par>
+                                <p:cTn id="7" presetID="1" presetClass="entr" presetSubtype="0" fill="hold" nodeType="withEffect">
+                                  <p:stCondLst>
+                                    <p:cond delay="0"/>
+                                  </p:stCondLst>
+                                  <p:childTnLst>
+                                    <p:set>
+                                      <p:cBhvr>
+                                        <p:cTn id="8" dur="1" fill="hold">
+                                          <p:stCondLst>
+                                            <p:cond delay="0"/>
+                                          </p:stCondLst>
+                                        </p:cTn>
+                                        <p:tgtEl>
+                                          <p:spTgt spid="3"/>
+                                        </p:tgtEl>
+                                        <p:attrNameLst>
+                                          <p:attrName>style.visibility</p:attrName>
+                                        </p:attrNameLst>
+                                      </p:cBhvr>
+                                      <p:to>
+                                        <p:strVal val="visible"/>
+                                      </p:to>
+                                    </p:set>
+                                  </p:childTnLst>
+                                </p:cTn>
+                              </p:par>
+                            </p:childTnLst>
+                          </p:cTn>
+                        </p:par>
+                      </p:childTnLst>
+                    </p:cTn>
+                  </p:par>
+                </p:childTnLst>
+              </p:cTn>
+              <p:prevCondLst>
+                <p:cond evt="onPrev" delay="0">
+                  <p:tgtEl>
+                    <p:sldTgt/>
+                  </p:tgtEl>
+                </p:cond>
+              </p:prevCondLst>
+              <p:nextCondLst>
+                <p:cond evt="onNext" delay="0">
+                  <p:tgtEl>
+                    <p:sldTgt/>
+                  </p:tgtEl>
+                </p:cond>
+              </p:nextCondLst>
+            </p:seq>
+          </p:childTnLst>
+        </p:cTn>
+      </p:par>
+    </p:tnLst>
+    <p:bldLst>
+      <p:bldP spid="15" grpId="0" animBg="1"/>
+    </p:bldLst>
+  </p:timing>
+</p:sld>
+</file>
+
+<file path=ppt/slides/slide11.xml><?xml version="1.0" encoding="utf-8"?>
+<p:sld xmlns:a="http://schemas.openxmlformats.org/drawingml/2006/main" xmlns:r="http://schemas.openxmlformats.org/officeDocument/2006/relationships" xmlns:p="http://schemas.openxmlformats.org/presentationml/2006/main">
+  <p:cSld>
+    <p:spTree>
+      <p:nvGrpSpPr>
+        <p:cNvPr id="1" name=""/>
+        <p:cNvGrpSpPr/>
+        <p:nvPr/>
+      </p:nvGrpSpPr>
+      <p:grpSpPr>
+        <a:xfrm>
+          <a:off x="0" y="0"/>
+          <a:ext cx="0" cy="0"/>
+          <a:chOff x="0" y="0"/>
+          <a:chExt cx="0" cy="0"/>
+        </a:xfrm>
+      </p:grpSpPr>
+      <p:sp>
+        <p:nvSpPr>
           <p:cNvPr id="3" name="Title 2">
             <a:extLst>
               <a:ext uri="{FF2B5EF4-FFF2-40B4-BE49-F238E27FC236}">
@@ -4370,7 +5576,7 @@
 </p:sld>
 </file>
 
-<file path=ppt/slides/slide11.xml><?xml version="1.0" encoding="utf-8"?>
+<file path=ppt/slides/slide12.xml><?xml version="1.0" encoding="utf-8"?>
 <p:sld xmlns:a="http://schemas.openxmlformats.org/drawingml/2006/main" xmlns:r="http://schemas.openxmlformats.org/officeDocument/2006/relationships" xmlns:p="http://schemas.openxmlformats.org/presentationml/2006/main">
   <p:cSld>
     <p:spTree>
@@ -4529,7 +5735,7 @@
 </p:sld>
 </file>
 
-<file path=ppt/slides/slide12.xml><?xml version="1.0" encoding="utf-8"?>
+<file path=ppt/slides/slide13.xml><?xml version="1.0" encoding="utf-8"?>
 <p:sld xmlns:a="http://schemas.openxmlformats.org/drawingml/2006/main" xmlns:r="http://schemas.openxmlformats.org/officeDocument/2006/relationships" xmlns:p="http://schemas.openxmlformats.org/presentationml/2006/main">
   <p:cSld>
     <p:spTree>
@@ -4748,7 +5954,7 @@
 </p:sld>
 </file>
 
-<file path=ppt/slides/slide13.xml><?xml version="1.0" encoding="utf-8"?>
+<file path=ppt/slides/slide14.xml><?xml version="1.0" encoding="utf-8"?>
 <p:sld xmlns:a="http://schemas.openxmlformats.org/drawingml/2006/main" xmlns:r="http://schemas.openxmlformats.org/officeDocument/2006/relationships" xmlns:p="http://schemas.openxmlformats.org/presentationml/2006/main">
   <p:cSld>
     <p:spTree>
@@ -4921,7 +6127,7 @@
 </p:sld>
 </file>
 
-<file path=ppt/slides/slide14.xml><?xml version="1.0" encoding="utf-8"?>
+<file path=ppt/slides/slide15.xml><?xml version="1.0" encoding="utf-8"?>
 <p:sld xmlns:a="http://schemas.openxmlformats.org/drawingml/2006/main" xmlns:r="http://schemas.openxmlformats.org/officeDocument/2006/relationships" xmlns:p="http://schemas.openxmlformats.org/presentationml/2006/main">
   <p:cSld>
     <p:spTree>
@@ -5721,7 +6927,7 @@
 </p:sld>
 </file>
 
-<file path=ppt/slides/slide15.xml><?xml version="1.0" encoding="utf-8"?>
+<file path=ppt/slides/slide16.xml><?xml version="1.0" encoding="utf-8"?>
 <p:sld xmlns:a="http://schemas.openxmlformats.org/drawingml/2006/main" xmlns:r="http://schemas.openxmlformats.org/officeDocument/2006/relationships" xmlns:p="http://schemas.openxmlformats.org/presentationml/2006/main">
   <p:cSld>
     <p:spTree>
@@ -6079,7 +7285,7 @@
 </p:sld>
 </file>
 
-<file path=ppt/slides/slide16.xml><?xml version="1.0" encoding="utf-8"?>
+<file path=ppt/slides/slide17.xml><?xml version="1.0" encoding="utf-8"?>
 <p:sld xmlns:a="http://schemas.openxmlformats.org/drawingml/2006/main" xmlns:r="http://schemas.openxmlformats.org/officeDocument/2006/relationships" xmlns:p="http://schemas.openxmlformats.org/presentationml/2006/main">
   <p:cSld>
     <p:spTree>
@@ -6315,7 +7521,7 @@
 </p:sld>
 </file>
 
-<file path=ppt/slides/slide17.xml><?xml version="1.0" encoding="utf-8"?>
+<file path=ppt/slides/slide18.xml><?xml version="1.0" encoding="utf-8"?>
 <p:sld xmlns:a="http://schemas.openxmlformats.org/drawingml/2006/main" xmlns:r="http://schemas.openxmlformats.org/officeDocument/2006/relationships" xmlns:p="http://schemas.openxmlformats.org/presentationml/2006/main">
   <p:cSld>
     <p:spTree>
@@ -6630,7 +7836,7 @@
 </p:sld>
 </file>
 
-<file path=ppt/slides/slide18.xml><?xml version="1.0" encoding="utf-8"?>
+<file path=ppt/slides/slide19.xml><?xml version="1.0" encoding="utf-8"?>
 <p:sld xmlns:a="http://schemas.openxmlformats.org/drawingml/2006/main" xmlns:r="http://schemas.openxmlformats.org/officeDocument/2006/relationships" xmlns:p="http://schemas.openxmlformats.org/presentationml/2006/main">
   <p:cSld>
     <p:spTree>
@@ -6957,189 +8163,6 @@
     <p:extLst>
       <p:ext uri="{BB962C8B-B14F-4D97-AF65-F5344CB8AC3E}">
         <p14:creationId xmlns:p14="http://schemas.microsoft.com/office/powerpoint/2010/main" val="1796969174"/>
-      </p:ext>
-    </p:extLst>
-  </p:cSld>
-  <p:clrMapOvr>
-    <a:masterClrMapping/>
-  </p:clrMapOvr>
-</p:sld>
-</file>
-
-<file path=ppt/slides/slide19.xml><?xml version="1.0" encoding="utf-8"?>
-<p:sld xmlns:a="http://schemas.openxmlformats.org/drawingml/2006/main" xmlns:r="http://schemas.openxmlformats.org/officeDocument/2006/relationships" xmlns:p="http://schemas.openxmlformats.org/presentationml/2006/main">
-  <p:cSld>
-    <p:spTree>
-      <p:nvGrpSpPr>
-        <p:cNvPr id="1" name=""/>
-        <p:cNvGrpSpPr/>
-        <p:nvPr/>
-      </p:nvGrpSpPr>
-      <p:grpSpPr>
-        <a:xfrm>
-          <a:off x="0" y="0"/>
-          <a:ext cx="0" cy="0"/>
-          <a:chOff x="0" y="0"/>
-          <a:chExt cx="0" cy="0"/>
-        </a:xfrm>
-      </p:grpSpPr>
-      <p:grpSp>
-        <p:nvGrpSpPr>
-          <p:cNvPr id="5" name="Group 4">
-            <a:extLst>
-              <a:ext uri="{FF2B5EF4-FFF2-40B4-BE49-F238E27FC236}">
-                <a16:creationId xmlns:a16="http://schemas.microsoft.com/office/drawing/2014/main" id="{CD15047C-BAEC-4A59-B5A0-33B79F391280}"/>
-              </a:ext>
-            </a:extLst>
-          </p:cNvPr>
-          <p:cNvGrpSpPr/>
-          <p:nvPr/>
-        </p:nvGrpSpPr>
-        <p:grpSpPr>
-          <a:xfrm>
-            <a:off x="313002" y="1"/>
-            <a:ext cx="3593394" cy="8596824"/>
-            <a:chOff x="313002" y="1"/>
-            <a:chExt cx="3593394" cy="8596824"/>
-          </a:xfrm>
-        </p:grpSpPr>
-        <p:pic>
-          <p:nvPicPr>
-            <p:cNvPr id="3" name="Picture 2">
-              <a:extLst>
-                <a:ext uri="{FF2B5EF4-FFF2-40B4-BE49-F238E27FC236}">
-                  <a16:creationId xmlns:a16="http://schemas.microsoft.com/office/drawing/2014/main" id="{15456AF1-9327-42D8-981D-0BED5AE93402}"/>
-                </a:ext>
-              </a:extLst>
-            </p:cNvPr>
-            <p:cNvPicPr>
-              <a:picLocks noChangeAspect="1"/>
-            </p:cNvPicPr>
-            <p:nvPr/>
-          </p:nvPicPr>
-          <p:blipFill>
-            <a:blip r:embed="rId2">
-              <a:extLst>
-                <a:ext uri="{28A0092B-C50C-407E-A947-70E740481C1C}">
-                  <a14:useLocalDpi xmlns:a14="http://schemas.microsoft.com/office/drawing/2010/main" val="0"/>
-                </a:ext>
-              </a:extLst>
-            </a:blip>
-            <a:stretch>
-              <a:fillRect/>
-            </a:stretch>
-          </p:blipFill>
-          <p:spPr>
-            <a:xfrm>
-              <a:off x="320017" y="1"/>
-              <a:ext cx="3557039" cy="2540742"/>
-            </a:xfrm>
-            <a:prstGeom prst="rect">
-              <a:avLst/>
-            </a:prstGeom>
-          </p:spPr>
-        </p:pic>
-        <p:pic>
-          <p:nvPicPr>
-            <p:cNvPr id="7" name="Picture 6">
-              <a:extLst>
-                <a:ext uri="{FF2B5EF4-FFF2-40B4-BE49-F238E27FC236}">
-                  <a16:creationId xmlns:a16="http://schemas.microsoft.com/office/drawing/2014/main" id="{3745AB38-F4A6-4015-B5F3-C3C67A94A8BA}"/>
-                </a:ext>
-              </a:extLst>
-            </p:cNvPr>
-            <p:cNvPicPr>
-              <a:picLocks noChangeAspect="1"/>
-            </p:cNvPicPr>
-            <p:nvPr/>
-          </p:nvPicPr>
-          <p:blipFill>
-            <a:blip r:embed="rId3">
-              <a:extLst>
-                <a:ext uri="{28A0092B-C50C-407E-A947-70E740481C1C}">
-                  <a14:useLocalDpi xmlns:a14="http://schemas.microsoft.com/office/drawing/2010/main" val="0"/>
-                </a:ext>
-              </a:extLst>
-            </a:blip>
-            <a:stretch>
-              <a:fillRect/>
-            </a:stretch>
-          </p:blipFill>
-          <p:spPr>
-            <a:xfrm>
-              <a:off x="313002" y="2117773"/>
-              <a:ext cx="3593394" cy="2566710"/>
-            </a:xfrm>
-            <a:prstGeom prst="rect">
-              <a:avLst/>
-            </a:prstGeom>
-          </p:spPr>
-        </p:pic>
-        <p:pic>
-          <p:nvPicPr>
-            <p:cNvPr id="2" name="Picture 1">
-              <a:extLst>
-                <a:ext uri="{FF2B5EF4-FFF2-40B4-BE49-F238E27FC236}">
-                  <a16:creationId xmlns:a16="http://schemas.microsoft.com/office/drawing/2014/main" id="{21539F28-B500-4D5C-8BC3-0AB13A315BF4}"/>
-                </a:ext>
-              </a:extLst>
-            </p:cNvPr>
-            <p:cNvPicPr>
-              <a:picLocks noChangeAspect="1"/>
-            </p:cNvPicPr>
-            <p:nvPr/>
-          </p:nvPicPr>
-          <p:blipFill>
-            <a:blip r:embed="rId4"/>
-            <a:stretch>
-              <a:fillRect/>
-            </a:stretch>
-          </p:blipFill>
-          <p:spPr>
-            <a:xfrm>
-              <a:off x="628651" y="4280534"/>
-              <a:ext cx="3248406" cy="2320290"/>
-            </a:xfrm>
-            <a:prstGeom prst="rect">
-              <a:avLst/>
-            </a:prstGeom>
-          </p:spPr>
-        </p:pic>
-        <p:pic>
-          <p:nvPicPr>
-            <p:cNvPr id="4" name="Picture 3">
-              <a:extLst>
-                <a:ext uri="{FF2B5EF4-FFF2-40B4-BE49-F238E27FC236}">
-                  <a16:creationId xmlns:a16="http://schemas.microsoft.com/office/drawing/2014/main" id="{AE26DAF7-0EF0-48BB-84F7-33A8ED9DDEE1}"/>
-                </a:ext>
-              </a:extLst>
-            </p:cNvPr>
-            <p:cNvPicPr>
-              <a:picLocks noChangeAspect="1"/>
-            </p:cNvPicPr>
-            <p:nvPr/>
-          </p:nvPicPr>
-          <p:blipFill>
-            <a:blip r:embed="rId5"/>
-            <a:stretch>
-              <a:fillRect/>
-            </a:stretch>
-          </p:blipFill>
-          <p:spPr>
-            <a:xfrm>
-              <a:off x="588081" y="6276535"/>
-              <a:ext cx="3248406" cy="2320290"/>
-            </a:xfrm>
-            <a:prstGeom prst="rect">
-              <a:avLst/>
-            </a:prstGeom>
-          </p:spPr>
-        </p:pic>
-      </p:grpSp>
-    </p:spTree>
-    <p:extLst>
-      <p:ext uri="{BB962C8B-B14F-4D97-AF65-F5344CB8AC3E}">
-        <p14:creationId xmlns:p14="http://schemas.microsoft.com/office/powerpoint/2010/main" val="3882482366"/>
       </p:ext>
     </p:extLst>
   </p:cSld>
@@ -7805,10 +8828,10 @@
       </p:grpSpPr>
       <p:grpSp>
         <p:nvGrpSpPr>
-          <p:cNvPr id="22" name="Group 21">
+          <p:cNvPr id="5" name="Group 4">
             <a:extLst>
               <a:ext uri="{FF2B5EF4-FFF2-40B4-BE49-F238E27FC236}">
-                <a16:creationId xmlns:a16="http://schemas.microsoft.com/office/drawing/2014/main" id="{302D63A6-6FBA-456C-8ED5-13DBD5B30B7F}"/>
+                <a16:creationId xmlns:a16="http://schemas.microsoft.com/office/drawing/2014/main" id="{CD15047C-BAEC-4A59-B5A0-33B79F391280}"/>
               </a:ext>
             </a:extLst>
           </p:cNvPr>
@@ -7817,212 +8840,338 @@
         </p:nvGrpSpPr>
         <p:grpSpPr>
           <a:xfrm>
-            <a:off x="167318" y="-13759"/>
-            <a:ext cx="3862071" cy="7614453"/>
-            <a:chOff x="167318" y="-13759"/>
-            <a:chExt cx="3862071" cy="7614453"/>
+            <a:off x="313002" y="1"/>
+            <a:ext cx="3593394" cy="8596824"/>
+            <a:chOff x="313002" y="1"/>
+            <a:chExt cx="3593394" cy="8596824"/>
           </a:xfrm>
         </p:grpSpPr>
-        <p:grpSp>
-          <p:nvGrpSpPr>
-            <p:cNvPr id="17" name="Group 16">
+        <p:pic>
+          <p:nvPicPr>
+            <p:cNvPr id="3" name="Picture 2">
               <a:extLst>
                 <a:ext uri="{FF2B5EF4-FFF2-40B4-BE49-F238E27FC236}">
-                  <a16:creationId xmlns:a16="http://schemas.microsoft.com/office/drawing/2014/main" id="{20C6B191-E1F7-4CFD-9B21-6B4AC9C7EB21}"/>
+                  <a16:creationId xmlns:a16="http://schemas.microsoft.com/office/drawing/2014/main" id="{15456AF1-9327-42D8-981D-0BED5AE93402}"/>
                 </a:ext>
               </a:extLst>
             </p:cNvPr>
-            <p:cNvGrpSpPr/>
+            <p:cNvPicPr>
+              <a:picLocks noChangeAspect="1"/>
+            </p:cNvPicPr>
             <p:nvPr/>
-          </p:nvGrpSpPr>
-          <p:grpSpPr>
+          </p:nvPicPr>
+          <p:blipFill>
+            <a:blip r:embed="rId2">
+              <a:extLst>
+                <a:ext uri="{28A0092B-C50C-407E-A947-70E740481C1C}">
+                  <a14:useLocalDpi xmlns:a14="http://schemas.microsoft.com/office/drawing/2010/main" val="0"/>
+                </a:ext>
+              </a:extLst>
+            </a:blip>
+            <a:stretch>
+              <a:fillRect/>
+            </a:stretch>
+          </p:blipFill>
+          <p:spPr>
             <a:xfrm>
-              <a:off x="167318" y="-13759"/>
-              <a:ext cx="3862071" cy="7614453"/>
-              <a:chOff x="167318" y="-13759"/>
-              <a:chExt cx="3862071" cy="7614453"/>
+              <a:off x="320017" y="1"/>
+              <a:ext cx="3557039" cy="2540742"/>
             </a:xfrm>
-          </p:grpSpPr>
-          <p:pic>
-            <p:nvPicPr>
-              <p:cNvPr id="13" name="Picture 12">
-                <a:extLst>
-                  <a:ext uri="{FF2B5EF4-FFF2-40B4-BE49-F238E27FC236}">
-                    <a16:creationId xmlns:a16="http://schemas.microsoft.com/office/drawing/2014/main" id="{4E64F57C-7F77-4D42-9BA3-B666E1C773FB}"/>
-                  </a:ext>
-                </a:extLst>
-              </p:cNvPr>
-              <p:cNvPicPr>
-                <a:picLocks noChangeAspect="1"/>
-              </p:cNvPicPr>
-              <p:nvPr/>
-            </p:nvPicPr>
-            <p:blipFill>
-              <a:blip r:embed="rId2">
-                <a:extLst>
-                  <a:ext uri="{28A0092B-C50C-407E-A947-70E740481C1C}">
-                    <a14:useLocalDpi xmlns:a14="http://schemas.microsoft.com/office/drawing/2010/main" val="0"/>
-                  </a:ext>
-                </a:extLst>
-              </a:blip>
-              <a:stretch>
-                <a:fillRect/>
-              </a:stretch>
-            </p:blipFill>
-            <p:spPr>
-              <a:xfrm>
-                <a:off x="414671" y="5447345"/>
-                <a:ext cx="3014690" cy="2153349"/>
-              </a:xfrm>
-              <a:prstGeom prst="rect">
-                <a:avLst/>
-              </a:prstGeom>
-            </p:spPr>
-          </p:pic>
-          <p:pic>
-            <p:nvPicPr>
-              <p:cNvPr id="11" name="Picture 10">
-                <a:extLst>
-                  <a:ext uri="{FF2B5EF4-FFF2-40B4-BE49-F238E27FC236}">
-                    <a16:creationId xmlns:a16="http://schemas.microsoft.com/office/drawing/2014/main" id="{1EAE7F7A-0992-4179-A597-1CFBB052805A}"/>
-                  </a:ext>
-                </a:extLst>
-              </p:cNvPr>
-              <p:cNvPicPr>
-                <a:picLocks noChangeAspect="1"/>
-              </p:cNvPicPr>
-              <p:nvPr/>
-            </p:nvPicPr>
-            <p:blipFill>
-              <a:blip r:embed="rId3">
-                <a:extLst>
-                  <a:ext uri="{28A0092B-C50C-407E-A947-70E740481C1C}">
-                    <a14:useLocalDpi xmlns:a14="http://schemas.microsoft.com/office/drawing/2010/main" val="0"/>
-                  </a:ext>
-                </a:extLst>
-              </a:blip>
-              <a:stretch>
-                <a:fillRect/>
-              </a:stretch>
-            </p:blipFill>
-            <p:spPr>
-              <a:xfrm>
-                <a:off x="447997" y="3715143"/>
-                <a:ext cx="2981364" cy="1796377"/>
-              </a:xfrm>
-              <a:prstGeom prst="rect">
-                <a:avLst/>
-              </a:prstGeom>
-            </p:spPr>
-          </p:pic>
-          <p:pic>
-            <p:nvPicPr>
-              <p:cNvPr id="9" name="Picture 8">
-                <a:extLst>
-                  <a:ext uri="{FF2B5EF4-FFF2-40B4-BE49-F238E27FC236}">
-                    <a16:creationId xmlns:a16="http://schemas.microsoft.com/office/drawing/2014/main" id="{B7D2541B-EDB2-4C21-9C2D-4F5A36D738D3}"/>
-                  </a:ext>
-                </a:extLst>
-              </p:cNvPr>
-              <p:cNvPicPr>
-                <a:picLocks noChangeAspect="1"/>
-              </p:cNvPicPr>
-              <p:nvPr/>
-            </p:nvPicPr>
-            <p:blipFill>
-              <a:blip r:embed="rId4">
-                <a:extLst>
-                  <a:ext uri="{28A0092B-C50C-407E-A947-70E740481C1C}">
-                    <a14:useLocalDpi xmlns:a14="http://schemas.microsoft.com/office/drawing/2010/main" val="0"/>
-                  </a:ext>
-                </a:extLst>
-              </a:blip>
-              <a:stretch>
-                <a:fillRect/>
-              </a:stretch>
-            </p:blipFill>
-            <p:spPr>
-              <a:xfrm>
-                <a:off x="167318" y="1835668"/>
-                <a:ext cx="3238930" cy="1914739"/>
-              </a:xfrm>
-              <a:prstGeom prst="rect">
-                <a:avLst/>
-              </a:prstGeom>
-            </p:spPr>
-          </p:pic>
-          <p:pic>
-            <p:nvPicPr>
-              <p:cNvPr id="7" name="Picture 6">
-                <a:extLst>
-                  <a:ext uri="{FF2B5EF4-FFF2-40B4-BE49-F238E27FC236}">
-                    <a16:creationId xmlns:a16="http://schemas.microsoft.com/office/drawing/2014/main" id="{97E014B1-85DC-4B5F-AA81-CD1BA20A4ED8}"/>
-                  </a:ext>
-                </a:extLst>
-              </p:cNvPr>
-              <p:cNvPicPr>
-                <a:picLocks noChangeAspect="1"/>
-              </p:cNvPicPr>
-              <p:nvPr/>
-            </p:nvPicPr>
-            <p:blipFill>
-              <a:blip r:embed="rId5">
-                <a:extLst>
-                  <a:ext uri="{28A0092B-C50C-407E-A947-70E740481C1C}">
-                    <a14:useLocalDpi xmlns:a14="http://schemas.microsoft.com/office/drawing/2010/main" val="0"/>
-                  </a:ext>
-                </a:extLst>
-              </a:blip>
-              <a:srcRect/>
-              <a:stretch/>
-            </p:blipFill>
-            <p:spPr>
-              <a:xfrm>
-                <a:off x="179117" y="-13759"/>
-                <a:ext cx="3195235" cy="1914739"/>
-              </a:xfrm>
-              <a:prstGeom prst="rect">
-                <a:avLst/>
-              </a:prstGeom>
-            </p:spPr>
-          </p:pic>
-          <p:pic>
-            <p:nvPicPr>
-              <p:cNvPr id="15" name="Picture 14">
-                <a:extLst>
-                  <a:ext uri="{FF2B5EF4-FFF2-40B4-BE49-F238E27FC236}">
-                    <a16:creationId xmlns:a16="http://schemas.microsoft.com/office/drawing/2014/main" id="{E6DD69DC-2DCB-4204-86AF-4AA8A96897AD}"/>
-                  </a:ext>
-                </a:extLst>
-              </p:cNvPr>
-              <p:cNvPicPr>
-                <a:picLocks noChangeAspect="1"/>
-              </p:cNvPicPr>
-              <p:nvPr/>
-            </p:nvPicPr>
-            <p:blipFill>
-              <a:blip r:embed="rId6">
-                <a:extLst>
-                  <a:ext uri="{28A0092B-C50C-407E-A947-70E740481C1C}">
-                    <a14:useLocalDpi xmlns:a14="http://schemas.microsoft.com/office/drawing/2010/main" val="0"/>
-                  </a:ext>
-                </a:extLst>
-              </a:blip>
-              <a:stretch>
-                <a:fillRect/>
-              </a:stretch>
-            </p:blipFill>
-            <p:spPr>
-              <a:xfrm>
-                <a:off x="3218598" y="246343"/>
-                <a:ext cx="810791" cy="1140724"/>
-              </a:xfrm>
-              <a:prstGeom prst="rect">
-                <a:avLst/>
-              </a:prstGeom>
-            </p:spPr>
-          </p:pic>
-        </p:grpSp>
+            <a:prstGeom prst="rect">
+              <a:avLst/>
+            </a:prstGeom>
+          </p:spPr>
+        </p:pic>
+        <p:pic>
+          <p:nvPicPr>
+            <p:cNvPr id="7" name="Picture 6">
+              <a:extLst>
+                <a:ext uri="{FF2B5EF4-FFF2-40B4-BE49-F238E27FC236}">
+                  <a16:creationId xmlns:a16="http://schemas.microsoft.com/office/drawing/2014/main" id="{3745AB38-F4A6-4015-B5F3-C3C67A94A8BA}"/>
+                </a:ext>
+              </a:extLst>
+            </p:cNvPr>
+            <p:cNvPicPr>
+              <a:picLocks noChangeAspect="1"/>
+            </p:cNvPicPr>
+            <p:nvPr/>
+          </p:nvPicPr>
+          <p:blipFill>
+            <a:blip r:embed="rId3">
+              <a:extLst>
+                <a:ext uri="{28A0092B-C50C-407E-A947-70E740481C1C}">
+                  <a14:useLocalDpi xmlns:a14="http://schemas.microsoft.com/office/drawing/2010/main" val="0"/>
+                </a:ext>
+              </a:extLst>
+            </a:blip>
+            <a:stretch>
+              <a:fillRect/>
+            </a:stretch>
+          </p:blipFill>
+          <p:spPr>
+            <a:xfrm>
+              <a:off x="313002" y="2117773"/>
+              <a:ext cx="3593394" cy="2566710"/>
+            </a:xfrm>
+            <a:prstGeom prst="rect">
+              <a:avLst/>
+            </a:prstGeom>
+          </p:spPr>
+        </p:pic>
+        <p:pic>
+          <p:nvPicPr>
+            <p:cNvPr id="2" name="Picture 1">
+              <a:extLst>
+                <a:ext uri="{FF2B5EF4-FFF2-40B4-BE49-F238E27FC236}">
+                  <a16:creationId xmlns:a16="http://schemas.microsoft.com/office/drawing/2014/main" id="{21539F28-B500-4D5C-8BC3-0AB13A315BF4}"/>
+                </a:ext>
+              </a:extLst>
+            </p:cNvPr>
+            <p:cNvPicPr>
+              <a:picLocks noChangeAspect="1"/>
+            </p:cNvPicPr>
+            <p:nvPr/>
+          </p:nvPicPr>
+          <p:blipFill>
+            <a:blip r:embed="rId4"/>
+            <a:stretch>
+              <a:fillRect/>
+            </a:stretch>
+          </p:blipFill>
+          <p:spPr>
+            <a:xfrm>
+              <a:off x="628651" y="4280534"/>
+              <a:ext cx="3248406" cy="2320290"/>
+            </a:xfrm>
+            <a:prstGeom prst="rect">
+              <a:avLst/>
+            </a:prstGeom>
+          </p:spPr>
+        </p:pic>
+        <p:pic>
+          <p:nvPicPr>
+            <p:cNvPr id="4" name="Picture 3">
+              <a:extLst>
+                <a:ext uri="{FF2B5EF4-FFF2-40B4-BE49-F238E27FC236}">
+                  <a16:creationId xmlns:a16="http://schemas.microsoft.com/office/drawing/2014/main" id="{AE26DAF7-0EF0-48BB-84F7-33A8ED9DDEE1}"/>
+                </a:ext>
+              </a:extLst>
+            </p:cNvPr>
+            <p:cNvPicPr>
+              <a:picLocks noChangeAspect="1"/>
+            </p:cNvPicPr>
+            <p:nvPr/>
+          </p:nvPicPr>
+          <p:blipFill>
+            <a:blip r:embed="rId5"/>
+            <a:stretch>
+              <a:fillRect/>
+            </a:stretch>
+          </p:blipFill>
+          <p:spPr>
+            <a:xfrm>
+              <a:off x="588081" y="6276535"/>
+              <a:ext cx="3248406" cy="2320290"/>
+            </a:xfrm>
+            <a:prstGeom prst="rect">
+              <a:avLst/>
+            </a:prstGeom>
+          </p:spPr>
+        </p:pic>
+      </p:grpSp>
+    </p:spTree>
+    <p:extLst>
+      <p:ext uri="{BB962C8B-B14F-4D97-AF65-F5344CB8AC3E}">
+        <p14:creationId xmlns:p14="http://schemas.microsoft.com/office/powerpoint/2010/main" val="3882482366"/>
+      </p:ext>
+    </p:extLst>
+  </p:cSld>
+  <p:clrMapOvr>
+    <a:masterClrMapping/>
+  </p:clrMapOvr>
+</p:sld>
+</file>
+
+<file path=ppt/slides/slide21.xml><?xml version="1.0" encoding="utf-8"?>
+<p:sld xmlns:a="http://schemas.openxmlformats.org/drawingml/2006/main" xmlns:r="http://schemas.openxmlformats.org/officeDocument/2006/relationships" xmlns:p="http://schemas.openxmlformats.org/presentationml/2006/main">
+  <p:cSld>
+    <p:spTree>
+      <p:nvGrpSpPr>
+        <p:cNvPr id="1" name=""/>
+        <p:cNvGrpSpPr/>
+        <p:nvPr/>
+      </p:nvGrpSpPr>
+      <p:grpSpPr>
+        <a:xfrm>
+          <a:off x="0" y="0"/>
+          <a:ext cx="0" cy="0"/>
+          <a:chOff x="0" y="0"/>
+          <a:chExt cx="0" cy="0"/>
+        </a:xfrm>
+      </p:grpSpPr>
+      <p:grpSp>
+        <p:nvGrpSpPr>
+          <p:cNvPr id="30" name="Group 29">
+            <a:extLst>
+              <a:ext uri="{FF2B5EF4-FFF2-40B4-BE49-F238E27FC236}">
+                <a16:creationId xmlns:a16="http://schemas.microsoft.com/office/drawing/2014/main" id="{3A3A26EF-01D7-AA6E-D948-1963184AE6EC}"/>
+              </a:ext>
+            </a:extLst>
+          </p:cNvPr>
+          <p:cNvGrpSpPr/>
+          <p:nvPr/>
+        </p:nvGrpSpPr>
+        <p:grpSpPr>
+          <a:xfrm>
+            <a:off x="167318" y="-15166"/>
+            <a:ext cx="6565758" cy="7676344"/>
+            <a:chOff x="167318" y="-15166"/>
+            <a:chExt cx="6565758" cy="7676344"/>
+          </a:xfrm>
+        </p:grpSpPr>
+        <p:pic>
+          <p:nvPicPr>
+            <p:cNvPr id="13" name="Picture 12">
+              <a:extLst>
+                <a:ext uri="{FF2B5EF4-FFF2-40B4-BE49-F238E27FC236}">
+                  <a16:creationId xmlns:a16="http://schemas.microsoft.com/office/drawing/2014/main" id="{4E64F57C-7F77-4D42-9BA3-B666E1C773FB}"/>
+                </a:ext>
+              </a:extLst>
+            </p:cNvPr>
+            <p:cNvPicPr>
+              <a:picLocks noChangeAspect="1"/>
+            </p:cNvPicPr>
+            <p:nvPr/>
+          </p:nvPicPr>
+          <p:blipFill>
+            <a:blip r:embed="rId2">
+              <a:extLst>
+                <a:ext uri="{28A0092B-C50C-407E-A947-70E740481C1C}">
+                  <a14:useLocalDpi xmlns:a14="http://schemas.microsoft.com/office/drawing/2010/main" val="0"/>
+                </a:ext>
+              </a:extLst>
+            </a:blip>
+            <a:stretch>
+              <a:fillRect/>
+            </a:stretch>
+          </p:blipFill>
+          <p:spPr>
+            <a:xfrm>
+              <a:off x="414671" y="5482181"/>
+              <a:ext cx="3014690" cy="2153349"/>
+            </a:xfrm>
+            <a:prstGeom prst="rect">
+              <a:avLst/>
+            </a:prstGeom>
+          </p:spPr>
+        </p:pic>
+        <p:pic>
+          <p:nvPicPr>
+            <p:cNvPr id="11" name="Picture 10">
+              <a:extLst>
+                <a:ext uri="{FF2B5EF4-FFF2-40B4-BE49-F238E27FC236}">
+                  <a16:creationId xmlns:a16="http://schemas.microsoft.com/office/drawing/2014/main" id="{1EAE7F7A-0992-4179-A597-1CFBB052805A}"/>
+                </a:ext>
+              </a:extLst>
+            </p:cNvPr>
+            <p:cNvPicPr>
+              <a:picLocks noChangeAspect="1"/>
+            </p:cNvPicPr>
+            <p:nvPr/>
+          </p:nvPicPr>
+          <p:blipFill>
+            <a:blip r:embed="rId3">
+              <a:extLst>
+                <a:ext uri="{28A0092B-C50C-407E-A947-70E740481C1C}">
+                  <a14:useLocalDpi xmlns:a14="http://schemas.microsoft.com/office/drawing/2010/main" val="0"/>
+                </a:ext>
+              </a:extLst>
+            </a:blip>
+            <a:stretch>
+              <a:fillRect/>
+            </a:stretch>
+          </p:blipFill>
+          <p:spPr>
+            <a:xfrm>
+              <a:off x="447997" y="3715143"/>
+              <a:ext cx="2981364" cy="1796377"/>
+            </a:xfrm>
+            <a:prstGeom prst="rect">
+              <a:avLst/>
+            </a:prstGeom>
+          </p:spPr>
+        </p:pic>
+        <p:pic>
+          <p:nvPicPr>
+            <p:cNvPr id="9" name="Picture 8">
+              <a:extLst>
+                <a:ext uri="{FF2B5EF4-FFF2-40B4-BE49-F238E27FC236}">
+                  <a16:creationId xmlns:a16="http://schemas.microsoft.com/office/drawing/2014/main" id="{B7D2541B-EDB2-4C21-9C2D-4F5A36D738D3}"/>
+                </a:ext>
+              </a:extLst>
+            </p:cNvPr>
+            <p:cNvPicPr>
+              <a:picLocks noChangeAspect="1"/>
+            </p:cNvPicPr>
+            <p:nvPr/>
+          </p:nvPicPr>
+          <p:blipFill>
+            <a:blip r:embed="rId4">
+              <a:extLst>
+                <a:ext uri="{28A0092B-C50C-407E-A947-70E740481C1C}">
+                  <a14:useLocalDpi xmlns:a14="http://schemas.microsoft.com/office/drawing/2010/main" val="0"/>
+                </a:ext>
+              </a:extLst>
+            </a:blip>
+            <a:stretch>
+              <a:fillRect/>
+            </a:stretch>
+          </p:blipFill>
+          <p:spPr>
+            <a:xfrm>
+              <a:off x="167318" y="1835668"/>
+              <a:ext cx="3238930" cy="1914739"/>
+            </a:xfrm>
+            <a:prstGeom prst="rect">
+              <a:avLst/>
+            </a:prstGeom>
+          </p:spPr>
+        </p:pic>
+        <p:pic>
+          <p:nvPicPr>
+            <p:cNvPr id="7" name="Picture 6">
+              <a:extLst>
+                <a:ext uri="{FF2B5EF4-FFF2-40B4-BE49-F238E27FC236}">
+                  <a16:creationId xmlns:a16="http://schemas.microsoft.com/office/drawing/2014/main" id="{97E014B1-85DC-4B5F-AA81-CD1BA20A4ED8}"/>
+                </a:ext>
+              </a:extLst>
+            </p:cNvPr>
+            <p:cNvPicPr>
+              <a:picLocks noChangeAspect="1"/>
+            </p:cNvPicPr>
+            <p:nvPr/>
+          </p:nvPicPr>
+          <p:blipFill>
+            <a:blip r:embed="rId5">
+              <a:extLst>
+                <a:ext uri="{28A0092B-C50C-407E-A947-70E740481C1C}">
+                  <a14:useLocalDpi xmlns:a14="http://schemas.microsoft.com/office/drawing/2010/main" val="0"/>
+                </a:ext>
+              </a:extLst>
+            </a:blip>
+            <a:srcRect/>
+            <a:stretch/>
+          </p:blipFill>
+          <p:spPr>
+            <a:xfrm>
+              <a:off x="179117" y="-13759"/>
+              <a:ext cx="3195235" cy="1914739"/>
+            </a:xfrm>
+            <a:prstGeom prst="rect">
+              <a:avLst/>
+            </a:prstGeom>
+          </p:spPr>
+        </p:pic>
         <p:sp>
           <p:nvSpPr>
             <p:cNvPr id="18" name="TextBox 17">
@@ -8037,7 +9186,7 @@
           </p:nvSpPr>
           <p:spPr>
             <a:xfrm>
-              <a:off x="878495" y="1519697"/>
+              <a:off x="2886926" y="-15166"/>
               <a:ext cx="210793" cy="307777"/>
             </a:xfrm>
             <a:prstGeom prst="rect">
@@ -8071,9 +9220,9 @@
             <p:nvPr/>
           </p:nvSpPr>
           <p:spPr>
-            <a:xfrm>
-              <a:off x="878494" y="3365439"/>
-              <a:ext cx="210793" cy="307777"/>
+            <a:xfrm flipH="1">
+              <a:off x="2936074" y="1945374"/>
+              <a:ext cx="112496" cy="307777"/>
             </a:xfrm>
             <a:prstGeom prst="rect">
               <a:avLst/>
@@ -8107,7 +9256,7 @@
           </p:nvSpPr>
           <p:spPr>
             <a:xfrm>
-              <a:off x="878494" y="5130010"/>
+              <a:off x="2886926" y="3794801"/>
               <a:ext cx="210793" cy="307777"/>
             </a:xfrm>
             <a:prstGeom prst="rect">
@@ -8142,7 +9291,7 @@
           </p:nvSpPr>
           <p:spPr>
             <a:xfrm>
-              <a:off x="878494" y="6879939"/>
+              <a:off x="2886926" y="5526883"/>
               <a:ext cx="210793" cy="307777"/>
             </a:xfrm>
             <a:prstGeom prst="rect">
@@ -8163,11 +9312,523 @@
             </a:p>
           </p:txBody>
         </p:sp>
+        <p:pic>
+          <p:nvPicPr>
+            <p:cNvPr id="24" name="Picture 23">
+              <a:extLst>
+                <a:ext uri="{FF2B5EF4-FFF2-40B4-BE49-F238E27FC236}">
+                  <a16:creationId xmlns:a16="http://schemas.microsoft.com/office/drawing/2014/main" id="{9BAE346B-EA9E-AC63-EB15-A98B44493749}"/>
+                </a:ext>
+              </a:extLst>
+            </p:cNvPr>
+            <p:cNvPicPr>
+              <a:picLocks noChangeAspect="1"/>
+            </p:cNvPicPr>
+            <p:nvPr/>
+          </p:nvPicPr>
+          <p:blipFill>
+            <a:blip r:embed="rId6">
+              <a:extLst>
+                <a:ext uri="{28A0092B-C50C-407E-A947-70E740481C1C}">
+                  <a14:useLocalDpi xmlns:a14="http://schemas.microsoft.com/office/drawing/2010/main" val="0"/>
+                </a:ext>
+              </a:extLst>
+            </a:blip>
+            <a:stretch>
+              <a:fillRect/>
+            </a:stretch>
+          </p:blipFill>
+          <p:spPr>
+            <a:xfrm>
+              <a:off x="3423022" y="5384934"/>
+              <a:ext cx="3287908" cy="2276244"/>
+            </a:xfrm>
+            <a:prstGeom prst="rect">
+              <a:avLst/>
+            </a:prstGeom>
+          </p:spPr>
+        </p:pic>
+        <p:pic>
+          <p:nvPicPr>
+            <p:cNvPr id="16" name="Picture 15">
+              <a:extLst>
+                <a:ext uri="{FF2B5EF4-FFF2-40B4-BE49-F238E27FC236}">
+                  <a16:creationId xmlns:a16="http://schemas.microsoft.com/office/drawing/2014/main" id="{6D48B9BF-8D30-9E3A-BDCC-9CE574ACFD6E}"/>
+                </a:ext>
+              </a:extLst>
+            </p:cNvPr>
+            <p:cNvPicPr>
+              <a:picLocks noChangeAspect="1"/>
+            </p:cNvPicPr>
+            <p:nvPr/>
+          </p:nvPicPr>
+          <p:blipFill>
+            <a:blip r:embed="rId7">
+              <a:extLst>
+                <a:ext uri="{28A0092B-C50C-407E-A947-70E740481C1C}">
+                  <a14:useLocalDpi xmlns:a14="http://schemas.microsoft.com/office/drawing/2010/main" val="0"/>
+                </a:ext>
+              </a:extLst>
+            </a:blip>
+            <a:stretch>
+              <a:fillRect/>
+            </a:stretch>
+          </p:blipFill>
+          <p:spPr>
+            <a:xfrm>
+              <a:off x="3402695" y="3732109"/>
+              <a:ext cx="3038141" cy="1780818"/>
+            </a:xfrm>
+            <a:prstGeom prst="rect">
+              <a:avLst/>
+            </a:prstGeom>
+          </p:spPr>
+        </p:pic>
+        <p:pic>
+          <p:nvPicPr>
+            <p:cNvPr id="12" name="Picture 11">
+              <a:extLst>
+                <a:ext uri="{FF2B5EF4-FFF2-40B4-BE49-F238E27FC236}">
+                  <a16:creationId xmlns:a16="http://schemas.microsoft.com/office/drawing/2014/main" id="{DEDD4DEC-D465-5461-B26B-F35BFFAD0F65}"/>
+                </a:ext>
+              </a:extLst>
+            </p:cNvPr>
+            <p:cNvPicPr>
+              <a:picLocks noChangeAspect="1"/>
+            </p:cNvPicPr>
+            <p:nvPr/>
+          </p:nvPicPr>
+          <p:blipFill>
+            <a:blip r:embed="rId8">
+              <a:extLst>
+                <a:ext uri="{28A0092B-C50C-407E-A947-70E740481C1C}">
+                  <a14:useLocalDpi xmlns:a14="http://schemas.microsoft.com/office/drawing/2010/main" val="0"/>
+                </a:ext>
+              </a:extLst>
+            </a:blip>
+            <a:stretch>
+              <a:fillRect/>
+            </a:stretch>
+          </p:blipFill>
+          <p:spPr>
+            <a:xfrm>
+              <a:off x="3387429" y="1837188"/>
+              <a:ext cx="3345647" cy="1914740"/>
+            </a:xfrm>
+            <a:prstGeom prst="rect">
+              <a:avLst/>
+            </a:prstGeom>
+          </p:spPr>
+        </p:pic>
+        <p:pic>
+          <p:nvPicPr>
+            <p:cNvPr id="8" name="Picture 7">
+              <a:extLst>
+                <a:ext uri="{FF2B5EF4-FFF2-40B4-BE49-F238E27FC236}">
+                  <a16:creationId xmlns:a16="http://schemas.microsoft.com/office/drawing/2014/main" id="{0F72825B-3CAD-2739-7B1B-4065E869D2A0}"/>
+                </a:ext>
+              </a:extLst>
+            </p:cNvPr>
+            <p:cNvPicPr>
+              <a:picLocks noChangeAspect="1"/>
+            </p:cNvPicPr>
+            <p:nvPr/>
+          </p:nvPicPr>
+          <p:blipFill>
+            <a:blip r:embed="rId9">
+              <a:extLst>
+                <a:ext uri="{28A0092B-C50C-407E-A947-70E740481C1C}">
+                  <a14:useLocalDpi xmlns:a14="http://schemas.microsoft.com/office/drawing/2010/main" val="0"/>
+                </a:ext>
+              </a:extLst>
+            </a:blip>
+            <a:stretch>
+              <a:fillRect/>
+            </a:stretch>
+          </p:blipFill>
+          <p:spPr>
+            <a:xfrm>
+              <a:off x="3423022" y="-12700"/>
+              <a:ext cx="3310054" cy="1914739"/>
+            </a:xfrm>
+            <a:prstGeom prst="rect">
+              <a:avLst/>
+            </a:prstGeom>
+          </p:spPr>
+        </p:pic>
+        <p:sp>
+          <p:nvSpPr>
+            <p:cNvPr id="26" name="TextBox 25">
+              <a:extLst>
+                <a:ext uri="{FF2B5EF4-FFF2-40B4-BE49-F238E27FC236}">
+                  <a16:creationId xmlns:a16="http://schemas.microsoft.com/office/drawing/2014/main" id="{98D963E5-0B8E-2DB3-6C25-1F227D7532F7}"/>
+                </a:ext>
+              </a:extLst>
+            </p:cNvPr>
+            <p:cNvSpPr txBox="1"/>
+            <p:nvPr/>
+          </p:nvSpPr>
+          <p:spPr>
+            <a:xfrm>
+              <a:off x="5700131" y="-9753"/>
+              <a:ext cx="210793" cy="307777"/>
+            </a:xfrm>
+            <a:prstGeom prst="rect">
+              <a:avLst/>
+            </a:prstGeom>
+            <a:noFill/>
+          </p:spPr>
+          <p:txBody>
+            <a:bodyPr wrap="square" rtlCol="0">
+              <a:spAutoFit/>
+            </a:bodyPr>
+            <a:lstStyle/>
+            <a:p>
+              <a:r>
+                <a:rPr lang="en-US" sz="1400" dirty="0"/>
+                <a:t>E</a:t>
+              </a:r>
+            </a:p>
+          </p:txBody>
+        </p:sp>
+        <p:sp>
+          <p:nvSpPr>
+            <p:cNvPr id="27" name="TextBox 26">
+              <a:extLst>
+                <a:ext uri="{FF2B5EF4-FFF2-40B4-BE49-F238E27FC236}">
+                  <a16:creationId xmlns:a16="http://schemas.microsoft.com/office/drawing/2014/main" id="{6DD36520-1253-0F2C-8204-F1FCB97DCE3C}"/>
+                </a:ext>
+              </a:extLst>
+            </p:cNvPr>
+            <p:cNvSpPr txBox="1"/>
+            <p:nvPr/>
+          </p:nvSpPr>
+          <p:spPr>
+            <a:xfrm>
+              <a:off x="5700130" y="1907511"/>
+              <a:ext cx="210793" cy="307777"/>
+            </a:xfrm>
+            <a:prstGeom prst="rect">
+              <a:avLst/>
+            </a:prstGeom>
+            <a:noFill/>
+          </p:spPr>
+          <p:txBody>
+            <a:bodyPr wrap="square" rtlCol="0">
+              <a:spAutoFit/>
+            </a:bodyPr>
+            <a:lstStyle/>
+            <a:p>
+              <a:r>
+                <a:rPr lang="en-US" sz="1400" dirty="0"/>
+                <a:t>F</a:t>
+              </a:r>
+            </a:p>
+          </p:txBody>
+        </p:sp>
+        <p:sp>
+          <p:nvSpPr>
+            <p:cNvPr id="28" name="TextBox 27">
+              <a:extLst>
+                <a:ext uri="{FF2B5EF4-FFF2-40B4-BE49-F238E27FC236}">
+                  <a16:creationId xmlns:a16="http://schemas.microsoft.com/office/drawing/2014/main" id="{36968892-F989-062B-63A3-7E41E85654C6}"/>
+                </a:ext>
+              </a:extLst>
+            </p:cNvPr>
+            <p:cNvSpPr txBox="1"/>
+            <p:nvPr/>
+          </p:nvSpPr>
+          <p:spPr>
+            <a:xfrm>
+              <a:off x="5700129" y="3794013"/>
+              <a:ext cx="210793" cy="307777"/>
+            </a:xfrm>
+            <a:prstGeom prst="rect">
+              <a:avLst/>
+            </a:prstGeom>
+            <a:noFill/>
+          </p:spPr>
+          <p:txBody>
+            <a:bodyPr wrap="square" rtlCol="0">
+              <a:spAutoFit/>
+            </a:bodyPr>
+            <a:lstStyle/>
+            <a:p>
+              <a:r>
+                <a:rPr lang="en-US" sz="1400" dirty="0"/>
+                <a:t>G</a:t>
+              </a:r>
+            </a:p>
+          </p:txBody>
+        </p:sp>
+        <p:sp>
+          <p:nvSpPr>
+            <p:cNvPr id="29" name="TextBox 28">
+              <a:extLst>
+                <a:ext uri="{FF2B5EF4-FFF2-40B4-BE49-F238E27FC236}">
+                  <a16:creationId xmlns:a16="http://schemas.microsoft.com/office/drawing/2014/main" id="{BC8DC3E8-B8F4-235B-BB07-126FCEE2E56A}"/>
+                </a:ext>
+              </a:extLst>
+            </p:cNvPr>
+            <p:cNvSpPr txBox="1"/>
+            <p:nvPr/>
+          </p:nvSpPr>
+          <p:spPr>
+            <a:xfrm>
+              <a:off x="5714641" y="5511520"/>
+              <a:ext cx="210793" cy="307777"/>
+            </a:xfrm>
+            <a:prstGeom prst="rect">
+              <a:avLst/>
+            </a:prstGeom>
+            <a:noFill/>
+          </p:spPr>
+          <p:txBody>
+            <a:bodyPr wrap="square" rtlCol="0">
+              <a:spAutoFit/>
+            </a:bodyPr>
+            <a:lstStyle/>
+            <a:p>
+              <a:r>
+                <a:rPr lang="en-US" sz="1400" dirty="0"/>
+                <a:t>H</a:t>
+              </a:r>
+            </a:p>
+          </p:txBody>
+        </p:sp>
+        <p:pic>
+          <p:nvPicPr>
+            <p:cNvPr id="15" name="Picture 14">
+              <a:extLst>
+                <a:ext uri="{FF2B5EF4-FFF2-40B4-BE49-F238E27FC236}">
+                  <a16:creationId xmlns:a16="http://schemas.microsoft.com/office/drawing/2014/main" id="{E6DD69DC-2DCB-4204-86AF-4AA8A96897AD}"/>
+                </a:ext>
+              </a:extLst>
+            </p:cNvPr>
+            <p:cNvPicPr>
+              <a:picLocks noChangeAspect="1"/>
+            </p:cNvPicPr>
+            <p:nvPr/>
+          </p:nvPicPr>
+          <p:blipFill>
+            <a:blip r:embed="rId10">
+              <a:extLst>
+                <a:ext uri="{28A0092B-C50C-407E-A947-70E740481C1C}">
+                  <a14:useLocalDpi xmlns:a14="http://schemas.microsoft.com/office/drawing/2010/main" val="0"/>
+                </a:ext>
+              </a:extLst>
+            </a:blip>
+            <a:stretch>
+              <a:fillRect/>
+            </a:stretch>
+          </p:blipFill>
+          <p:spPr>
+            <a:xfrm>
+              <a:off x="3368946" y="865435"/>
+              <a:ext cx="688530" cy="968712"/>
+            </a:xfrm>
+            <a:prstGeom prst="rect">
+              <a:avLst/>
+            </a:prstGeom>
+          </p:spPr>
+        </p:pic>
       </p:grpSp>
     </p:spTree>
     <p:extLst>
       <p:ext uri="{BB962C8B-B14F-4D97-AF65-F5344CB8AC3E}">
         <p14:creationId xmlns:p14="http://schemas.microsoft.com/office/powerpoint/2010/main" val="1161502571"/>
+      </p:ext>
+    </p:extLst>
+  </p:cSld>
+  <p:clrMapOvr>
+    <a:masterClrMapping/>
+  </p:clrMapOvr>
+</p:sld>
+</file>
+
+<file path=ppt/slides/slide22.xml><?xml version="1.0" encoding="utf-8"?>
+<p:sld xmlns:a="http://schemas.openxmlformats.org/drawingml/2006/main" xmlns:r="http://schemas.openxmlformats.org/officeDocument/2006/relationships" xmlns:p="http://schemas.openxmlformats.org/presentationml/2006/main">
+  <p:cSld>
+    <p:spTree>
+      <p:nvGrpSpPr>
+        <p:cNvPr id="1" name=""/>
+        <p:cNvGrpSpPr/>
+        <p:nvPr/>
+      </p:nvGrpSpPr>
+      <p:grpSpPr>
+        <a:xfrm>
+          <a:off x="0" y="0"/>
+          <a:ext cx="0" cy="0"/>
+          <a:chOff x="0" y="0"/>
+          <a:chExt cx="0" cy="0"/>
+        </a:xfrm>
+      </p:grpSpPr>
+      <p:pic>
+        <p:nvPicPr>
+          <p:cNvPr id="2" name="Picture 1">
+            <a:extLst>
+              <a:ext uri="{FF2B5EF4-FFF2-40B4-BE49-F238E27FC236}">
+                <a16:creationId xmlns:a16="http://schemas.microsoft.com/office/drawing/2014/main" id="{DB5F5E1B-5C0D-E4D6-3584-2B5E832D8E73}"/>
+              </a:ext>
+            </a:extLst>
+          </p:cNvPr>
+          <p:cNvPicPr>
+            <a:picLocks noChangeAspect="1"/>
+          </p:cNvPicPr>
+          <p:nvPr/>
+        </p:nvPicPr>
+        <p:blipFill>
+          <a:blip r:embed="rId2"/>
+          <a:stretch>
+            <a:fillRect/>
+          </a:stretch>
+        </p:blipFill>
+        <p:spPr>
+          <a:xfrm>
+            <a:off x="1492898" y="0"/>
+            <a:ext cx="6158204" cy="6858000"/>
+          </a:xfrm>
+          <a:prstGeom prst="rect">
+            <a:avLst/>
+          </a:prstGeom>
+        </p:spPr>
+      </p:pic>
+    </p:spTree>
+    <p:extLst>
+      <p:ext uri="{BB962C8B-B14F-4D97-AF65-F5344CB8AC3E}">
+        <p14:creationId xmlns:p14="http://schemas.microsoft.com/office/powerpoint/2010/main" val="2452980407"/>
+      </p:ext>
+    </p:extLst>
+  </p:cSld>
+  <p:clrMapOvr>
+    <a:masterClrMapping/>
+  </p:clrMapOvr>
+</p:sld>
+</file>
+
+<file path=ppt/slides/slide23.xml><?xml version="1.0" encoding="utf-8"?>
+<p:sld xmlns:a="http://schemas.openxmlformats.org/drawingml/2006/main" xmlns:r="http://schemas.openxmlformats.org/officeDocument/2006/relationships" xmlns:p="http://schemas.openxmlformats.org/presentationml/2006/main">
+  <p:cSld>
+    <p:spTree>
+      <p:nvGrpSpPr>
+        <p:cNvPr id="1" name=""/>
+        <p:cNvGrpSpPr/>
+        <p:nvPr/>
+      </p:nvGrpSpPr>
+      <p:grpSpPr>
+        <a:xfrm>
+          <a:off x="0" y="0"/>
+          <a:ext cx="0" cy="0"/>
+          <a:chOff x="0" y="0"/>
+          <a:chExt cx="0" cy="0"/>
+        </a:xfrm>
+      </p:grpSpPr>
+      <p:pic>
+        <p:nvPicPr>
+          <p:cNvPr id="3" name="Picture 2">
+            <a:extLst>
+              <a:ext uri="{FF2B5EF4-FFF2-40B4-BE49-F238E27FC236}">
+                <a16:creationId xmlns:a16="http://schemas.microsoft.com/office/drawing/2014/main" id="{46EDEEC2-6F89-99EB-5D61-F14DBB7C3249}"/>
+              </a:ext>
+            </a:extLst>
+          </p:cNvPr>
+          <p:cNvPicPr>
+            <a:picLocks noChangeAspect="1"/>
+          </p:cNvPicPr>
+          <p:nvPr/>
+        </p:nvPicPr>
+        <p:blipFill>
+          <a:blip r:embed="rId2">
+            <a:extLst>
+              <a:ext uri="{28A0092B-C50C-407E-A947-70E740481C1C}">
+                <a14:useLocalDpi xmlns:a14="http://schemas.microsoft.com/office/drawing/2010/main" val="0"/>
+              </a:ext>
+            </a:extLst>
+          </a:blip>
+          <a:stretch>
+            <a:fillRect/>
+          </a:stretch>
+        </p:blipFill>
+        <p:spPr>
+          <a:xfrm>
+            <a:off x="1237784" y="1285576"/>
+            <a:ext cx="6668431" cy="4286848"/>
+          </a:xfrm>
+          <a:prstGeom prst="rect">
+            <a:avLst/>
+          </a:prstGeom>
+        </p:spPr>
+      </p:pic>
+    </p:spTree>
+    <p:extLst>
+      <p:ext uri="{BB962C8B-B14F-4D97-AF65-F5344CB8AC3E}">
+        <p14:creationId xmlns:p14="http://schemas.microsoft.com/office/powerpoint/2010/main" val="1260069785"/>
+      </p:ext>
+    </p:extLst>
+  </p:cSld>
+  <p:clrMapOvr>
+    <a:masterClrMapping/>
+  </p:clrMapOvr>
+</p:sld>
+</file>
+
+<file path=ppt/slides/slide24.xml><?xml version="1.0" encoding="utf-8"?>
+<p:sld xmlns:a="http://schemas.openxmlformats.org/drawingml/2006/main" xmlns:r="http://schemas.openxmlformats.org/officeDocument/2006/relationships" xmlns:p="http://schemas.openxmlformats.org/presentationml/2006/main">
+  <p:cSld>
+    <p:spTree>
+      <p:nvGrpSpPr>
+        <p:cNvPr id="1" name=""/>
+        <p:cNvGrpSpPr/>
+        <p:nvPr/>
+      </p:nvGrpSpPr>
+      <p:grpSpPr>
+        <a:xfrm>
+          <a:off x="0" y="0"/>
+          <a:ext cx="0" cy="0"/>
+          <a:chOff x="0" y="0"/>
+          <a:chExt cx="0" cy="0"/>
+        </a:xfrm>
+      </p:grpSpPr>
+      <p:pic>
+        <p:nvPicPr>
+          <p:cNvPr id="3" name="Picture 2">
+            <a:extLst>
+              <a:ext uri="{FF2B5EF4-FFF2-40B4-BE49-F238E27FC236}">
+                <a16:creationId xmlns:a16="http://schemas.microsoft.com/office/drawing/2014/main" id="{BD2D8493-07C3-E298-D911-C891770A1171}"/>
+              </a:ext>
+            </a:extLst>
+          </p:cNvPr>
+          <p:cNvPicPr>
+            <a:picLocks noChangeAspect="1"/>
+          </p:cNvPicPr>
+          <p:nvPr/>
+        </p:nvPicPr>
+        <p:blipFill>
+          <a:blip r:embed="rId2">
+            <a:extLst>
+              <a:ext uri="{28A0092B-C50C-407E-A947-70E740481C1C}">
+                <a14:useLocalDpi xmlns:a14="http://schemas.microsoft.com/office/drawing/2010/main" val="0"/>
+              </a:ext>
+            </a:extLst>
+          </a:blip>
+          <a:stretch>
+            <a:fillRect/>
+          </a:stretch>
+        </p:blipFill>
+        <p:spPr>
+          <a:xfrm>
+            <a:off x="1237784" y="809259"/>
+            <a:ext cx="6668431" cy="5239481"/>
+          </a:xfrm>
+          <a:prstGeom prst="rect">
+            <a:avLst/>
+          </a:prstGeom>
+        </p:spPr>
+      </p:pic>
+    </p:spTree>
+    <p:extLst>
+      <p:ext uri="{BB962C8B-B14F-4D97-AF65-F5344CB8AC3E}">
+        <p14:creationId xmlns:p14="http://schemas.microsoft.com/office/powerpoint/2010/main" val="1153866932"/>
       </p:ext>
     </p:extLst>
   </p:cSld>
@@ -9464,6 +11125,289 @@
 </file>
 
 <file path=ppt/slides/slide6.xml><?xml version="1.0" encoding="utf-8"?>
+<p:sld xmlns:a="http://schemas.openxmlformats.org/drawingml/2006/main" xmlns:r="http://schemas.openxmlformats.org/officeDocument/2006/relationships" xmlns:p="http://schemas.openxmlformats.org/presentationml/2006/main">
+  <p:cSld>
+    <p:spTree>
+      <p:nvGrpSpPr>
+        <p:cNvPr id="1" name=""/>
+        <p:cNvGrpSpPr/>
+        <p:nvPr/>
+      </p:nvGrpSpPr>
+      <p:grpSpPr>
+        <a:xfrm>
+          <a:off x="0" y="0"/>
+          <a:ext cx="0" cy="0"/>
+          <a:chOff x="0" y="0"/>
+          <a:chExt cx="0" cy="0"/>
+        </a:xfrm>
+      </p:grpSpPr>
+      <p:grpSp>
+        <p:nvGrpSpPr>
+          <p:cNvPr id="2" name="Group 1">
+            <a:extLst>
+              <a:ext uri="{FF2B5EF4-FFF2-40B4-BE49-F238E27FC236}">
+                <a16:creationId xmlns:a16="http://schemas.microsoft.com/office/drawing/2014/main" id="{C5F2E5F8-B272-4B3B-E252-AADB319BBDD2}"/>
+              </a:ext>
+            </a:extLst>
+          </p:cNvPr>
+          <p:cNvGrpSpPr/>
+          <p:nvPr/>
+        </p:nvGrpSpPr>
+        <p:grpSpPr>
+          <a:xfrm>
+            <a:off x="923416" y="753372"/>
+            <a:ext cx="8278073" cy="5351256"/>
+            <a:chOff x="923416" y="753372"/>
+            <a:chExt cx="8278073" cy="5351256"/>
+          </a:xfrm>
+        </p:grpSpPr>
+        <p:pic>
+          <p:nvPicPr>
+            <p:cNvPr id="3" name="Picture 2">
+              <a:extLst>
+                <a:ext uri="{FF2B5EF4-FFF2-40B4-BE49-F238E27FC236}">
+                  <a16:creationId xmlns:a16="http://schemas.microsoft.com/office/drawing/2014/main" id="{75987913-85B8-84C0-8BEC-3029669E2834}"/>
+                </a:ext>
+              </a:extLst>
+            </p:cNvPr>
+            <p:cNvPicPr>
+              <a:picLocks noChangeAspect="1"/>
+            </p:cNvPicPr>
+            <p:nvPr/>
+          </p:nvPicPr>
+          <p:blipFill>
+            <a:blip r:embed="rId2">
+              <a:extLst>
+                <a:ext uri="{28A0092B-C50C-407E-A947-70E740481C1C}">
+                  <a14:useLocalDpi xmlns:a14="http://schemas.microsoft.com/office/drawing/2010/main" val="0"/>
+                </a:ext>
+              </a:extLst>
+            </a:blip>
+            <a:srcRect/>
+            <a:stretch/>
+          </p:blipFill>
+          <p:spPr>
+            <a:xfrm>
+              <a:off x="923416" y="753372"/>
+              <a:ext cx="7297168" cy="5351256"/>
+            </a:xfrm>
+            <a:prstGeom prst="rect">
+              <a:avLst/>
+            </a:prstGeom>
+          </p:spPr>
+        </p:pic>
+        <p:sp>
+          <p:nvSpPr>
+            <p:cNvPr id="4" name="TextBox 3">
+              <a:extLst>
+                <a:ext uri="{FF2B5EF4-FFF2-40B4-BE49-F238E27FC236}">
+                  <a16:creationId xmlns:a16="http://schemas.microsoft.com/office/drawing/2014/main" id="{6CBFA660-BA9C-8329-74A8-3CFB5ADFEE84}"/>
+                </a:ext>
+              </a:extLst>
+            </p:cNvPr>
+            <p:cNvSpPr txBox="1"/>
+            <p:nvPr/>
+          </p:nvSpPr>
+          <p:spPr>
+            <a:xfrm>
+              <a:off x="7567695" y="1452893"/>
+              <a:ext cx="210793" cy="461665"/>
+            </a:xfrm>
+            <a:prstGeom prst="rect">
+              <a:avLst/>
+            </a:prstGeom>
+            <a:noFill/>
+          </p:spPr>
+          <p:txBody>
+            <a:bodyPr wrap="square" rtlCol="0">
+              <a:spAutoFit/>
+            </a:bodyPr>
+            <a:lstStyle/>
+            <a:p>
+              <a:r>
+                <a:rPr lang="en-US" sz="2400" dirty="0"/>
+                <a:t>*</a:t>
+              </a:r>
+            </a:p>
+          </p:txBody>
+        </p:sp>
+        <p:sp>
+          <p:nvSpPr>
+            <p:cNvPr id="5" name="TextBox 4">
+              <a:extLst>
+                <a:ext uri="{FF2B5EF4-FFF2-40B4-BE49-F238E27FC236}">
+                  <a16:creationId xmlns:a16="http://schemas.microsoft.com/office/drawing/2014/main" id="{6DCD26CB-5516-5358-8A6D-CD98E69BE5C6}"/>
+                </a:ext>
+              </a:extLst>
+            </p:cNvPr>
+            <p:cNvSpPr txBox="1"/>
+            <p:nvPr/>
+          </p:nvSpPr>
+          <p:spPr>
+            <a:xfrm>
+              <a:off x="7942894" y="1448333"/>
+              <a:ext cx="595496" cy="461665"/>
+            </a:xfrm>
+            <a:prstGeom prst="rect">
+              <a:avLst/>
+            </a:prstGeom>
+            <a:noFill/>
+          </p:spPr>
+          <p:txBody>
+            <a:bodyPr wrap="square" rtlCol="0">
+              <a:spAutoFit/>
+            </a:bodyPr>
+            <a:lstStyle/>
+            <a:p>
+              <a:r>
+                <a:rPr lang="en-US" sz="2400" dirty="0"/>
+                <a:t>**</a:t>
+              </a:r>
+            </a:p>
+          </p:txBody>
+        </p:sp>
+        <p:sp>
+          <p:nvSpPr>
+            <p:cNvPr id="6" name="TextBox 5">
+              <a:extLst>
+                <a:ext uri="{FF2B5EF4-FFF2-40B4-BE49-F238E27FC236}">
+                  <a16:creationId xmlns:a16="http://schemas.microsoft.com/office/drawing/2014/main" id="{050CE097-FFD2-B3BC-9F60-BFAF2EE794AC}"/>
+                </a:ext>
+              </a:extLst>
+            </p:cNvPr>
+            <p:cNvSpPr txBox="1"/>
+            <p:nvPr/>
+          </p:nvSpPr>
+          <p:spPr>
+            <a:xfrm>
+              <a:off x="6898056" y="3074990"/>
+              <a:ext cx="2303433" cy="707886"/>
+            </a:xfrm>
+            <a:prstGeom prst="rect">
+              <a:avLst/>
+            </a:prstGeom>
+            <a:noFill/>
+          </p:spPr>
+          <p:txBody>
+            <a:bodyPr wrap="square">
+              <a:spAutoFit/>
+            </a:bodyPr>
+            <a:lstStyle/>
+            <a:p>
+              <a:r>
+                <a:rPr lang="en-US" sz="2000" dirty="0"/>
+                <a:t>  * </a:t>
+              </a:r>
+              <a:r>
+                <a:rPr lang="en-US" sz="2000" i="1" dirty="0"/>
+                <a:t>p</a:t>
+              </a:r>
+              <a:r>
+                <a:rPr lang="en-US" sz="2000" dirty="0"/>
+                <a:t> &lt; 0.05 </a:t>
+              </a:r>
+            </a:p>
+            <a:p>
+              <a:r>
+                <a:rPr lang="en-US" sz="2000" dirty="0"/>
+                <a:t>** </a:t>
+              </a:r>
+              <a:r>
+                <a:rPr lang="en-US" sz="2000" i="1" dirty="0"/>
+                <a:t>p</a:t>
+              </a:r>
+              <a:r>
+                <a:rPr lang="en-US" sz="2000" dirty="0"/>
+                <a:t> &lt; 0.01</a:t>
+              </a:r>
+            </a:p>
+          </p:txBody>
+        </p:sp>
+        <p:sp>
+          <p:nvSpPr>
+            <p:cNvPr id="7" name="TextBox 6">
+              <a:extLst>
+                <a:ext uri="{FF2B5EF4-FFF2-40B4-BE49-F238E27FC236}">
+                  <a16:creationId xmlns:a16="http://schemas.microsoft.com/office/drawing/2014/main" id="{5BF024ED-B3CB-789D-2192-F0B1CC89764F}"/>
+                </a:ext>
+              </a:extLst>
+            </p:cNvPr>
+            <p:cNvSpPr txBox="1"/>
+            <p:nvPr/>
+          </p:nvSpPr>
+          <p:spPr>
+            <a:xfrm>
+              <a:off x="6275122" y="3980219"/>
+              <a:ext cx="595496" cy="461665"/>
+            </a:xfrm>
+            <a:prstGeom prst="rect">
+              <a:avLst/>
+            </a:prstGeom>
+            <a:noFill/>
+          </p:spPr>
+          <p:txBody>
+            <a:bodyPr wrap="square" rtlCol="0">
+              <a:spAutoFit/>
+            </a:bodyPr>
+            <a:lstStyle/>
+            <a:p>
+              <a:r>
+                <a:rPr lang="en-US" sz="2400" dirty="0"/>
+                <a:t>**</a:t>
+              </a:r>
+            </a:p>
+          </p:txBody>
+        </p:sp>
+        <p:sp>
+          <p:nvSpPr>
+            <p:cNvPr id="8" name="TextBox 7">
+              <a:extLst>
+                <a:ext uri="{FF2B5EF4-FFF2-40B4-BE49-F238E27FC236}">
+                  <a16:creationId xmlns:a16="http://schemas.microsoft.com/office/drawing/2014/main" id="{DB9A4EBF-77DF-D364-0930-AAB7C53ACF57}"/>
+                </a:ext>
+              </a:extLst>
+            </p:cNvPr>
+            <p:cNvSpPr txBox="1"/>
+            <p:nvPr/>
+          </p:nvSpPr>
+          <p:spPr>
+            <a:xfrm>
+              <a:off x="7944377" y="3812250"/>
+              <a:ext cx="210793" cy="461665"/>
+            </a:xfrm>
+            <a:prstGeom prst="rect">
+              <a:avLst/>
+            </a:prstGeom>
+            <a:noFill/>
+          </p:spPr>
+          <p:txBody>
+            <a:bodyPr wrap="square" rtlCol="0">
+              <a:spAutoFit/>
+            </a:bodyPr>
+            <a:lstStyle/>
+            <a:p>
+              <a:r>
+                <a:rPr lang="en-US" sz="2400" dirty="0"/>
+                <a:t>*</a:t>
+              </a:r>
+            </a:p>
+          </p:txBody>
+        </p:sp>
+      </p:grpSp>
+    </p:spTree>
+    <p:extLst>
+      <p:ext uri="{BB962C8B-B14F-4D97-AF65-F5344CB8AC3E}">
+        <p14:creationId xmlns:p14="http://schemas.microsoft.com/office/powerpoint/2010/main" val="3490949819"/>
+      </p:ext>
+    </p:extLst>
+  </p:cSld>
+  <p:clrMapOvr>
+    <a:masterClrMapping/>
+  </p:clrMapOvr>
+</p:sld>
+</file>
+
+<file path=ppt/slides/slide7.xml><?xml version="1.0" encoding="utf-8"?>
 <p:sld xmlns:a="http://schemas.openxmlformats.org/drawingml/2006/main" xmlns:r="http://schemas.openxmlformats.org/officeDocument/2006/relationships" xmlns:p="http://schemas.openxmlformats.org/presentationml/2006/main">
   <p:cSld>
     <p:spTree>
@@ -10839,7 +12783,7 @@
 </p:sld>
 </file>
 
-<file path=ppt/slides/slide7.xml><?xml version="1.0" encoding="utf-8"?>
+<file path=ppt/slides/slide8.xml><?xml version="1.0" encoding="utf-8"?>
 <p:sld xmlns:a="http://schemas.openxmlformats.org/drawingml/2006/main" xmlns:r="http://schemas.openxmlformats.org/officeDocument/2006/relationships" xmlns:p="http://schemas.openxmlformats.org/presentationml/2006/main">
   <p:cSld>
     <p:spTree>
@@ -11006,7 +12950,7 @@
 </p:sld>
 </file>
 
-<file path=ppt/slides/slide8.xml><?xml version="1.0" encoding="utf-8"?>
+<file path=ppt/slides/slide9.xml><?xml version="1.0" encoding="utf-8"?>
 <p:sld xmlns:a="http://schemas.openxmlformats.org/drawingml/2006/main" xmlns:r="http://schemas.openxmlformats.org/officeDocument/2006/relationships" xmlns:p="http://schemas.openxmlformats.org/presentationml/2006/main">
   <p:cSld>
     <p:spTree>
@@ -11332,1208 +13276,6 @@
     </p:tnLst>
     <p:bldLst>
       <p:bldP spid="7" grpId="0"/>
-    </p:bldLst>
-  </p:timing>
-</p:sld>
-</file>
-
-<file path=ppt/slides/slide9.xml><?xml version="1.0" encoding="utf-8"?>
-<p:sld xmlns:a="http://schemas.openxmlformats.org/drawingml/2006/main" xmlns:r="http://schemas.openxmlformats.org/officeDocument/2006/relationships" xmlns:p="http://schemas.openxmlformats.org/presentationml/2006/main">
-  <p:cSld>
-    <p:spTree>
-      <p:nvGrpSpPr>
-        <p:cNvPr id="1" name=""/>
-        <p:cNvGrpSpPr/>
-        <p:nvPr/>
-      </p:nvGrpSpPr>
-      <p:grpSpPr>
-        <a:xfrm>
-          <a:off x="0" y="0"/>
-          <a:ext cx="0" cy="0"/>
-          <a:chOff x="0" y="0"/>
-          <a:chExt cx="0" cy="0"/>
-        </a:xfrm>
-      </p:grpSpPr>
-      <p:sp>
-        <p:nvSpPr>
-          <p:cNvPr id="2" name="Title 1">
-            <a:extLst>
-              <a:ext uri="{FF2B5EF4-FFF2-40B4-BE49-F238E27FC236}">
-                <a16:creationId xmlns:a16="http://schemas.microsoft.com/office/drawing/2014/main" id="{8E84F6F4-F3B9-4672-B944-E50C0187ABDF}"/>
-              </a:ext>
-            </a:extLst>
-          </p:cNvPr>
-          <p:cNvSpPr>
-            <a:spLocks noGrp="1"/>
-          </p:cNvSpPr>
-          <p:nvPr>
-            <p:ph type="title"/>
-          </p:nvPr>
-        </p:nvSpPr>
-        <p:spPr/>
-        <p:txBody>
-          <a:bodyPr/>
-          <a:lstStyle/>
-          <a:p>
-            <a:r>
-              <a:rPr lang="en-US" dirty="0"/>
-              <a:t>Subcanopy NPP</a:t>
-            </a:r>
-          </a:p>
-        </p:txBody>
-      </p:sp>
-      <p:pic>
-        <p:nvPicPr>
-          <p:cNvPr id="5" name="Picture 4">
-            <a:extLst>
-              <a:ext uri="{FF2B5EF4-FFF2-40B4-BE49-F238E27FC236}">
-                <a16:creationId xmlns:a16="http://schemas.microsoft.com/office/drawing/2014/main" id="{46D4F526-9E33-42E9-B096-C7E77E94A785}"/>
-              </a:ext>
-            </a:extLst>
-          </p:cNvPr>
-          <p:cNvPicPr>
-            <a:picLocks noChangeAspect="1"/>
-          </p:cNvPicPr>
-          <p:nvPr/>
-        </p:nvPicPr>
-        <p:blipFill>
-          <a:blip r:embed="rId2">
-            <a:extLst>
-              <a:ext uri="{28A0092B-C50C-407E-A947-70E740481C1C}">
-                <a14:useLocalDpi xmlns:a14="http://schemas.microsoft.com/office/drawing/2010/main" val="0"/>
-              </a:ext>
-            </a:extLst>
-          </a:blip>
-          <a:srcRect/>
-          <a:stretch/>
-        </p:blipFill>
-        <p:spPr>
-          <a:xfrm>
-            <a:off x="1045669" y="1498934"/>
-            <a:ext cx="7100041" cy="4225844"/>
-          </a:xfrm>
-          <a:prstGeom prst="rect">
-            <a:avLst/>
-          </a:prstGeom>
-        </p:spPr>
-      </p:pic>
-      <p:sp>
-        <p:nvSpPr>
-          <p:cNvPr id="6" name="TextBox 5">
-            <a:extLst>
-              <a:ext uri="{FF2B5EF4-FFF2-40B4-BE49-F238E27FC236}">
-                <a16:creationId xmlns:a16="http://schemas.microsoft.com/office/drawing/2014/main" id="{DB298DD0-278C-493C-BC95-0CA99171087A}"/>
-              </a:ext>
-            </a:extLst>
-          </p:cNvPr>
-          <p:cNvSpPr txBox="1"/>
-          <p:nvPr/>
-        </p:nvSpPr>
-        <p:spPr>
-          <a:xfrm>
-            <a:off x="6801843" y="200597"/>
-            <a:ext cx="3427013" cy="584775"/>
-          </a:xfrm>
-          <a:prstGeom prst="rect">
-            <a:avLst/>
-          </a:prstGeom>
-          <a:noFill/>
-        </p:spPr>
-        <p:txBody>
-          <a:bodyPr wrap="square" rtlCol="0">
-            <a:spAutoFit/>
-          </a:bodyPr>
-          <a:lstStyle/>
-          <a:p>
-            <a:r>
-              <a:rPr lang="en-US" sz="1600" dirty="0" err="1"/>
-              <a:t>Neidermaier</a:t>
-            </a:r>
-            <a:r>
-              <a:rPr lang="en-US" sz="1600" dirty="0"/>
-              <a:t> et al. </a:t>
-            </a:r>
-            <a:r>
-              <a:rPr lang="en-US" sz="1600" i="1" dirty="0"/>
-              <a:t>in prep</a:t>
-            </a:r>
-          </a:p>
-          <a:p>
-            <a:r>
-              <a:rPr lang="en-US" sz="1600" dirty="0"/>
-              <a:t>Session B45P-04</a:t>
-            </a:r>
-          </a:p>
-        </p:txBody>
-      </p:sp>
-      <p:sp>
-        <p:nvSpPr>
-          <p:cNvPr id="7" name="TextBox 6">
-            <a:extLst>
-              <a:ext uri="{FF2B5EF4-FFF2-40B4-BE49-F238E27FC236}">
-                <a16:creationId xmlns:a16="http://schemas.microsoft.com/office/drawing/2014/main" id="{DDEC9E0B-C5E0-484A-8801-A27ED108B4E6}"/>
-              </a:ext>
-            </a:extLst>
-          </p:cNvPr>
-          <p:cNvSpPr txBox="1"/>
-          <p:nvPr/>
-        </p:nvSpPr>
-        <p:spPr>
-          <a:xfrm>
-            <a:off x="4723582" y="4226028"/>
-            <a:ext cx="210793" cy="461665"/>
-          </a:xfrm>
-          <a:prstGeom prst="rect">
-            <a:avLst/>
-          </a:prstGeom>
-          <a:noFill/>
-        </p:spPr>
-        <p:txBody>
-          <a:bodyPr wrap="square" rtlCol="0">
-            <a:spAutoFit/>
-          </a:bodyPr>
-          <a:lstStyle/>
-          <a:p>
-            <a:r>
-              <a:rPr lang="en-US" sz="2400" dirty="0"/>
-              <a:t>*</a:t>
-            </a:r>
-          </a:p>
-        </p:txBody>
-      </p:sp>
-      <p:sp>
-        <p:nvSpPr>
-          <p:cNvPr id="8" name="TextBox 7">
-            <a:extLst>
-              <a:ext uri="{FF2B5EF4-FFF2-40B4-BE49-F238E27FC236}">
-                <a16:creationId xmlns:a16="http://schemas.microsoft.com/office/drawing/2014/main" id="{6C55972B-BB1C-4628-BB3B-4C70A30F2E63}"/>
-              </a:ext>
-            </a:extLst>
-          </p:cNvPr>
-          <p:cNvSpPr txBox="1"/>
-          <p:nvPr/>
-        </p:nvSpPr>
-        <p:spPr>
-          <a:xfrm>
-            <a:off x="5245997" y="4083415"/>
-            <a:ext cx="210793" cy="461665"/>
-          </a:xfrm>
-          <a:prstGeom prst="rect">
-            <a:avLst/>
-          </a:prstGeom>
-          <a:noFill/>
-        </p:spPr>
-        <p:txBody>
-          <a:bodyPr wrap="square" rtlCol="0">
-            <a:spAutoFit/>
-          </a:bodyPr>
-          <a:lstStyle/>
-          <a:p>
-            <a:r>
-              <a:rPr lang="en-US" sz="2400" dirty="0"/>
-              <a:t>*</a:t>
-            </a:r>
-          </a:p>
-        </p:txBody>
-      </p:sp>
-      <p:sp>
-        <p:nvSpPr>
-          <p:cNvPr id="9" name="TextBox 8">
-            <a:extLst>
-              <a:ext uri="{FF2B5EF4-FFF2-40B4-BE49-F238E27FC236}">
-                <a16:creationId xmlns:a16="http://schemas.microsoft.com/office/drawing/2014/main" id="{C455D0A0-EA33-4F2E-8F9F-3D41532C5762}"/>
-              </a:ext>
-            </a:extLst>
-          </p:cNvPr>
-          <p:cNvSpPr txBox="1"/>
-          <p:nvPr/>
-        </p:nvSpPr>
-        <p:spPr>
-          <a:xfrm>
-            <a:off x="5768412" y="3915636"/>
-            <a:ext cx="210793" cy="461665"/>
-          </a:xfrm>
-          <a:prstGeom prst="rect">
-            <a:avLst/>
-          </a:prstGeom>
-          <a:noFill/>
-        </p:spPr>
-        <p:txBody>
-          <a:bodyPr wrap="square" rtlCol="0">
-            <a:spAutoFit/>
-          </a:bodyPr>
-          <a:lstStyle/>
-          <a:p>
-            <a:r>
-              <a:rPr lang="en-US" sz="2400" dirty="0"/>
-              <a:t>*</a:t>
-            </a:r>
-          </a:p>
-        </p:txBody>
-      </p:sp>
-      <p:sp>
-        <p:nvSpPr>
-          <p:cNvPr id="10" name="TextBox 9">
-            <a:extLst>
-              <a:ext uri="{FF2B5EF4-FFF2-40B4-BE49-F238E27FC236}">
-                <a16:creationId xmlns:a16="http://schemas.microsoft.com/office/drawing/2014/main" id="{C6DC961C-FF8A-4A25-9C14-039F6DEA7053}"/>
-              </a:ext>
-            </a:extLst>
-          </p:cNvPr>
-          <p:cNvSpPr txBox="1"/>
-          <p:nvPr/>
-        </p:nvSpPr>
-        <p:spPr>
-          <a:xfrm>
-            <a:off x="6851664" y="3954354"/>
-            <a:ext cx="210793" cy="461665"/>
-          </a:xfrm>
-          <a:prstGeom prst="rect">
-            <a:avLst/>
-          </a:prstGeom>
-          <a:noFill/>
-        </p:spPr>
-        <p:txBody>
-          <a:bodyPr wrap="square" rtlCol="0">
-            <a:spAutoFit/>
-          </a:bodyPr>
-          <a:lstStyle/>
-          <a:p>
-            <a:r>
-              <a:rPr lang="en-US" sz="2400" dirty="0"/>
-              <a:t>*</a:t>
-            </a:r>
-          </a:p>
-        </p:txBody>
-      </p:sp>
-      <p:sp>
-        <p:nvSpPr>
-          <p:cNvPr id="11" name="TextBox 10">
-            <a:extLst>
-              <a:ext uri="{FF2B5EF4-FFF2-40B4-BE49-F238E27FC236}">
-                <a16:creationId xmlns:a16="http://schemas.microsoft.com/office/drawing/2014/main" id="{5F652240-A721-43C2-B755-8A45FDA8BC0B}"/>
-              </a:ext>
-            </a:extLst>
-          </p:cNvPr>
-          <p:cNvSpPr txBox="1"/>
-          <p:nvPr/>
-        </p:nvSpPr>
-        <p:spPr>
-          <a:xfrm>
-            <a:off x="7287894" y="3811741"/>
-            <a:ext cx="210793" cy="461665"/>
-          </a:xfrm>
-          <a:prstGeom prst="rect">
-            <a:avLst/>
-          </a:prstGeom>
-          <a:noFill/>
-        </p:spPr>
-        <p:txBody>
-          <a:bodyPr wrap="square" rtlCol="0">
-            <a:spAutoFit/>
-          </a:bodyPr>
-          <a:lstStyle/>
-          <a:p>
-            <a:r>
-              <a:rPr lang="en-US" sz="2400" dirty="0"/>
-              <a:t>*</a:t>
-            </a:r>
-          </a:p>
-        </p:txBody>
-      </p:sp>
-      <p:sp>
-        <p:nvSpPr>
-          <p:cNvPr id="12" name="TextBox 11">
-            <a:extLst>
-              <a:ext uri="{FF2B5EF4-FFF2-40B4-BE49-F238E27FC236}">
-                <a16:creationId xmlns:a16="http://schemas.microsoft.com/office/drawing/2014/main" id="{C94BCF7A-1E9A-450F-A042-196B6ABA706C}"/>
-              </a:ext>
-            </a:extLst>
-          </p:cNvPr>
-          <p:cNvSpPr txBox="1"/>
-          <p:nvPr/>
-        </p:nvSpPr>
-        <p:spPr>
-          <a:xfrm>
-            <a:off x="7716802" y="3350076"/>
-            <a:ext cx="210793" cy="461665"/>
-          </a:xfrm>
-          <a:prstGeom prst="rect">
-            <a:avLst/>
-          </a:prstGeom>
-          <a:noFill/>
-        </p:spPr>
-        <p:txBody>
-          <a:bodyPr wrap="square" rtlCol="0">
-            <a:spAutoFit/>
-          </a:bodyPr>
-          <a:lstStyle/>
-          <a:p>
-            <a:r>
-              <a:rPr lang="en-US" sz="2400" dirty="0"/>
-              <a:t>*</a:t>
-            </a:r>
-          </a:p>
-        </p:txBody>
-      </p:sp>
-      <p:sp>
-        <p:nvSpPr>
-          <p:cNvPr id="13" name="TextBox 12">
-            <a:extLst>
-              <a:ext uri="{FF2B5EF4-FFF2-40B4-BE49-F238E27FC236}">
-                <a16:creationId xmlns:a16="http://schemas.microsoft.com/office/drawing/2014/main" id="{0B1C1A82-F997-40DF-A6BD-3D0C0C640FAC}"/>
-              </a:ext>
-            </a:extLst>
-          </p:cNvPr>
-          <p:cNvSpPr txBox="1"/>
-          <p:nvPr/>
-        </p:nvSpPr>
-        <p:spPr>
-          <a:xfrm>
-            <a:off x="7393290" y="5464282"/>
-            <a:ext cx="1325461" cy="369332"/>
-          </a:xfrm>
-          <a:prstGeom prst="rect">
-            <a:avLst/>
-          </a:prstGeom>
-          <a:noFill/>
-        </p:spPr>
-        <p:txBody>
-          <a:bodyPr wrap="square">
-            <a:spAutoFit/>
-          </a:bodyPr>
-          <a:lstStyle/>
-          <a:p>
-            <a:r>
-              <a:rPr lang="en-US" dirty="0"/>
-              <a:t>* p &lt; 0.05</a:t>
-            </a:r>
-          </a:p>
-        </p:txBody>
-      </p:sp>
-      <mc:AlternateContent xmlns:mc="http://schemas.openxmlformats.org/markup-compatibility/2006" xmlns:a14="http://schemas.microsoft.com/office/drawing/2010/main">
-        <mc:Choice Requires="a14">
-          <p:sp>
-            <p:nvSpPr>
-              <p:cNvPr id="14" name="TextBox 13">
-                <a:extLst>
-                  <a:ext uri="{FF2B5EF4-FFF2-40B4-BE49-F238E27FC236}">
-                    <a16:creationId xmlns:a16="http://schemas.microsoft.com/office/drawing/2014/main" id="{0F3FDD95-E768-4541-AB7F-3C82980BE5EF}"/>
-                  </a:ext>
-                </a:extLst>
-              </p:cNvPr>
-              <p:cNvSpPr txBox="1"/>
-              <p:nvPr/>
-            </p:nvSpPr>
-            <p:spPr>
-              <a:xfrm>
-                <a:off x="0" y="6077504"/>
-                <a:ext cx="9204862" cy="415370"/>
-              </a:xfrm>
-              <a:prstGeom prst="rect">
-                <a:avLst/>
-              </a:prstGeom>
-              <a:noFill/>
-            </p:spPr>
-            <p:txBody>
-              <a:bodyPr wrap="square">
-                <a:spAutoFit/>
-              </a:bodyPr>
-              <a:lstStyle/>
-              <a:p>
-                <a:pPr marL="0" marR="0">
-                  <a:lnSpc>
-                    <a:spcPct val="107000"/>
-                  </a:lnSpc>
-                  <a:spcBef>
-                    <a:spcPts val="0"/>
-                  </a:spcBef>
-                  <a:spcAft>
-                    <a:spcPts val="0"/>
-                  </a:spcAft>
-                </a:pPr>
-                <a14:m>
-                  <m:oMathPara xmlns:m="http://schemas.openxmlformats.org/officeDocument/2006/math">
-                    <m:oMathParaPr>
-                      <m:jc m:val="centerGroup"/>
-                    </m:oMathParaPr>
-                    <m:oMath xmlns:m="http://schemas.openxmlformats.org/officeDocument/2006/math">
-                      <m:sSub>
-                        <m:sSubPr>
-                          <m:ctrlPr>
-                            <a:rPr lang="en-US" sz="1800" i="1" smtClean="0">
-                              <a:solidFill>
-                                <a:srgbClr val="000000"/>
-                              </a:solidFill>
-                              <a:effectLst/>
-                              <a:latin typeface="Cambria Math" panose="02040503050406030204" pitchFamily="18" charset="0"/>
-                              <a:ea typeface="Calibri" panose="020F0502020204030204" pitchFamily="34" charset="0"/>
-                            </a:rPr>
-                          </m:ctrlPr>
-                        </m:sSubPr>
-                        <m:e>
-                          <m:r>
-                            <m:rPr>
-                              <m:sty m:val="p"/>
-                            </m:rPr>
-                            <a:rPr lang="en-US" sz="1800" b="0" i="0" smtClean="0">
-                              <a:solidFill>
-                                <a:srgbClr val="000000"/>
-                              </a:solidFill>
-                              <a:effectLst/>
-                              <a:latin typeface="Cambria Math" panose="02040503050406030204" pitchFamily="18" charset="0"/>
-                              <a:ea typeface="Calibri" panose="020F0502020204030204" pitchFamily="34" charset="0"/>
-                            </a:rPr>
-                            <m:t>log</m:t>
-                          </m:r>
-                          <m:r>
-                            <a:rPr lang="en-US" sz="1800" b="0" i="1" smtClean="0">
-                              <a:solidFill>
-                                <a:srgbClr val="000000"/>
-                              </a:solidFill>
-                              <a:effectLst/>
-                              <a:latin typeface="Cambria Math" panose="02040503050406030204" pitchFamily="18" charset="0"/>
-                              <a:ea typeface="Calibri" panose="020F0502020204030204" pitchFamily="34" charset="0"/>
-                            </a:rPr>
-                            <m:t>⁡(</m:t>
-                          </m:r>
-                          <m:r>
-                            <a:rPr lang="en-US" sz="1800" i="1">
-                              <a:solidFill>
-                                <a:srgbClr val="000000"/>
-                              </a:solidFill>
-                              <a:effectLst/>
-                              <a:latin typeface="Cambria Math" panose="02040503050406030204" pitchFamily="18" charset="0"/>
-                              <a:ea typeface="Calibri" panose="020F0502020204030204" pitchFamily="34" charset="0"/>
-                            </a:rPr>
-                            <m:t>𝑌</m:t>
-                          </m:r>
-                        </m:e>
-                        <m:sub>
-                          <m:r>
-                            <a:rPr lang="en-US" sz="1800" i="1">
-                              <a:solidFill>
-                                <a:srgbClr val="000000"/>
-                              </a:solidFill>
-                              <a:effectLst/>
-                              <a:latin typeface="Cambria Math" panose="02040503050406030204" pitchFamily="18" charset="0"/>
-                              <a:ea typeface="Calibri" panose="020F0502020204030204" pitchFamily="34" charset="0"/>
-                            </a:rPr>
-                            <m:t>𝑖𝑗𝑘</m:t>
-                          </m:r>
-                        </m:sub>
-                      </m:sSub>
-                      <m:r>
-                        <a:rPr lang="en-US" sz="1800" b="0" i="1" smtClean="0">
-                          <a:solidFill>
-                            <a:srgbClr val="000000"/>
-                          </a:solidFill>
-                          <a:effectLst/>
-                          <a:latin typeface="Cambria Math" panose="02040503050406030204" pitchFamily="18" charset="0"/>
-                          <a:ea typeface="Calibri" panose="020F0502020204030204" pitchFamily="34" charset="0"/>
-                        </a:rPr>
-                        <m:t>)</m:t>
-                      </m:r>
-                      <m:r>
-                        <a:rPr lang="en-US" sz="1800" i="1">
-                          <a:solidFill>
-                            <a:srgbClr val="000000"/>
-                          </a:solidFill>
-                          <a:effectLst/>
-                          <a:latin typeface="Cambria Math" panose="02040503050406030204" pitchFamily="18" charset="0"/>
-                          <a:ea typeface="Calibri" panose="020F0502020204030204" pitchFamily="34" charset="0"/>
-                        </a:rPr>
-                        <m:t>= </m:t>
-                      </m:r>
-                      <m:r>
-                        <a:rPr lang="en-US" sz="1800" i="1">
-                          <a:solidFill>
-                            <a:srgbClr val="000000"/>
-                          </a:solidFill>
-                          <a:effectLst/>
-                          <a:latin typeface="Cambria Math" panose="02040503050406030204" pitchFamily="18" charset="0"/>
-                          <a:ea typeface="Calibri" panose="020F0502020204030204" pitchFamily="34" charset="0"/>
-                        </a:rPr>
-                        <m:t>𝜇</m:t>
-                      </m:r>
-                      <m:r>
-                        <a:rPr lang="en-US" sz="1800" i="1">
-                          <a:solidFill>
-                            <a:srgbClr val="000000"/>
-                          </a:solidFill>
-                          <a:effectLst/>
-                          <a:latin typeface="Cambria Math" panose="02040503050406030204" pitchFamily="18" charset="0"/>
-                          <a:ea typeface="Calibri" panose="020F0502020204030204" pitchFamily="34" charset="0"/>
-                        </a:rPr>
-                        <m:t>+</m:t>
-                      </m:r>
-                      <m:sSub>
-                        <m:sSubPr>
-                          <m:ctrlPr>
-                            <a:rPr lang="en-US" sz="1800" i="1">
-                              <a:solidFill>
-                                <a:srgbClr val="000000"/>
-                              </a:solidFill>
-                              <a:effectLst/>
-                              <a:latin typeface="Cambria Math" panose="02040503050406030204" pitchFamily="18" charset="0"/>
-                              <a:ea typeface="Calibri" panose="020F0502020204030204" pitchFamily="34" charset="0"/>
-                            </a:rPr>
-                          </m:ctrlPr>
-                        </m:sSubPr>
-                        <m:e>
-                          <m:r>
-                            <a:rPr lang="en-US" sz="1800" i="1">
-                              <a:solidFill>
-                                <a:srgbClr val="000000"/>
-                              </a:solidFill>
-                              <a:effectLst/>
-                              <a:latin typeface="Cambria Math" panose="02040503050406030204" pitchFamily="18" charset="0"/>
-                              <a:ea typeface="Calibri" panose="020F0502020204030204" pitchFamily="34" charset="0"/>
-                            </a:rPr>
-                            <m:t>𝑅𝑒𝑝</m:t>
-                          </m:r>
-                        </m:e>
-                        <m:sub>
-                          <m:r>
-                            <a:rPr lang="en-US" sz="1800" i="1">
-                              <a:solidFill>
-                                <a:srgbClr val="000000"/>
-                              </a:solidFill>
-                              <a:effectLst/>
-                              <a:latin typeface="Cambria Math" panose="02040503050406030204" pitchFamily="18" charset="0"/>
-                              <a:ea typeface="Calibri" panose="020F0502020204030204" pitchFamily="34" charset="0"/>
-                            </a:rPr>
-                            <m:t>𝑖</m:t>
-                          </m:r>
-                        </m:sub>
-                      </m:sSub>
-                      <m:r>
-                        <a:rPr lang="en-US" sz="1800" i="1">
-                          <a:solidFill>
-                            <a:srgbClr val="000000"/>
-                          </a:solidFill>
-                          <a:effectLst/>
-                          <a:latin typeface="Cambria Math" panose="02040503050406030204" pitchFamily="18" charset="0"/>
-                          <a:ea typeface="Calibri" panose="020F0502020204030204" pitchFamily="34" charset="0"/>
-                        </a:rPr>
-                        <m:t>+ </m:t>
-                      </m:r>
-                      <m:sSub>
-                        <m:sSubPr>
-                          <m:ctrlPr>
-                            <a:rPr lang="en-US" sz="1800" i="1">
-                              <a:solidFill>
-                                <a:srgbClr val="000000"/>
-                              </a:solidFill>
-                              <a:effectLst/>
-                              <a:latin typeface="Cambria Math" panose="02040503050406030204" pitchFamily="18" charset="0"/>
-                              <a:ea typeface="Calibri" panose="020F0502020204030204" pitchFamily="34" charset="0"/>
-                            </a:rPr>
-                          </m:ctrlPr>
-                        </m:sSubPr>
-                        <m:e>
-                          <m:r>
-                            <a:rPr lang="en-US" sz="1800" i="1">
-                              <a:solidFill>
-                                <a:srgbClr val="000000"/>
-                              </a:solidFill>
-                              <a:effectLst/>
-                              <a:latin typeface="Cambria Math" panose="02040503050406030204" pitchFamily="18" charset="0"/>
-                              <a:ea typeface="Calibri" panose="020F0502020204030204" pitchFamily="34" charset="0"/>
-                            </a:rPr>
-                            <m:t>𝑌𝑒𝑎𝑟</m:t>
-                          </m:r>
-                        </m:e>
-                        <m:sub>
-                          <m:r>
-                            <a:rPr lang="en-US" sz="1800" i="1">
-                              <a:solidFill>
-                                <a:srgbClr val="000000"/>
-                              </a:solidFill>
-                              <a:effectLst/>
-                              <a:latin typeface="Cambria Math" panose="02040503050406030204" pitchFamily="18" charset="0"/>
-                              <a:ea typeface="Calibri" panose="020F0502020204030204" pitchFamily="34" charset="0"/>
-                            </a:rPr>
-                            <m:t>𝑗</m:t>
-                          </m:r>
-                        </m:sub>
-                      </m:sSub>
-                      <m:r>
-                        <a:rPr lang="en-US" sz="1800" i="1">
-                          <a:solidFill>
-                            <a:srgbClr val="000000"/>
-                          </a:solidFill>
-                          <a:effectLst/>
-                          <a:latin typeface="Cambria Math" panose="02040503050406030204" pitchFamily="18" charset="0"/>
-                          <a:ea typeface="Calibri" panose="020F0502020204030204" pitchFamily="34" charset="0"/>
-                        </a:rPr>
-                        <m:t>+ </m:t>
-                      </m:r>
-                      <m:sSub>
-                        <m:sSubPr>
-                          <m:ctrlPr>
-                            <a:rPr lang="en-US" sz="1800" i="1">
-                              <a:solidFill>
-                                <a:srgbClr val="000000"/>
-                              </a:solidFill>
-                              <a:effectLst/>
-                              <a:latin typeface="Cambria Math" panose="02040503050406030204" pitchFamily="18" charset="0"/>
-                              <a:ea typeface="Calibri" panose="020F0502020204030204" pitchFamily="34" charset="0"/>
-                            </a:rPr>
-                          </m:ctrlPr>
-                        </m:sSubPr>
-                        <m:e>
-                          <m:r>
-                            <a:rPr lang="en-US" sz="1800" i="1">
-                              <a:solidFill>
-                                <a:srgbClr val="000000"/>
-                              </a:solidFill>
-                              <a:effectLst/>
-                              <a:latin typeface="Cambria Math" panose="02040503050406030204" pitchFamily="18" charset="0"/>
-                              <a:ea typeface="Calibri" panose="020F0502020204030204" pitchFamily="34" charset="0"/>
-                            </a:rPr>
-                            <m:t>𝑆𝑒𝑣𝑒𝑟𝑖𝑡𝑦</m:t>
-                          </m:r>
-                        </m:e>
-                        <m:sub>
-                          <m:r>
-                            <a:rPr lang="en-US" sz="1800" i="1">
-                              <a:solidFill>
-                                <a:srgbClr val="000000"/>
-                              </a:solidFill>
-                              <a:effectLst/>
-                              <a:latin typeface="Cambria Math" panose="02040503050406030204" pitchFamily="18" charset="0"/>
-                              <a:ea typeface="Calibri" panose="020F0502020204030204" pitchFamily="34" charset="0"/>
-                            </a:rPr>
-                            <m:t>𝑘</m:t>
-                          </m:r>
-                          <m:r>
-                            <a:rPr lang="en-US" sz="1800" i="1">
-                              <a:solidFill>
-                                <a:srgbClr val="000000"/>
-                              </a:solidFill>
-                              <a:effectLst/>
-                              <a:latin typeface="Cambria Math" panose="02040503050406030204" pitchFamily="18" charset="0"/>
-                              <a:ea typeface="Calibri" panose="020F0502020204030204" pitchFamily="34" charset="0"/>
-                            </a:rPr>
-                            <m:t>|</m:t>
-                          </m:r>
-                          <m:r>
-                            <a:rPr lang="en-US" sz="1800" i="1">
-                              <a:solidFill>
-                                <a:srgbClr val="000000"/>
-                              </a:solidFill>
-                              <a:effectLst/>
-                              <a:latin typeface="Cambria Math" panose="02040503050406030204" pitchFamily="18" charset="0"/>
-                              <a:ea typeface="Calibri" panose="020F0502020204030204" pitchFamily="34" charset="0"/>
-                            </a:rPr>
-                            <m:t>𝑖</m:t>
-                          </m:r>
-                        </m:sub>
-                      </m:sSub>
-                      <m:r>
-                        <a:rPr lang="en-US" sz="1800" i="1">
-                          <a:solidFill>
-                            <a:srgbClr val="000000"/>
-                          </a:solidFill>
-                          <a:effectLst/>
-                          <a:latin typeface="Cambria Math" panose="02040503050406030204" pitchFamily="18" charset="0"/>
-                          <a:ea typeface="Calibri" panose="020F0502020204030204" pitchFamily="34" charset="0"/>
-                        </a:rPr>
-                        <m:t>+</m:t>
-                      </m:r>
-                      <m:r>
-                        <a:rPr lang="en-US" sz="1800" i="1">
-                          <a:solidFill>
-                            <a:srgbClr val="000000"/>
-                          </a:solidFill>
-                          <a:effectLst/>
-                          <a:latin typeface="Cambria Math" panose="02040503050406030204" pitchFamily="18" charset="0"/>
-                          <a:ea typeface="Calibri" panose="020F0502020204030204" pitchFamily="34" charset="0"/>
-                        </a:rPr>
-                        <m:t>𝑌𝑒𝑎𝑟</m:t>
-                      </m:r>
-                      <m:r>
-                        <a:rPr lang="en-US" sz="1800" i="1">
-                          <a:solidFill>
-                            <a:srgbClr val="000000"/>
-                          </a:solidFill>
-                          <a:effectLst/>
-                          <a:latin typeface="Cambria Math" panose="02040503050406030204" pitchFamily="18" charset="0"/>
-                          <a:ea typeface="Calibri" panose="020F0502020204030204" pitchFamily="34" charset="0"/>
-                        </a:rPr>
-                        <m:t>∗</m:t>
-                      </m:r>
-                      <m:sSub>
-                        <m:sSubPr>
-                          <m:ctrlPr>
-                            <a:rPr lang="en-US" sz="1800" i="1">
-                              <a:solidFill>
-                                <a:srgbClr val="000000"/>
-                              </a:solidFill>
-                              <a:effectLst/>
-                              <a:latin typeface="Cambria Math" panose="02040503050406030204" pitchFamily="18" charset="0"/>
-                              <a:ea typeface="Calibri" panose="020F0502020204030204" pitchFamily="34" charset="0"/>
-                            </a:rPr>
-                          </m:ctrlPr>
-                        </m:sSubPr>
-                        <m:e>
-                          <m:r>
-                            <a:rPr lang="en-US" sz="1800" i="1">
-                              <a:solidFill>
-                                <a:srgbClr val="000000"/>
-                              </a:solidFill>
-                              <a:effectLst/>
-                              <a:latin typeface="Cambria Math" panose="02040503050406030204" pitchFamily="18" charset="0"/>
-                              <a:ea typeface="Calibri" panose="020F0502020204030204" pitchFamily="34" charset="0"/>
-                            </a:rPr>
-                            <m:t>𝑆𝑒𝑣</m:t>
-                          </m:r>
-                        </m:e>
-                        <m:sub>
-                          <m:r>
-                            <a:rPr lang="en-US" sz="1800" i="1">
-                              <a:solidFill>
-                                <a:srgbClr val="000000"/>
-                              </a:solidFill>
-                              <a:effectLst/>
-                              <a:latin typeface="Cambria Math" panose="02040503050406030204" pitchFamily="18" charset="0"/>
-                              <a:ea typeface="Calibri" panose="020F0502020204030204" pitchFamily="34" charset="0"/>
-                            </a:rPr>
-                            <m:t>𝑗𝑘</m:t>
-                          </m:r>
-                          <m:r>
-                            <a:rPr lang="en-US" sz="1800" i="1">
-                              <a:solidFill>
-                                <a:srgbClr val="000000"/>
-                              </a:solidFill>
-                              <a:effectLst/>
-                              <a:latin typeface="Cambria Math" panose="02040503050406030204" pitchFamily="18" charset="0"/>
-                              <a:ea typeface="Calibri" panose="020F0502020204030204" pitchFamily="34" charset="0"/>
-                            </a:rPr>
-                            <m:t>|</m:t>
-                          </m:r>
-                          <m:r>
-                            <a:rPr lang="en-US" sz="1800" i="1">
-                              <a:solidFill>
-                                <a:srgbClr val="000000"/>
-                              </a:solidFill>
-                              <a:effectLst/>
-                              <a:latin typeface="Cambria Math" panose="02040503050406030204" pitchFamily="18" charset="0"/>
-                              <a:ea typeface="Calibri" panose="020F0502020204030204" pitchFamily="34" charset="0"/>
-                            </a:rPr>
-                            <m:t>𝑖</m:t>
-                          </m:r>
-                        </m:sub>
-                      </m:sSub>
-                      <m:r>
-                        <a:rPr lang="en-US" sz="1800" i="1">
-                          <a:solidFill>
-                            <a:srgbClr val="000000"/>
-                          </a:solidFill>
-                          <a:effectLst/>
-                          <a:latin typeface="Cambria Math" panose="02040503050406030204" pitchFamily="18" charset="0"/>
-                          <a:ea typeface="Calibri" panose="020F0502020204030204" pitchFamily="34" charset="0"/>
-                        </a:rPr>
-                        <m:t> [+ </m:t>
-                      </m:r>
-                      <m:sSub>
-                        <m:sSubPr>
-                          <m:ctrlPr>
-                            <a:rPr lang="en-US" sz="1800" i="1">
-                              <a:solidFill>
-                                <a:srgbClr val="000000"/>
-                              </a:solidFill>
-                              <a:effectLst/>
-                              <a:latin typeface="Cambria Math" panose="02040503050406030204" pitchFamily="18" charset="0"/>
-                              <a:ea typeface="Calibri" panose="020F0502020204030204" pitchFamily="34" charset="0"/>
-                            </a:rPr>
-                          </m:ctrlPr>
-                        </m:sSubPr>
-                        <m:e>
-                          <m:r>
-                            <a:rPr lang="en-US" sz="1800" i="1">
-                              <a:solidFill>
-                                <a:srgbClr val="000000"/>
-                              </a:solidFill>
-                              <a:effectLst/>
-                              <a:latin typeface="Cambria Math" panose="02040503050406030204" pitchFamily="18" charset="0"/>
-                              <a:ea typeface="Calibri" panose="020F0502020204030204" pitchFamily="34" charset="0"/>
-                            </a:rPr>
-                            <m:t>𝜀</m:t>
-                          </m:r>
-                        </m:e>
-                        <m:sub>
-                          <m:r>
-                            <a:rPr lang="en-US" sz="1800" i="1">
-                              <a:solidFill>
-                                <a:srgbClr val="000000"/>
-                              </a:solidFill>
-                              <a:effectLst/>
-                              <a:latin typeface="Cambria Math" panose="02040503050406030204" pitchFamily="18" charset="0"/>
-                              <a:ea typeface="Calibri" panose="020F0502020204030204" pitchFamily="34" charset="0"/>
-                            </a:rPr>
-                            <m:t>𝑖𝑗𝑘</m:t>
-                          </m:r>
-                        </m:sub>
-                      </m:sSub>
-                      <m:r>
-                        <a:rPr lang="en-US" sz="1800" i="1">
-                          <a:solidFill>
-                            <a:srgbClr val="000000"/>
-                          </a:solidFill>
-                          <a:effectLst/>
-                          <a:latin typeface="Cambria Math" panose="02040503050406030204" pitchFamily="18" charset="0"/>
-                          <a:ea typeface="Calibri" panose="020F0502020204030204" pitchFamily="34" charset="0"/>
-                        </a:rPr>
-                        <m:t>]</m:t>
-                      </m:r>
-                    </m:oMath>
-                  </m:oMathPara>
-                </a14:m>
-                <a:endParaRPr lang="en-US" sz="1800" dirty="0">
-                  <a:effectLst/>
-                  <a:latin typeface="Calibri" panose="020F0502020204030204" pitchFamily="34" charset="0"/>
-                  <a:ea typeface="Calibri" panose="020F0502020204030204" pitchFamily="34" charset="0"/>
-                </a:endParaRPr>
-              </a:p>
-            </p:txBody>
-          </p:sp>
-        </mc:Choice>
-        <mc:Fallback xmlns="">
-          <p:sp>
-            <p:nvSpPr>
-              <p:cNvPr id="14" name="TextBox 13">
-                <a:extLst>
-                  <a:ext uri="{FF2B5EF4-FFF2-40B4-BE49-F238E27FC236}">
-                    <a16:creationId xmlns:a16="http://schemas.microsoft.com/office/drawing/2014/main" id="{0F3FDD95-E768-4541-AB7F-3C82980BE5EF}"/>
-                  </a:ext>
-                </a:extLst>
-              </p:cNvPr>
-              <p:cNvSpPr txBox="1">
-                <a:spLocks noRot="1" noChangeAspect="1" noMove="1" noResize="1" noEditPoints="1" noAdjustHandles="1" noChangeArrowheads="1" noChangeShapeType="1" noTextEdit="1"/>
-              </p:cNvSpPr>
-              <p:nvPr/>
-            </p:nvSpPr>
-            <p:spPr>
-              <a:xfrm>
-                <a:off x="0" y="6077504"/>
-                <a:ext cx="9204862" cy="415370"/>
-              </a:xfrm>
-              <a:prstGeom prst="rect">
-                <a:avLst/>
-              </a:prstGeom>
-              <a:blipFill>
-                <a:blip r:embed="rId3"/>
-                <a:stretch>
-                  <a:fillRect b="-8824"/>
-                </a:stretch>
-              </a:blipFill>
-            </p:spPr>
-            <p:txBody>
-              <a:bodyPr/>
-              <a:lstStyle/>
-              <a:p>
-                <a:r>
-                  <a:rPr lang="en-US">
-                    <a:noFill/>
-                  </a:rPr>
-                  <a:t> </a:t>
-                </a:r>
-              </a:p>
-            </p:txBody>
-          </p:sp>
-        </mc:Fallback>
-      </mc:AlternateContent>
-      <p:pic>
-        <p:nvPicPr>
-          <p:cNvPr id="3" name="Picture 2">
-            <a:extLst>
-              <a:ext uri="{FF2B5EF4-FFF2-40B4-BE49-F238E27FC236}">
-                <a16:creationId xmlns:a16="http://schemas.microsoft.com/office/drawing/2014/main" id="{0F42ADBD-B9DF-47DA-88D6-5BC0BCB84424}"/>
-              </a:ext>
-            </a:extLst>
-          </p:cNvPr>
-          <p:cNvPicPr>
-            <a:picLocks noChangeAspect="1"/>
-          </p:cNvPicPr>
-          <p:nvPr/>
-        </p:nvPicPr>
-        <p:blipFill>
-          <a:blip r:embed="rId4"/>
-          <a:stretch>
-            <a:fillRect/>
-          </a:stretch>
-        </p:blipFill>
-        <p:spPr>
-          <a:xfrm>
-            <a:off x="5768412" y="5974306"/>
-            <a:ext cx="1499746" cy="627942"/>
-          </a:xfrm>
-          <a:prstGeom prst="rect">
-            <a:avLst/>
-          </a:prstGeom>
-        </p:spPr>
-      </p:pic>
-      <p:sp>
-        <p:nvSpPr>
-          <p:cNvPr id="15" name="Oval 14">
-            <a:extLst>
-              <a:ext uri="{FF2B5EF4-FFF2-40B4-BE49-F238E27FC236}">
-                <a16:creationId xmlns:a16="http://schemas.microsoft.com/office/drawing/2014/main" id="{63E959BD-1826-4267-B9B2-2763A2173AD0}"/>
-              </a:ext>
-            </a:extLst>
-          </p:cNvPr>
-          <p:cNvSpPr/>
-          <p:nvPr/>
-        </p:nvSpPr>
-        <p:spPr>
-          <a:xfrm>
-            <a:off x="3506680" y="6050807"/>
-            <a:ext cx="683580" cy="468763"/>
-          </a:xfrm>
-          <a:prstGeom prst="ellipse">
-            <a:avLst/>
-          </a:prstGeom>
-          <a:noFill/>
-          <a:ln w="38100">
-            <a:solidFill>
-              <a:schemeClr val="accent2"/>
-            </a:solidFill>
-          </a:ln>
-        </p:spPr>
-        <p:style>
-          <a:lnRef idx="2">
-            <a:schemeClr val="accent1">
-              <a:shade val="50000"/>
-            </a:schemeClr>
-          </a:lnRef>
-          <a:fillRef idx="1">
-            <a:schemeClr val="accent1"/>
-          </a:fillRef>
-          <a:effectRef idx="0">
-            <a:schemeClr val="accent1"/>
-          </a:effectRef>
-          <a:fontRef idx="minor">
-            <a:schemeClr val="lt1"/>
-          </a:fontRef>
-        </p:style>
-        <p:txBody>
-          <a:bodyPr rtlCol="0" anchor="ctr"/>
-          <a:lstStyle>
-            <a:defPPr>
-              <a:defRPr lang="en-US"/>
-            </a:defPPr>
-            <a:lvl1pPr marL="0" algn="l" defTabSz="457200" rtl="0" eaLnBrk="1" latinLnBrk="0" hangingPunct="1">
-              <a:defRPr sz="1800" kern="1200">
-                <a:solidFill>
-                  <a:schemeClr val="lt1"/>
-                </a:solidFill>
-                <a:latin typeface="+mn-lt"/>
-                <a:ea typeface="+mn-ea"/>
-                <a:cs typeface="+mn-cs"/>
-              </a:defRPr>
-            </a:lvl1pPr>
-            <a:lvl2pPr marL="457200" algn="l" defTabSz="457200" rtl="0" eaLnBrk="1" latinLnBrk="0" hangingPunct="1">
-              <a:defRPr sz="1800" kern="1200">
-                <a:solidFill>
-                  <a:schemeClr val="lt1"/>
-                </a:solidFill>
-                <a:latin typeface="+mn-lt"/>
-                <a:ea typeface="+mn-ea"/>
-                <a:cs typeface="+mn-cs"/>
-              </a:defRPr>
-            </a:lvl2pPr>
-            <a:lvl3pPr marL="914400" algn="l" defTabSz="457200" rtl="0" eaLnBrk="1" latinLnBrk="0" hangingPunct="1">
-              <a:defRPr sz="1800" kern="1200">
-                <a:solidFill>
-                  <a:schemeClr val="lt1"/>
-                </a:solidFill>
-                <a:latin typeface="+mn-lt"/>
-                <a:ea typeface="+mn-ea"/>
-                <a:cs typeface="+mn-cs"/>
-              </a:defRPr>
-            </a:lvl3pPr>
-            <a:lvl4pPr marL="1371600" algn="l" defTabSz="457200" rtl="0" eaLnBrk="1" latinLnBrk="0" hangingPunct="1">
-              <a:defRPr sz="1800" kern="1200">
-                <a:solidFill>
-                  <a:schemeClr val="lt1"/>
-                </a:solidFill>
-                <a:latin typeface="+mn-lt"/>
-                <a:ea typeface="+mn-ea"/>
-                <a:cs typeface="+mn-cs"/>
-              </a:defRPr>
-            </a:lvl4pPr>
-            <a:lvl5pPr marL="1828800" algn="l" defTabSz="457200" rtl="0" eaLnBrk="1" latinLnBrk="0" hangingPunct="1">
-              <a:defRPr sz="1800" kern="1200">
-                <a:solidFill>
-                  <a:schemeClr val="lt1"/>
-                </a:solidFill>
-                <a:latin typeface="+mn-lt"/>
-                <a:ea typeface="+mn-ea"/>
-                <a:cs typeface="+mn-cs"/>
-              </a:defRPr>
-            </a:lvl5pPr>
-            <a:lvl6pPr marL="2286000" algn="l" defTabSz="457200" rtl="0" eaLnBrk="1" latinLnBrk="0" hangingPunct="1">
-              <a:defRPr sz="1800" kern="1200">
-                <a:solidFill>
-                  <a:schemeClr val="lt1"/>
-                </a:solidFill>
-                <a:latin typeface="+mn-lt"/>
-                <a:ea typeface="+mn-ea"/>
-                <a:cs typeface="+mn-cs"/>
-              </a:defRPr>
-            </a:lvl6pPr>
-            <a:lvl7pPr marL="2743200" algn="l" defTabSz="457200" rtl="0" eaLnBrk="1" latinLnBrk="0" hangingPunct="1">
-              <a:defRPr sz="1800" kern="1200">
-                <a:solidFill>
-                  <a:schemeClr val="lt1"/>
-                </a:solidFill>
-                <a:latin typeface="+mn-lt"/>
-                <a:ea typeface="+mn-ea"/>
-                <a:cs typeface="+mn-cs"/>
-              </a:defRPr>
-            </a:lvl7pPr>
-            <a:lvl8pPr marL="3200400" algn="l" defTabSz="457200" rtl="0" eaLnBrk="1" latinLnBrk="0" hangingPunct="1">
-              <a:defRPr sz="1800" kern="1200">
-                <a:solidFill>
-                  <a:schemeClr val="lt1"/>
-                </a:solidFill>
-                <a:latin typeface="+mn-lt"/>
-                <a:ea typeface="+mn-ea"/>
-                <a:cs typeface="+mn-cs"/>
-              </a:defRPr>
-            </a:lvl8pPr>
-            <a:lvl9pPr marL="3657600" algn="l" defTabSz="457200" rtl="0" eaLnBrk="1" latinLnBrk="0" hangingPunct="1">
-              <a:defRPr sz="1800" kern="1200">
-                <a:solidFill>
-                  <a:schemeClr val="lt1"/>
-                </a:solidFill>
-                <a:latin typeface="+mn-lt"/>
-                <a:ea typeface="+mn-ea"/>
-                <a:cs typeface="+mn-cs"/>
-              </a:defRPr>
-            </a:lvl9pPr>
-          </a:lstStyle>
-          <a:p>
-            <a:pPr algn="ctr"/>
-            <a:endParaRPr lang="en-US"/>
-          </a:p>
-        </p:txBody>
-      </p:sp>
-    </p:spTree>
-    <p:extLst>
-      <p:ext uri="{BB962C8B-B14F-4D97-AF65-F5344CB8AC3E}">
-        <p14:creationId xmlns:p14="http://schemas.microsoft.com/office/powerpoint/2010/main" val="11548347"/>
-      </p:ext>
-    </p:extLst>
-  </p:cSld>
-  <p:clrMapOvr>
-    <a:masterClrMapping/>
-  </p:clrMapOvr>
-  <p:timing>
-    <p:tnLst>
-      <p:par>
-        <p:cTn id="1" dur="indefinite" restart="never" nodeType="tmRoot">
-          <p:childTnLst>
-            <p:seq concurrent="1" nextAc="seek">
-              <p:cTn id="2" dur="indefinite" nodeType="mainSeq">
-                <p:childTnLst>
-                  <p:par>
-                    <p:cTn id="3" fill="hold">
-                      <p:stCondLst>
-                        <p:cond delay="indefinite"/>
-                      </p:stCondLst>
-                      <p:childTnLst>
-                        <p:par>
-                          <p:cTn id="4" fill="hold">
-                            <p:stCondLst>
-                              <p:cond delay="0"/>
-                            </p:stCondLst>
-                            <p:childTnLst>
-                              <p:par>
-                                <p:cTn id="5" presetID="1" presetClass="entr" presetSubtype="0" fill="hold" grpId="0" nodeType="clickEffect">
-                                  <p:stCondLst>
-                                    <p:cond delay="0"/>
-                                  </p:stCondLst>
-                                  <p:childTnLst>
-                                    <p:set>
-                                      <p:cBhvr>
-                                        <p:cTn id="6" dur="1" fill="hold">
-                                          <p:stCondLst>
-                                            <p:cond delay="0"/>
-                                          </p:stCondLst>
-                                        </p:cTn>
-                                        <p:tgtEl>
-                                          <p:spTgt spid="15"/>
-                                        </p:tgtEl>
-                                        <p:attrNameLst>
-                                          <p:attrName>style.visibility</p:attrName>
-                                        </p:attrNameLst>
-                                      </p:cBhvr>
-                                      <p:to>
-                                        <p:strVal val="visible"/>
-                                      </p:to>
-                                    </p:set>
-                                  </p:childTnLst>
-                                </p:cTn>
-                              </p:par>
-                              <p:par>
-                                <p:cTn id="7" presetID="1" presetClass="entr" presetSubtype="0" fill="hold" nodeType="withEffect">
-                                  <p:stCondLst>
-                                    <p:cond delay="0"/>
-                                  </p:stCondLst>
-                                  <p:childTnLst>
-                                    <p:set>
-                                      <p:cBhvr>
-                                        <p:cTn id="8" dur="1" fill="hold">
-                                          <p:stCondLst>
-                                            <p:cond delay="0"/>
-                                          </p:stCondLst>
-                                        </p:cTn>
-                                        <p:tgtEl>
-                                          <p:spTgt spid="3"/>
-                                        </p:tgtEl>
-                                        <p:attrNameLst>
-                                          <p:attrName>style.visibility</p:attrName>
-                                        </p:attrNameLst>
-                                      </p:cBhvr>
-                                      <p:to>
-                                        <p:strVal val="visible"/>
-                                      </p:to>
-                                    </p:set>
-                                  </p:childTnLst>
-                                </p:cTn>
-                              </p:par>
-                            </p:childTnLst>
-                          </p:cTn>
-                        </p:par>
-                      </p:childTnLst>
-                    </p:cTn>
-                  </p:par>
-                </p:childTnLst>
-              </p:cTn>
-              <p:prevCondLst>
-                <p:cond evt="onPrev" delay="0">
-                  <p:tgtEl>
-                    <p:sldTgt/>
-                  </p:tgtEl>
-                </p:cond>
-              </p:prevCondLst>
-              <p:nextCondLst>
-                <p:cond evt="onNext" delay="0">
-                  <p:tgtEl>
-                    <p:sldTgt/>
-                  </p:tgtEl>
-                </p:cond>
-              </p:nextCondLst>
-            </p:seq>
-          </p:childTnLst>
-        </p:cTn>
-      </p:par>
-    </p:tnLst>
-    <p:bldLst>
-      <p:bldP spid="15" grpId="0" animBg="1"/>
     </p:bldLst>
   </p:timing>
 </p:sld>

</xml_diff>